<commit_message>
added presentation notes to  selected slides
</commit_message>
<xml_diff>
--- a/presentation/presentation.pptx
+++ b/presentation/presentation.pptx
@@ -557,109 +557,7 @@
           <a:bodyPr/>
           <a:lstStyle/>
           <a:p>
-            <a:r>
-              <a:rPr lang="en-GB" b="0" dirty="0">
-                <a:solidFill>
-                  <a:srgbClr val="CCCCCC"/>
-                </a:solidFill>
-                <a:effectLst/>
-                <a:latin typeface="+mn-lt"/>
-              </a:rPr>
-              <a:t>Diabetes is a prevalent chronic disease that affects millions of people worldwide. According to the International Diabetes Federation, approximately 537 million adults (20-79 years) are living with diabetes. Around 90% of diabetes cases are Type 2, influenced by factors like economy, age, environment, and lifestyles. </a:t>
-            </a:r>
-          </a:p>
-          <a:p>
-            <a:endParaRPr lang="en-GB" b="0" dirty="0">
-              <a:solidFill>
-                <a:srgbClr val="CCCCCC"/>
-              </a:solidFill>
-              <a:effectLst/>
-              <a:latin typeface="+mn-lt"/>
-            </a:endParaRPr>
-          </a:p>
-          <a:p>
-            <a:r>
-              <a:rPr lang="en-GB" b="0" dirty="0">
-                <a:solidFill>
-                  <a:srgbClr val="CCCCCC"/>
-                </a:solidFill>
-                <a:effectLst/>
-                <a:latin typeface="+mn-lt"/>
-              </a:rPr>
-              <a:t>Early detection and prediction of diabetes are crucial for effective management and prevention of complications. This project aims to develop a predictive model to identify individuals at risk of developing diabetes based on various health indicators.</a:t>
-            </a:r>
-          </a:p>
-          <a:p>
-            <a:endParaRPr lang="en-GB" b="0" dirty="0">
-              <a:solidFill>
-                <a:srgbClr val="CCCCCC"/>
-              </a:solidFill>
-              <a:effectLst/>
-              <a:latin typeface="+mn-lt"/>
-            </a:endParaRPr>
-          </a:p>
-          <a:p>
-            <a:r>
-              <a:rPr lang="en-GB" b="0" dirty="0">
-                <a:solidFill>
-                  <a:srgbClr val="CCCCCC"/>
-                </a:solidFill>
-                <a:effectLst/>
-                <a:latin typeface="+mn-lt"/>
-              </a:rPr>
-              <a:t>The project aims to predict Type 2 diabetes risk using machine learning algorithms based on lifestyle and family background. By leveraging machine learning algorithms and techniques, we will analyse anonymous health records encompassing parameters such as BMI, age, blood pressure, dietary habits, etc. The project will employ feature selection methods and experiment with various algorithms, including Logistic Regression, Random Forest, Decision Tree, Support Vector Machines (SVM), K-Nearest </a:t>
-            </a:r>
-            <a:r>
-              <a:rPr lang="en-GB" b="0" dirty="0" err="1">
-                <a:solidFill>
-                  <a:srgbClr val="CCCCCC"/>
-                </a:solidFill>
-                <a:effectLst/>
-                <a:latin typeface="+mn-lt"/>
-              </a:rPr>
-              <a:t>Neighbors</a:t>
-            </a:r>
-            <a:r>
-              <a:rPr lang="en-GB" b="0" dirty="0">
-                <a:solidFill>
-                  <a:srgbClr val="CCCCCC"/>
-                </a:solidFill>
-                <a:effectLst/>
-                <a:latin typeface="+mn-lt"/>
-              </a:rPr>
-              <a:t> (KNN) and Neural Network, to build a robust and accurate predictive tool.</a:t>
-            </a:r>
-          </a:p>
-          <a:p>
-            <a:br>
-              <a:rPr lang="en-GB" b="0" dirty="0">
-                <a:solidFill>
-                  <a:srgbClr val="CCCCCC"/>
-                </a:solidFill>
-                <a:effectLst/>
-                <a:latin typeface="+mn-lt"/>
-              </a:rPr>
-            </a:br>
-            <a:r>
-              <a:rPr lang="en-GB" b="0" dirty="0">
-                <a:solidFill>
-                  <a:srgbClr val="CCCCCC"/>
-                </a:solidFill>
-                <a:effectLst/>
-                <a:latin typeface="+mn-lt"/>
-              </a:rPr>
-              <a:t>The ultimate goal is to gain insights into the significant factors contributing to the prediction of diabetes occurrence. Through early detection and intervention, the project aims to contribute to better management and prevention of diabetes, thus improving public health outcomes.</a:t>
-            </a:r>
-          </a:p>
-          <a:p>
-            <a:endParaRPr lang="en-US" dirty="0">
-              <a:latin typeface="+mn-lt"/>
-            </a:endParaRPr>
-          </a:p>
-          <a:p>
-            <a:endParaRPr lang="en-US" dirty="0">
-              <a:latin typeface="+mn-lt"/>
-            </a:endParaRPr>
+            <a:endParaRPr lang="en-US" dirty="0"/>
           </a:p>
         </p:txBody>
       </p:sp>
@@ -680,7 +578,7 @@
           <a:p>
             <a:fld id="{4D7E02E5-87D3-E448-947F-831956D1A2E7}" type="slidenum">
               <a:rPr lang="en-US" smtClean="0"/>
-              <a:t>2</a:t>
+              <a:t>1</a:t>
             </a:fld>
             <a:endParaRPr lang="en-US"/>
           </a:p>
@@ -689,7 +587,7 @@
     </p:spTree>
     <p:extLst>
       <p:ext uri="{BB962C8B-B14F-4D97-AF65-F5344CB8AC3E}">
-        <p14:creationId xmlns:p14="http://schemas.microsoft.com/office/powerpoint/2010/main" val="915690324"/>
+        <p14:creationId xmlns:p14="http://schemas.microsoft.com/office/powerpoint/2010/main" val="3344955821"/>
       </p:ext>
     </p:extLst>
   </p:cSld>
@@ -751,67 +649,7 @@
                 <a:effectLst/>
                 <a:latin typeface="+mn-lt"/>
               </a:rPr>
-              <a:t>The Kaggle </a:t>
-            </a:r>
-            <a:r>
-              <a:rPr lang="en-GB" b="0" dirty="0">
-                <a:solidFill>
-                  <a:srgbClr val="CE9178"/>
-                </a:solidFill>
-                <a:effectLst/>
-                <a:latin typeface="+mn-lt"/>
-              </a:rPr>
-              <a:t>dataset</a:t>
-            </a:r>
-            <a:r>
-              <a:rPr lang="en-GB" b="0" dirty="0">
-                <a:solidFill>
-                  <a:srgbClr val="CCCCCC"/>
-                </a:solidFill>
-                <a:effectLst/>
-                <a:latin typeface="+mn-lt"/>
-              </a:rPr>
-              <a:t> utilised in this project was curated by researchers from the Department of Computer Science and Engineering at Birla Institute of Technology in India, for research purposes only and is not intended for commercial use. An </a:t>
-            </a:r>
-            <a:r>
-              <a:rPr lang="en-GB" b="0" dirty="0">
-                <a:solidFill>
-                  <a:srgbClr val="CE9178"/>
-                </a:solidFill>
-                <a:effectLst/>
-                <a:latin typeface="+mn-lt"/>
-              </a:rPr>
-              <a:t>article</a:t>
-            </a:r>
-            <a:r>
-              <a:rPr lang="en-GB" b="0" dirty="0">
-                <a:solidFill>
-                  <a:srgbClr val="CCCCCC"/>
-                </a:solidFill>
-                <a:effectLst/>
-                <a:latin typeface="+mn-lt"/>
-              </a:rPr>
-              <a:t> detailing the implementation of this dataset was published on </a:t>
-            </a:r>
-            <a:r>
-              <a:rPr lang="en-GB" b="0" dirty="0">
-                <a:solidFill>
-                  <a:srgbClr val="CE9178"/>
-                </a:solidFill>
-                <a:effectLst/>
-                <a:latin typeface="+mn-lt"/>
-              </a:rPr>
-              <a:t>ScienceDirect,</a:t>
-            </a:r>
-            <a:r>
-              <a:rPr lang="en-GB" b="0" dirty="0">
-                <a:solidFill>
-                  <a:srgbClr val="CCCCCC"/>
-                </a:solidFill>
-                <a:effectLst/>
-                <a:latin typeface="+mn-lt"/>
-              </a:rPr>
-              <a:t> providing further information.</a:t>
+              <a:t>Diabetes is a prevalent chronic disease that affects millions of people worldwide. According to the International Diabetes Federation, approximately 537 million adults (20-79 years) are living with diabetes. Around 90% of diabetes cases are Type 2, influenced by factors like economy, age, environment, and lifestyles. </a:t>
             </a:r>
           </a:p>
           <a:p>
@@ -824,230 +662,18 @@
             </a:endParaRPr>
           </a:p>
           <a:p>
-            <a:pPr algn="l"/>
-            <a:r>
-              <a:rPr lang="en-GB" b="1" i="0" dirty="0">
+            <a:r>
+              <a:rPr lang="en-GB" b="0" dirty="0">
                 <a:solidFill>
                   <a:srgbClr val="CCCCCC"/>
                 </a:solidFill>
                 <a:effectLst/>
                 <a:latin typeface="+mn-lt"/>
               </a:rPr>
-              <a:t>Data Cleaning and Pre-Processing:</a:t>
-            </a:r>
-            <a:br>
-              <a:rPr lang="en-GB" b="1" i="0" dirty="0">
-                <a:solidFill>
-                  <a:srgbClr val="CCCCCC"/>
-                </a:solidFill>
-                <a:effectLst/>
-                <a:latin typeface="+mn-lt"/>
-              </a:rPr>
-            </a:br>
-            <a:r>
-              <a:rPr lang="en-GB" b="1" i="0" dirty="0">
-                <a:solidFill>
-                  <a:srgbClr val="CCCCCC"/>
-                </a:solidFill>
-                <a:effectLst/>
-                <a:latin typeface="+mn-lt"/>
-              </a:rPr>
-              <a:t>- Parameter were renamed for consistency and accuracy.</a:t>
-            </a:r>
-          </a:p>
-          <a:p>
-            <a:pPr algn="l"/>
-            <a:r>
-              <a:rPr lang="en-GB" b="0" i="0" dirty="0">
-                <a:solidFill>
-                  <a:srgbClr val="CCCCCC"/>
-                </a:solidFill>
-                <a:effectLst/>
-                <a:latin typeface="+mn-lt"/>
-              </a:rPr>
-              <a:t>- </a:t>
-            </a:r>
-            <a:r>
-              <a:rPr lang="en-GB" b="1" i="0" dirty="0">
-                <a:solidFill>
-                  <a:srgbClr val="CCCCCC"/>
-                </a:solidFill>
-                <a:effectLst/>
-                <a:latin typeface="+mn-lt"/>
-              </a:rPr>
-              <a:t>Redundant Columns like </a:t>
-            </a:r>
-            <a:r>
-              <a:rPr lang="en-GB" b="0" i="0" dirty="0" err="1">
-                <a:solidFill>
-                  <a:srgbClr val="CCCCCC"/>
-                </a:solidFill>
-                <a:effectLst/>
-                <a:latin typeface="+mn-lt"/>
-              </a:rPr>
-              <a:t>highBP</a:t>
-            </a:r>
-            <a:r>
-              <a:rPr lang="en-GB" b="0" i="0" dirty="0">
-                <a:solidFill>
-                  <a:srgbClr val="CCCCCC"/>
-                </a:solidFill>
-                <a:effectLst/>
-                <a:latin typeface="+mn-lt"/>
-              </a:rPr>
-              <a:t> was dropped. This reduces the possibility of conflicting information.</a:t>
-            </a:r>
-          </a:p>
-          <a:p>
-            <a:pPr algn="l"/>
-            <a:r>
-              <a:rPr lang="en-GB" b="0" i="0" dirty="0">
-                <a:solidFill>
-                  <a:srgbClr val="CCCCCC"/>
-                </a:solidFill>
-                <a:effectLst/>
-                <a:latin typeface="+mn-lt"/>
-              </a:rPr>
-              <a:t>- </a:t>
-            </a:r>
-            <a:r>
-              <a:rPr lang="en-GB" b="1" i="0" dirty="0">
-                <a:solidFill>
-                  <a:srgbClr val="CCCCCC"/>
-                </a:solidFill>
-                <a:effectLst/>
-                <a:latin typeface="+mn-lt"/>
-              </a:rPr>
-              <a:t>Missing Value: </a:t>
-            </a:r>
-            <a:r>
-              <a:rPr lang="en-GB" b="0" i="0" dirty="0">
-                <a:solidFill>
-                  <a:srgbClr val="CCCCCC"/>
-                </a:solidFill>
-                <a:effectLst/>
-                <a:latin typeface="+mn-lt"/>
-              </a:rPr>
-              <a:t>Rows containing missing values were removed entirely to avoid corruption by incomplete data.</a:t>
-            </a:r>
-          </a:p>
-          <a:p>
-            <a:pPr algn="l"/>
-            <a:r>
-              <a:rPr lang="en-GB" b="1" i="0" dirty="0">
-                <a:solidFill>
-                  <a:srgbClr val="CCCCCC"/>
-                </a:solidFill>
-                <a:effectLst/>
-                <a:latin typeface="+mn-lt"/>
-              </a:rPr>
-              <a:t>- Categorical Parameters were converted to numerical values. </a:t>
-            </a:r>
-            <a:r>
-              <a:rPr lang="en-GB" b="0" i="0" dirty="0">
-                <a:solidFill>
-                  <a:srgbClr val="CCCCCC"/>
-                </a:solidFill>
-                <a:effectLst/>
-                <a:latin typeface="+mn-lt"/>
-              </a:rPr>
-              <a:t>This conversion allows parameters to be used in machine learning algorithms that require numerical features.</a:t>
-            </a:r>
-          </a:p>
-          <a:p>
-            <a:pPr algn="l"/>
-            <a:endParaRPr lang="en-GB" b="0" i="0" dirty="0">
-              <a:solidFill>
-                <a:srgbClr val="CCCCCC"/>
-              </a:solidFill>
-              <a:effectLst/>
-              <a:latin typeface="+mn-lt"/>
-            </a:endParaRPr>
-          </a:p>
-          <a:p>
-            <a:pPr algn="l"/>
-            <a:r>
-              <a:rPr lang="en-GB" b="1" i="0" dirty="0">
-                <a:solidFill>
-                  <a:srgbClr val="CCCCCC"/>
-                </a:solidFill>
-                <a:effectLst/>
-                <a:latin typeface="+mn-lt"/>
-              </a:rPr>
-              <a:t>Data Splitting:</a:t>
-            </a:r>
-            <a:endParaRPr lang="en-GB" b="0" i="0" dirty="0">
-              <a:solidFill>
-                <a:srgbClr val="CCCCCC"/>
-              </a:solidFill>
-              <a:effectLst/>
-              <a:latin typeface="+mn-lt"/>
-            </a:endParaRPr>
-          </a:p>
-          <a:p>
-            <a:pPr algn="l">
-              <a:buFont typeface="Arial" panose="020B0604020202020204" pitchFamily="34" charset="0"/>
-              <a:buChar char="•"/>
-            </a:pPr>
-            <a:r>
-              <a:rPr lang="en-GB" b="0" i="0" dirty="0">
-                <a:solidFill>
-                  <a:srgbClr val="CCCCCC"/>
-                </a:solidFill>
-                <a:effectLst/>
-                <a:latin typeface="+mn-lt"/>
-              </a:rPr>
-              <a:t>Defined the target Diabetic and feature parameters and split the data into subsets ready for the training and testing of models.</a:t>
-            </a:r>
-          </a:p>
-          <a:p>
-            <a:pPr algn="l">
-              <a:buFont typeface="Arial" panose="020B0604020202020204" pitchFamily="34" charset="0"/>
-              <a:buChar char="•"/>
-            </a:pPr>
-            <a:endParaRPr lang="en-GB" b="0" i="0" dirty="0">
-              <a:solidFill>
-                <a:srgbClr val="CCCCCC"/>
-              </a:solidFill>
-              <a:effectLst/>
-              <a:latin typeface="+mn-lt"/>
-            </a:endParaRPr>
-          </a:p>
-          <a:p>
-            <a:pPr algn="l"/>
-            <a:r>
-              <a:rPr lang="en-GB" b="1" i="0" dirty="0">
-                <a:solidFill>
-                  <a:srgbClr val="CCCCCC"/>
-                </a:solidFill>
-                <a:effectLst/>
-                <a:latin typeface="+mn-lt"/>
-              </a:rPr>
-              <a:t>Feature scaling:</a:t>
-            </a:r>
-            <a:endParaRPr lang="en-GB" b="0" i="0" dirty="0">
-              <a:solidFill>
-                <a:srgbClr val="CCCCCC"/>
-              </a:solidFill>
-              <a:effectLst/>
-              <a:latin typeface="+mn-lt"/>
-            </a:endParaRPr>
-          </a:p>
-          <a:p>
-            <a:pPr algn="l">
-              <a:buFont typeface="Arial" panose="020B0604020202020204" pitchFamily="34" charset="0"/>
-              <a:buChar char="•"/>
-            </a:pPr>
-            <a:r>
-              <a:rPr lang="en-GB" b="0" i="0" dirty="0">
-                <a:solidFill>
-                  <a:srgbClr val="CCCCCC"/>
-                </a:solidFill>
-                <a:effectLst/>
-                <a:latin typeface="+mn-lt"/>
-              </a:rPr>
-              <a:t>Standardised numerical features using Z-score normalisation.</a:t>
-            </a:r>
+              <a:t>Early detection and prediction of diabetes are crucial for effective management and prevention of complications. This project aims to develop a predictive model to identify individuals at risk of developing diabetes based on various health indicators.</a:t>
+            </a:r>
+          </a:p>
+          <a:p>
             <a:endParaRPr lang="en-GB" b="0" dirty="0">
               <a:solidFill>
                 <a:srgbClr val="CCCCCC"/>
@@ -1057,6 +683,64 @@
             </a:endParaRPr>
           </a:p>
           <a:p>
+            <a:r>
+              <a:rPr lang="en-GB" b="0" dirty="0">
+                <a:solidFill>
+                  <a:srgbClr val="CCCCCC"/>
+                </a:solidFill>
+                <a:effectLst/>
+                <a:latin typeface="+mn-lt"/>
+              </a:rPr>
+              <a:t>The project aims to predict Type 2 diabetes risk using machine learning algorithms based on lifestyle and family background. By leveraging machine learning algorithms and techniques, we will analyse anonymous health records encompassing parameters such as BMI, age, blood pressure, dietary habits, etc. The project will employ feature selection methods and experiment with various algorithms, including Logistic Regression, Random Forest, Decision Tree, Support Vector Machines (SVM), K-Nearest </a:t>
+            </a:r>
+            <a:r>
+              <a:rPr lang="en-GB" b="0" dirty="0" err="1">
+                <a:solidFill>
+                  <a:srgbClr val="CCCCCC"/>
+                </a:solidFill>
+                <a:effectLst/>
+                <a:latin typeface="+mn-lt"/>
+              </a:rPr>
+              <a:t>Neighbors</a:t>
+            </a:r>
+            <a:r>
+              <a:rPr lang="en-GB" b="0" dirty="0">
+                <a:solidFill>
+                  <a:srgbClr val="CCCCCC"/>
+                </a:solidFill>
+                <a:effectLst/>
+                <a:latin typeface="+mn-lt"/>
+              </a:rPr>
+              <a:t> (KNN) and Neural Network, to build a robust and accurate predictive tool.</a:t>
+            </a:r>
+          </a:p>
+          <a:p>
+            <a:br>
+              <a:rPr lang="en-GB" b="0" dirty="0">
+                <a:solidFill>
+                  <a:srgbClr val="CCCCCC"/>
+                </a:solidFill>
+                <a:effectLst/>
+                <a:latin typeface="+mn-lt"/>
+              </a:rPr>
+            </a:br>
+            <a:r>
+              <a:rPr lang="en-GB" b="0" dirty="0">
+                <a:solidFill>
+                  <a:srgbClr val="CCCCCC"/>
+                </a:solidFill>
+                <a:effectLst/>
+                <a:latin typeface="+mn-lt"/>
+              </a:rPr>
+              <a:t>The ultimate goal is to gain insights into the significant factors contributing to the prediction of diabetes occurrence. Through early detection and intervention, the project aims to contribute to better management and prevention of diabetes, thus improving public health outcomes.</a:t>
+            </a:r>
+          </a:p>
+          <a:p>
+            <a:endParaRPr lang="en-US" dirty="0">
+              <a:latin typeface="+mn-lt"/>
+            </a:endParaRPr>
+          </a:p>
+          <a:p>
             <a:endParaRPr lang="en-US" dirty="0">
               <a:latin typeface="+mn-lt"/>
             </a:endParaRPr>
@@ -1080,7 +764,7 @@
           <a:p>
             <a:fld id="{4D7E02E5-87D3-E448-947F-831956D1A2E7}" type="slidenum">
               <a:rPr lang="en-US" smtClean="0"/>
-              <a:t>3</a:t>
+              <a:t>2</a:t>
             </a:fld>
             <a:endParaRPr lang="en-US"/>
           </a:p>
@@ -1089,7 +773,7 @@
     </p:spTree>
     <p:extLst>
       <p:ext uri="{BB962C8B-B14F-4D97-AF65-F5344CB8AC3E}">
-        <p14:creationId xmlns:p14="http://schemas.microsoft.com/office/powerpoint/2010/main" val="1873853049"/>
+        <p14:creationId xmlns:p14="http://schemas.microsoft.com/office/powerpoint/2010/main" val="915690324"/>
       </p:ext>
     </p:extLst>
   </p:cSld>
@@ -1144,15 +828,77 @@
           <a:lstStyle/>
           <a:p>
             <a:r>
-              <a:rPr lang="en-GB" b="1" dirty="0">
-                <a:solidFill>
-                  <a:srgbClr val="569CD6"/>
+              <a:rPr lang="en-GB" b="0" dirty="0">
+                <a:solidFill>
+                  <a:srgbClr val="CCCCCC"/>
                 </a:solidFill>
                 <a:effectLst/>
                 <a:latin typeface="+mn-lt"/>
               </a:rPr>
-              <a:t>Model Building:</a:t>
-            </a:r>
+              <a:t>The Kaggle </a:t>
+            </a:r>
+            <a:r>
+              <a:rPr lang="en-GB" b="0" dirty="0">
+                <a:solidFill>
+                  <a:srgbClr val="CE9178"/>
+                </a:solidFill>
+                <a:effectLst/>
+                <a:latin typeface="+mn-lt"/>
+              </a:rPr>
+              <a:t>dataset</a:t>
+            </a:r>
+            <a:r>
+              <a:rPr lang="en-GB" b="0" dirty="0">
+                <a:solidFill>
+                  <a:srgbClr val="CCCCCC"/>
+                </a:solidFill>
+                <a:effectLst/>
+                <a:latin typeface="+mn-lt"/>
+              </a:rPr>
+              <a:t> utilised in this project was curated by researchers from the Department of Computer Science and Engineering at Birla Institute of Technology in India, for research purposes only and is not intended for commercial use. An </a:t>
+            </a:r>
+            <a:r>
+              <a:rPr lang="en-GB" b="0" dirty="0">
+                <a:solidFill>
+                  <a:srgbClr val="CE9178"/>
+                </a:solidFill>
+                <a:effectLst/>
+                <a:latin typeface="+mn-lt"/>
+              </a:rPr>
+              <a:t>article</a:t>
+            </a:r>
+            <a:r>
+              <a:rPr lang="en-GB" b="0" dirty="0">
+                <a:solidFill>
+                  <a:srgbClr val="CCCCCC"/>
+                </a:solidFill>
+                <a:effectLst/>
+                <a:latin typeface="+mn-lt"/>
+              </a:rPr>
+              <a:t> detailing the implementation of this dataset was published on </a:t>
+            </a:r>
+            <a:r>
+              <a:rPr lang="en-GB" b="0" dirty="0">
+                <a:solidFill>
+                  <a:srgbClr val="CE9178"/>
+                </a:solidFill>
+                <a:effectLst/>
+                <a:latin typeface="+mn-lt"/>
+              </a:rPr>
+              <a:t>ScienceDirect,</a:t>
+            </a:r>
+            <a:r>
+              <a:rPr lang="en-GB" b="0" dirty="0">
+                <a:solidFill>
+                  <a:srgbClr val="CCCCCC"/>
+                </a:solidFill>
+                <a:effectLst/>
+                <a:latin typeface="+mn-lt"/>
+              </a:rPr>
+              <a:t> providing further information.</a:t>
+            </a:r>
+          </a:p>
+          <a:p>
             <a:endParaRPr lang="en-GB" b="0" dirty="0">
               <a:solidFill>
                 <a:srgbClr val="CCCCCC"/>
@@ -1162,308 +908,229 @@
             </a:endParaRPr>
           </a:p>
           <a:p>
-            <a:r>
-              <a:rPr lang="en-GB" b="0" dirty="0">
-                <a:solidFill>
-                  <a:srgbClr val="6796E6"/>
+            <a:pPr algn="l"/>
+            <a:r>
+              <a:rPr lang="en-GB" b="1" i="0" dirty="0">
+                <a:solidFill>
+                  <a:srgbClr val="CCCCCC"/>
                 </a:solidFill>
                 <a:effectLst/>
                 <a:latin typeface="+mn-lt"/>
               </a:rPr>
-              <a:t>-</a:t>
-            </a:r>
-            <a:r>
-              <a:rPr lang="en-GB" b="0" dirty="0">
+              <a:t>Data Cleaning and Pre-Processing:</a:t>
+            </a:r>
+            <a:br>
+              <a:rPr lang="en-GB" b="1" i="0" dirty="0">
                 <a:solidFill>
                   <a:srgbClr val="CCCCCC"/>
                 </a:solidFill>
                 <a:effectLst/>
                 <a:latin typeface="+mn-lt"/>
               </a:rPr>
-              <a:t> </a:t>
-            </a:r>
-            <a:r>
-              <a:rPr lang="en-GB" b="1" dirty="0">
-                <a:solidFill>
-                  <a:srgbClr val="569CD6"/>
+            </a:br>
+            <a:r>
+              <a:rPr lang="en-GB" b="1" i="0" dirty="0">
+                <a:solidFill>
+                  <a:srgbClr val="CCCCCC"/>
                 </a:solidFill>
                 <a:effectLst/>
                 <a:latin typeface="+mn-lt"/>
               </a:rPr>
-              <a:t>Logistic Regression: </a:t>
-            </a:r>
-            <a:r>
-              <a:rPr lang="en-GB" b="0" dirty="0">
+              <a:t>- Parameter were renamed for consistency and accuracy.</a:t>
+            </a:r>
+          </a:p>
+          <a:p>
+            <a:pPr algn="l"/>
+            <a:r>
+              <a:rPr lang="en-GB" b="0" i="0" dirty="0">
                 <a:solidFill>
                   <a:srgbClr val="CCCCCC"/>
                 </a:solidFill>
                 <a:effectLst/>
                 <a:latin typeface="+mn-lt"/>
               </a:rPr>
-              <a:t>Trained a logistic regression model as a baseline model.</a:t>
-            </a:r>
-          </a:p>
-          <a:p>
-            <a:r>
-              <a:rPr lang="en-GB" b="0" dirty="0">
-                <a:solidFill>
-                  <a:srgbClr val="6796E6"/>
+              <a:t>- </a:t>
+            </a:r>
+            <a:r>
+              <a:rPr lang="en-GB" b="1" i="0" dirty="0">
+                <a:solidFill>
+                  <a:srgbClr val="CCCCCC"/>
                 </a:solidFill>
                 <a:effectLst/>
                 <a:latin typeface="+mn-lt"/>
               </a:rPr>
-              <a:t>-</a:t>
-            </a:r>
-            <a:r>
-              <a:rPr lang="en-GB" b="0" dirty="0">
+              <a:t>Redundant Columns like </a:t>
+            </a:r>
+            <a:r>
+              <a:rPr lang="en-GB" b="0" i="0" dirty="0" err="1">
                 <a:solidFill>
                   <a:srgbClr val="CCCCCC"/>
                 </a:solidFill>
                 <a:effectLst/>
                 <a:latin typeface="+mn-lt"/>
               </a:rPr>
-              <a:t> </a:t>
-            </a:r>
-            <a:r>
-              <a:rPr lang="en-GB" b="1" dirty="0">
-                <a:solidFill>
-                  <a:srgbClr val="569CD6"/>
+              <a:t>highBP</a:t>
+            </a:r>
+            <a:r>
+              <a:rPr lang="en-GB" b="0" i="0" dirty="0">
+                <a:solidFill>
+                  <a:srgbClr val="CCCCCC"/>
                 </a:solidFill>
                 <a:effectLst/>
                 <a:latin typeface="+mn-lt"/>
               </a:rPr>
-              <a:t>Random Forest:</a:t>
-            </a:r>
-            <a:r>
-              <a:rPr lang="en-GB" b="0" dirty="0">
+              <a:t> was dropped. This reduces the possibility of conflicting information.</a:t>
+            </a:r>
+          </a:p>
+          <a:p>
+            <a:pPr algn="l"/>
+            <a:r>
+              <a:rPr lang="en-GB" b="0" i="0" dirty="0">
                 <a:solidFill>
                   <a:srgbClr val="CCCCCC"/>
                 </a:solidFill>
                 <a:effectLst/>
                 <a:latin typeface="+mn-lt"/>
               </a:rPr>
-              <a:t> Implemented a random forest classifier to capture non-linear relationships between features.</a:t>
-            </a:r>
-          </a:p>
-          <a:p>
-            <a:r>
-              <a:rPr lang="en-GB" b="0" dirty="0">
-                <a:solidFill>
-                  <a:srgbClr val="6796E6"/>
+              <a:t>- </a:t>
+            </a:r>
+            <a:r>
+              <a:rPr lang="en-GB" b="1" i="0" dirty="0">
+                <a:solidFill>
+                  <a:srgbClr val="CCCCCC"/>
                 </a:solidFill>
                 <a:effectLst/>
                 <a:latin typeface="+mn-lt"/>
               </a:rPr>
-              <a:t>-</a:t>
-            </a:r>
-            <a:r>
-              <a:rPr lang="en-GB" b="0" dirty="0">
+              <a:t>Missing Value: </a:t>
+            </a:r>
+            <a:r>
+              <a:rPr lang="en-GB" b="0" i="0" dirty="0">
                 <a:solidFill>
                   <a:srgbClr val="CCCCCC"/>
                 </a:solidFill>
                 <a:effectLst/>
                 <a:latin typeface="+mn-lt"/>
               </a:rPr>
-              <a:t> </a:t>
-            </a:r>
-            <a:r>
-              <a:rPr lang="en-GB" b="1" dirty="0">
-                <a:solidFill>
-                  <a:srgbClr val="569CD6"/>
+              <a:t>Rows containing missing values were removed entirely to avoid corruption by incomplete data.</a:t>
+            </a:r>
+          </a:p>
+          <a:p>
+            <a:pPr algn="l"/>
+            <a:r>
+              <a:rPr lang="en-GB" b="1" i="0" dirty="0">
+                <a:solidFill>
+                  <a:srgbClr val="CCCCCC"/>
                 </a:solidFill>
                 <a:effectLst/>
                 <a:latin typeface="+mn-lt"/>
               </a:rPr>
-              <a:t>Decision Tree:</a:t>
-            </a:r>
-            <a:r>
-              <a:rPr lang="en-GB" b="0" dirty="0">
+              <a:t>- Categorical Parameters were converted to numerical values. </a:t>
+            </a:r>
+            <a:r>
+              <a:rPr lang="en-GB" b="0" i="0" dirty="0">
                 <a:solidFill>
                   <a:srgbClr val="CCCCCC"/>
                 </a:solidFill>
                 <a:effectLst/>
                 <a:latin typeface="+mn-lt"/>
               </a:rPr>
-              <a:t> Built a decision tree classifier to understand the decision-making process.</a:t>
-            </a:r>
-          </a:p>
-          <a:p>
-            <a:r>
-              <a:rPr lang="en-GB" b="0" dirty="0">
-                <a:solidFill>
-                  <a:srgbClr val="6796E6"/>
-                </a:solidFill>
-                <a:effectLst/>
-                <a:latin typeface="+mn-lt"/>
-              </a:rPr>
-              <a:t>-</a:t>
-            </a:r>
-            <a:r>
-              <a:rPr lang="en-GB" b="0" dirty="0">
-                <a:solidFill>
-                  <a:srgbClr val="CCCCCC"/>
-                </a:solidFill>
-                <a:effectLst/>
-                <a:latin typeface="+mn-lt"/>
-              </a:rPr>
-              <a:t> </a:t>
-            </a:r>
-            <a:r>
-              <a:rPr lang="en-GB" b="1" dirty="0">
-                <a:solidFill>
-                  <a:srgbClr val="569CD6"/>
-                </a:solidFill>
-                <a:effectLst/>
-                <a:latin typeface="+mn-lt"/>
-              </a:rPr>
-              <a:t>Support Vector Machine (SVM):</a:t>
-            </a:r>
-            <a:r>
-              <a:rPr lang="en-GB" b="0" dirty="0">
-                <a:solidFill>
-                  <a:srgbClr val="CCCCCC"/>
-                </a:solidFill>
-                <a:effectLst/>
-                <a:latin typeface="+mn-lt"/>
-              </a:rPr>
-              <a:t> Employed SVM with different kernels (linear, polynomial, and radial basis function) to find the best separating hyperplane. In this project, a linear kernel was selected due to its computational efficiency, which is advantageous for large datasets.</a:t>
-            </a:r>
-          </a:p>
-          <a:p>
-            <a:r>
-              <a:rPr lang="en-GB" b="0" dirty="0">
-                <a:solidFill>
-                  <a:srgbClr val="6796E6"/>
-                </a:solidFill>
-                <a:effectLst/>
-                <a:latin typeface="+mn-lt"/>
-              </a:rPr>
-              <a:t>-</a:t>
-            </a:r>
-            <a:r>
-              <a:rPr lang="en-GB" b="0" dirty="0">
-                <a:solidFill>
-                  <a:srgbClr val="CCCCCC"/>
-                </a:solidFill>
-                <a:effectLst/>
-                <a:latin typeface="+mn-lt"/>
-              </a:rPr>
-              <a:t> </a:t>
-            </a:r>
-            <a:r>
-              <a:rPr lang="en-GB" b="1" dirty="0">
-                <a:solidFill>
-                  <a:srgbClr val="569CD6"/>
-                </a:solidFill>
-                <a:effectLst/>
-                <a:latin typeface="+mn-lt"/>
-              </a:rPr>
-              <a:t>K-Nearest </a:t>
-            </a:r>
-            <a:r>
-              <a:rPr lang="en-GB" b="1" dirty="0" err="1">
-                <a:solidFill>
-                  <a:srgbClr val="569CD6"/>
-                </a:solidFill>
-                <a:effectLst/>
-                <a:latin typeface="+mn-lt"/>
-              </a:rPr>
-              <a:t>Neighbors</a:t>
-            </a:r>
-            <a:r>
-              <a:rPr lang="en-GB" b="1" dirty="0">
-                <a:solidFill>
-                  <a:srgbClr val="569CD6"/>
-                </a:solidFill>
-                <a:effectLst/>
-                <a:latin typeface="+mn-lt"/>
-              </a:rPr>
-              <a:t> (KNN):</a:t>
-            </a:r>
-            <a:r>
-              <a:rPr lang="en-GB" b="0" dirty="0">
-                <a:solidFill>
-                  <a:srgbClr val="CCCCCC"/>
-                </a:solidFill>
-                <a:effectLst/>
-                <a:latin typeface="+mn-lt"/>
-              </a:rPr>
-              <a:t> Implemented KNN to classify data points based on the majority class of their nearest neighbours.</a:t>
-            </a:r>
-          </a:p>
-          <a:p>
-            <a:r>
-              <a:rPr lang="en-GB" b="0" dirty="0">
-                <a:solidFill>
-                  <a:srgbClr val="6796E6"/>
-                </a:solidFill>
-                <a:effectLst/>
-                <a:latin typeface="+mn-lt"/>
-              </a:rPr>
-              <a:t>-</a:t>
-            </a:r>
-            <a:r>
-              <a:rPr lang="en-GB" b="0" dirty="0">
-                <a:solidFill>
-                  <a:srgbClr val="CCCCCC"/>
-                </a:solidFill>
-                <a:effectLst/>
-                <a:latin typeface="+mn-lt"/>
-              </a:rPr>
-              <a:t> </a:t>
-            </a:r>
-            <a:r>
-              <a:rPr lang="en-GB" b="1" dirty="0">
-                <a:solidFill>
-                  <a:srgbClr val="569CD6"/>
-                </a:solidFill>
-                <a:effectLst/>
-                <a:latin typeface="+mn-lt"/>
-              </a:rPr>
-              <a:t>Neural Network:</a:t>
-            </a:r>
-            <a:r>
-              <a:rPr lang="en-GB" b="0" dirty="0">
-                <a:solidFill>
-                  <a:srgbClr val="CCCCCC"/>
-                </a:solidFill>
-                <a:effectLst/>
-                <a:latin typeface="+mn-lt"/>
-              </a:rPr>
-              <a:t> Constructed a Neural Network with multiple hidden layers using TensorFlow.</a:t>
-            </a:r>
-          </a:p>
-          <a:p>
-            <a:endParaRPr lang="en-GB" b="1" dirty="0">
+              <a:t>This conversion allows parameters to be used in machine learning algorithms that require numerical features.</a:t>
+            </a:r>
+          </a:p>
+          <a:p>
+            <a:pPr algn="l"/>
+            <a:endParaRPr lang="en-GB" b="0" i="0" dirty="0">
               <a:solidFill>
-                <a:srgbClr val="569CD6"/>
+                <a:srgbClr val="CCCCCC"/>
               </a:solidFill>
               <a:effectLst/>
               <a:latin typeface="+mn-lt"/>
             </a:endParaRPr>
           </a:p>
           <a:p>
-            <a:r>
-              <a:rPr lang="en-GB" b="1" dirty="0">
-                <a:solidFill>
-                  <a:srgbClr val="569CD6"/>
+            <a:pPr algn="l"/>
+            <a:r>
+              <a:rPr lang="en-GB" b="1" i="0" dirty="0">
+                <a:solidFill>
+                  <a:srgbClr val="CCCCCC"/>
                 </a:solidFill>
                 <a:effectLst/>
                 <a:latin typeface="+mn-lt"/>
               </a:rPr>
-              <a:t>Tuning and Optimisation:</a:t>
-            </a:r>
-          </a:p>
-          <a:p>
-            <a:r>
-              <a:rPr lang="en-GB" b="1" dirty="0">
-                <a:solidFill>
-                  <a:srgbClr val="569CD6"/>
+              <a:t>Data Splitting:</a:t>
+            </a:r>
+            <a:endParaRPr lang="en-GB" b="0" i="0" dirty="0">
+              <a:solidFill>
+                <a:srgbClr val="CCCCCC"/>
+              </a:solidFill>
+              <a:effectLst/>
+              <a:latin typeface="+mn-lt"/>
+            </a:endParaRPr>
+          </a:p>
+          <a:p>
+            <a:pPr algn="l">
+              <a:buFont typeface="Arial" panose="020B0604020202020204" pitchFamily="34" charset="0"/>
+              <a:buChar char="•"/>
+            </a:pPr>
+            <a:r>
+              <a:rPr lang="en-GB" b="0" i="0" dirty="0">
+                <a:solidFill>
+                  <a:srgbClr val="CCCCCC"/>
                 </a:solidFill>
                 <a:effectLst/>
                 <a:latin typeface="+mn-lt"/>
               </a:rPr>
-              <a:t>Hyperparameter Tuning:</a:t>
+              <a:t>Defined the target Diabetic and feature parameters and split the data into subsets ready for the training and testing of models.</a:t>
+            </a:r>
+          </a:p>
+          <a:p>
+            <a:pPr algn="l">
+              <a:buFont typeface="Arial" panose="020B0604020202020204" pitchFamily="34" charset="0"/>
+              <a:buChar char="•"/>
+            </a:pPr>
+            <a:endParaRPr lang="en-GB" b="0" i="0" dirty="0">
+              <a:solidFill>
+                <a:srgbClr val="CCCCCC"/>
+              </a:solidFill>
+              <a:effectLst/>
+              <a:latin typeface="+mn-lt"/>
+            </a:endParaRPr>
+          </a:p>
+          <a:p>
+            <a:pPr algn="l"/>
+            <a:r>
+              <a:rPr lang="en-GB" b="1" i="0" dirty="0">
+                <a:solidFill>
+                  <a:srgbClr val="CCCCCC"/>
+                </a:solidFill>
+                <a:effectLst/>
+                <a:latin typeface="+mn-lt"/>
+              </a:rPr>
+              <a:t>Feature scaling:</a:t>
+            </a:r>
+            <a:endParaRPr lang="en-GB" b="0" i="0" dirty="0">
+              <a:solidFill>
+                <a:srgbClr val="CCCCCC"/>
+              </a:solidFill>
+              <a:effectLst/>
+              <a:latin typeface="+mn-lt"/>
+            </a:endParaRPr>
+          </a:p>
+          <a:p>
+            <a:pPr algn="l">
+              <a:buFont typeface="Arial" panose="020B0604020202020204" pitchFamily="34" charset="0"/>
+              <a:buChar char="•"/>
+            </a:pPr>
+            <a:r>
+              <a:rPr lang="en-GB" b="0" i="0" dirty="0">
+                <a:solidFill>
+                  <a:srgbClr val="CCCCCC"/>
+                </a:solidFill>
+                <a:effectLst/>
+                <a:latin typeface="+mn-lt"/>
+              </a:rPr>
+              <a:t>Standardised numerical features using Z-score normalisation.</a:t>
             </a:r>
             <a:endParaRPr lang="en-GB" b="0" dirty="0">
               <a:solidFill>
@@ -1474,119 +1141,6 @@
             </a:endParaRPr>
           </a:p>
           <a:p>
-            <a:r>
-              <a:rPr lang="en-GB" b="0" dirty="0">
-                <a:solidFill>
-                  <a:srgbClr val="6796E6"/>
-                </a:solidFill>
-                <a:effectLst/>
-                <a:latin typeface="+mn-lt"/>
-              </a:rPr>
-              <a:t>-</a:t>
-            </a:r>
-            <a:r>
-              <a:rPr lang="en-GB" b="0" dirty="0">
-                <a:solidFill>
-                  <a:srgbClr val="CCCCCC"/>
-                </a:solidFill>
-                <a:effectLst/>
-                <a:latin typeface="+mn-lt"/>
-              </a:rPr>
-              <a:t> Utilised </a:t>
-            </a:r>
-            <a:r>
-              <a:rPr lang="en-GB" b="1" dirty="0" err="1">
-                <a:solidFill>
-                  <a:srgbClr val="569CD6"/>
-                </a:solidFill>
-                <a:effectLst/>
-                <a:latin typeface="+mn-lt"/>
-              </a:rPr>
-              <a:t>GridSearchCV</a:t>
-            </a:r>
-            <a:r>
-              <a:rPr lang="en-GB" b="0" dirty="0">
-                <a:solidFill>
-                  <a:srgbClr val="CCCCCC"/>
-                </a:solidFill>
-                <a:effectLst/>
-                <a:latin typeface="+mn-lt"/>
-              </a:rPr>
-              <a:t> to tune hyperparameters for Logistic Regression, Random Forest, Decision Tree, SVM and KNN.</a:t>
-            </a:r>
-          </a:p>
-          <a:p>
-            <a:r>
-              <a:rPr lang="en-GB" b="1" dirty="0">
-                <a:solidFill>
-                  <a:srgbClr val="569CD6"/>
-                </a:solidFill>
-                <a:effectLst/>
-                <a:latin typeface="+mn-lt"/>
-              </a:rPr>
-              <a:t>Neural Network Optimisation:</a:t>
-            </a:r>
-            <a:endParaRPr lang="en-GB" b="0" dirty="0">
-              <a:solidFill>
-                <a:srgbClr val="CCCCCC"/>
-              </a:solidFill>
-              <a:effectLst/>
-              <a:latin typeface="+mn-lt"/>
-            </a:endParaRPr>
-          </a:p>
-          <a:p>
-            <a:r>
-              <a:rPr lang="en-GB" b="0" dirty="0">
-                <a:solidFill>
-                  <a:srgbClr val="6796E6"/>
-                </a:solidFill>
-                <a:effectLst/>
-                <a:latin typeface="+mn-lt"/>
-              </a:rPr>
-              <a:t>-</a:t>
-            </a:r>
-            <a:r>
-              <a:rPr lang="en-GB" b="0" dirty="0">
-                <a:solidFill>
-                  <a:srgbClr val="CCCCCC"/>
-                </a:solidFill>
-                <a:effectLst/>
-                <a:latin typeface="+mn-lt"/>
-              </a:rPr>
-              <a:t> Used </a:t>
-            </a:r>
-            <a:r>
-              <a:rPr lang="en-GB" b="1" dirty="0" err="1">
-                <a:solidFill>
-                  <a:srgbClr val="569CD6"/>
-                </a:solidFill>
-                <a:effectLst/>
-                <a:latin typeface="+mn-lt"/>
-              </a:rPr>
-              <a:t>Keras</a:t>
-            </a:r>
-            <a:r>
-              <a:rPr lang="en-GB" b="1" dirty="0">
-                <a:solidFill>
-                  <a:srgbClr val="569CD6"/>
-                </a:solidFill>
-                <a:effectLst/>
-                <a:latin typeface="+mn-lt"/>
-              </a:rPr>
-              <a:t> Tuner</a:t>
-            </a:r>
-            <a:r>
-              <a:rPr lang="en-GB" b="0" dirty="0">
-                <a:solidFill>
-                  <a:srgbClr val="CCCCCC"/>
-                </a:solidFill>
-                <a:effectLst/>
-                <a:latin typeface="+mn-lt"/>
-              </a:rPr>
-              <a:t> to perform hyperparameter optimisation for the Neural Network model, including the number of hidden layers, neurons per layer, activation functions, and learning rate.</a:t>
-            </a:r>
-          </a:p>
-          <a:p>
             <a:endParaRPr lang="en-US" dirty="0">
               <a:latin typeface="+mn-lt"/>
             </a:endParaRPr>
@@ -1610,7 +1164,7 @@
           <a:p>
             <a:fld id="{4D7E02E5-87D3-E448-947F-831956D1A2E7}" type="slidenum">
               <a:rPr lang="en-US" smtClean="0"/>
-              <a:t>4</a:t>
+              <a:t>3</a:t>
             </a:fld>
             <a:endParaRPr lang="en-US"/>
           </a:p>
@@ -1619,7 +1173,7 @@
     </p:spTree>
     <p:extLst>
       <p:ext uri="{BB962C8B-B14F-4D97-AF65-F5344CB8AC3E}">
-        <p14:creationId xmlns:p14="http://schemas.microsoft.com/office/powerpoint/2010/main" val="1425259791"/>
+        <p14:creationId xmlns:p14="http://schemas.microsoft.com/office/powerpoint/2010/main" val="1873853049"/>
       </p:ext>
     </p:extLst>
   </p:cSld>
@@ -1674,6 +1228,536 @@
           <a:lstStyle/>
           <a:p>
             <a:r>
+              <a:rPr lang="en-GB" b="1" dirty="0">
+                <a:solidFill>
+                  <a:srgbClr val="569CD6"/>
+                </a:solidFill>
+                <a:effectLst/>
+                <a:latin typeface="+mn-lt"/>
+              </a:rPr>
+              <a:t>Model Building:</a:t>
+            </a:r>
+            <a:endParaRPr lang="en-GB" b="0" dirty="0">
+              <a:solidFill>
+                <a:srgbClr val="CCCCCC"/>
+              </a:solidFill>
+              <a:effectLst/>
+              <a:latin typeface="+mn-lt"/>
+            </a:endParaRPr>
+          </a:p>
+          <a:p>
+            <a:r>
+              <a:rPr lang="en-GB" b="0" dirty="0">
+                <a:solidFill>
+                  <a:srgbClr val="6796E6"/>
+                </a:solidFill>
+                <a:effectLst/>
+                <a:latin typeface="+mn-lt"/>
+              </a:rPr>
+              <a:t>-</a:t>
+            </a:r>
+            <a:r>
+              <a:rPr lang="en-GB" b="0" dirty="0">
+                <a:solidFill>
+                  <a:srgbClr val="CCCCCC"/>
+                </a:solidFill>
+                <a:effectLst/>
+                <a:latin typeface="+mn-lt"/>
+              </a:rPr>
+              <a:t> </a:t>
+            </a:r>
+            <a:r>
+              <a:rPr lang="en-GB" b="1" dirty="0">
+                <a:solidFill>
+                  <a:srgbClr val="569CD6"/>
+                </a:solidFill>
+                <a:effectLst/>
+                <a:latin typeface="+mn-lt"/>
+              </a:rPr>
+              <a:t>Logistic Regression: </a:t>
+            </a:r>
+            <a:r>
+              <a:rPr lang="en-GB" b="0" dirty="0">
+                <a:solidFill>
+                  <a:srgbClr val="CCCCCC"/>
+                </a:solidFill>
+                <a:effectLst/>
+                <a:latin typeface="+mn-lt"/>
+              </a:rPr>
+              <a:t>Trained a logistic regression model as a baseline model.</a:t>
+            </a:r>
+          </a:p>
+          <a:p>
+            <a:r>
+              <a:rPr lang="en-GB" b="0" dirty="0">
+                <a:solidFill>
+                  <a:srgbClr val="6796E6"/>
+                </a:solidFill>
+                <a:effectLst/>
+                <a:latin typeface="+mn-lt"/>
+              </a:rPr>
+              <a:t>-</a:t>
+            </a:r>
+            <a:r>
+              <a:rPr lang="en-GB" b="0" dirty="0">
+                <a:solidFill>
+                  <a:srgbClr val="CCCCCC"/>
+                </a:solidFill>
+                <a:effectLst/>
+                <a:latin typeface="+mn-lt"/>
+              </a:rPr>
+              <a:t> </a:t>
+            </a:r>
+            <a:r>
+              <a:rPr lang="en-GB" b="1" dirty="0">
+                <a:solidFill>
+                  <a:srgbClr val="569CD6"/>
+                </a:solidFill>
+                <a:effectLst/>
+                <a:latin typeface="+mn-lt"/>
+              </a:rPr>
+              <a:t>Random Forest:</a:t>
+            </a:r>
+            <a:r>
+              <a:rPr lang="en-GB" b="0" dirty="0">
+                <a:solidFill>
+                  <a:srgbClr val="CCCCCC"/>
+                </a:solidFill>
+                <a:effectLst/>
+                <a:latin typeface="+mn-lt"/>
+              </a:rPr>
+              <a:t> Implemented a random forest classifier to capture non-linear relationships between features. We will also determine which features are the most important and can influence diabetes predictions.</a:t>
+            </a:r>
+          </a:p>
+          <a:p>
+            <a:r>
+              <a:rPr lang="en-GB" b="0" dirty="0">
+                <a:solidFill>
+                  <a:srgbClr val="6796E6"/>
+                </a:solidFill>
+                <a:effectLst/>
+                <a:latin typeface="+mn-lt"/>
+              </a:rPr>
+              <a:t>-</a:t>
+            </a:r>
+            <a:r>
+              <a:rPr lang="en-GB" b="0" dirty="0">
+                <a:solidFill>
+                  <a:srgbClr val="CCCCCC"/>
+                </a:solidFill>
+                <a:effectLst/>
+                <a:latin typeface="+mn-lt"/>
+              </a:rPr>
+              <a:t> </a:t>
+            </a:r>
+            <a:r>
+              <a:rPr lang="en-GB" b="1" dirty="0">
+                <a:solidFill>
+                  <a:srgbClr val="569CD6"/>
+                </a:solidFill>
+                <a:effectLst/>
+                <a:latin typeface="+mn-lt"/>
+              </a:rPr>
+              <a:t>Decision Tree:</a:t>
+            </a:r>
+            <a:r>
+              <a:rPr lang="en-GB" b="0" dirty="0">
+                <a:solidFill>
+                  <a:srgbClr val="CCCCCC"/>
+                </a:solidFill>
+                <a:effectLst/>
+                <a:latin typeface="+mn-lt"/>
+              </a:rPr>
+              <a:t> Built a decision tree classifier to understand the decision-making process.</a:t>
+            </a:r>
+          </a:p>
+          <a:p>
+            <a:r>
+              <a:rPr lang="en-GB" b="0" dirty="0">
+                <a:solidFill>
+                  <a:srgbClr val="6796E6"/>
+                </a:solidFill>
+                <a:effectLst/>
+                <a:latin typeface="+mn-lt"/>
+              </a:rPr>
+              <a:t>-</a:t>
+            </a:r>
+            <a:r>
+              <a:rPr lang="en-GB" b="0" dirty="0">
+                <a:solidFill>
+                  <a:srgbClr val="CCCCCC"/>
+                </a:solidFill>
+                <a:effectLst/>
+                <a:latin typeface="+mn-lt"/>
+              </a:rPr>
+              <a:t> </a:t>
+            </a:r>
+            <a:r>
+              <a:rPr lang="en-GB" b="1" dirty="0">
+                <a:solidFill>
+                  <a:srgbClr val="569CD6"/>
+                </a:solidFill>
+                <a:effectLst/>
+                <a:latin typeface="+mn-lt"/>
+              </a:rPr>
+              <a:t>Support Vector Machine (SVM):</a:t>
+            </a:r>
+            <a:r>
+              <a:rPr lang="en-GB" b="0" dirty="0">
+                <a:solidFill>
+                  <a:srgbClr val="CCCCCC"/>
+                </a:solidFill>
+                <a:effectLst/>
+                <a:latin typeface="+mn-lt"/>
+              </a:rPr>
+              <a:t> Employed SVM with different kernels (linear, polynomial, and radial basis function) to find the best separating hyperplane. In this project, a linear kernel was selected due to its computational efficiency, which is advantageous for large datasets.</a:t>
+            </a:r>
+          </a:p>
+          <a:p>
+            <a:r>
+              <a:rPr lang="en-GB" b="0" dirty="0">
+                <a:solidFill>
+                  <a:srgbClr val="6796E6"/>
+                </a:solidFill>
+                <a:effectLst/>
+                <a:latin typeface="+mn-lt"/>
+              </a:rPr>
+              <a:t>-</a:t>
+            </a:r>
+            <a:r>
+              <a:rPr lang="en-GB" b="0" dirty="0">
+                <a:solidFill>
+                  <a:srgbClr val="CCCCCC"/>
+                </a:solidFill>
+                <a:effectLst/>
+                <a:latin typeface="+mn-lt"/>
+              </a:rPr>
+              <a:t> </a:t>
+            </a:r>
+            <a:r>
+              <a:rPr lang="en-GB" b="1" dirty="0">
+                <a:solidFill>
+                  <a:srgbClr val="569CD6"/>
+                </a:solidFill>
+                <a:effectLst/>
+                <a:latin typeface="+mn-lt"/>
+              </a:rPr>
+              <a:t>K-Nearest </a:t>
+            </a:r>
+            <a:r>
+              <a:rPr lang="en-GB" b="1" dirty="0" err="1">
+                <a:solidFill>
+                  <a:srgbClr val="569CD6"/>
+                </a:solidFill>
+                <a:effectLst/>
+                <a:latin typeface="+mn-lt"/>
+              </a:rPr>
+              <a:t>Neighbors</a:t>
+            </a:r>
+            <a:r>
+              <a:rPr lang="en-GB" b="1" dirty="0">
+                <a:solidFill>
+                  <a:srgbClr val="569CD6"/>
+                </a:solidFill>
+                <a:effectLst/>
+                <a:latin typeface="+mn-lt"/>
+              </a:rPr>
+              <a:t> (KNN):</a:t>
+            </a:r>
+            <a:r>
+              <a:rPr lang="en-GB" b="0" dirty="0">
+                <a:solidFill>
+                  <a:srgbClr val="CCCCCC"/>
+                </a:solidFill>
+                <a:effectLst/>
+                <a:latin typeface="+mn-lt"/>
+              </a:rPr>
+              <a:t> Implemented KNN to classify data points based on the majority class of their nearest neighbours.</a:t>
+            </a:r>
+          </a:p>
+          <a:p>
+            <a:r>
+              <a:rPr lang="en-GB" b="0" dirty="0">
+                <a:solidFill>
+                  <a:srgbClr val="6796E6"/>
+                </a:solidFill>
+                <a:effectLst/>
+                <a:latin typeface="+mn-lt"/>
+              </a:rPr>
+              <a:t>-</a:t>
+            </a:r>
+            <a:r>
+              <a:rPr lang="en-GB" b="0" dirty="0">
+                <a:solidFill>
+                  <a:srgbClr val="CCCCCC"/>
+                </a:solidFill>
+                <a:effectLst/>
+                <a:latin typeface="+mn-lt"/>
+              </a:rPr>
+              <a:t> </a:t>
+            </a:r>
+            <a:r>
+              <a:rPr lang="en-GB" b="1" dirty="0">
+                <a:solidFill>
+                  <a:srgbClr val="569CD6"/>
+                </a:solidFill>
+                <a:effectLst/>
+                <a:latin typeface="+mn-lt"/>
+              </a:rPr>
+              <a:t>Neural Network:</a:t>
+            </a:r>
+            <a:r>
+              <a:rPr lang="en-GB" b="0" dirty="0">
+                <a:solidFill>
+                  <a:srgbClr val="CCCCCC"/>
+                </a:solidFill>
+                <a:effectLst/>
+                <a:latin typeface="+mn-lt"/>
+              </a:rPr>
+              <a:t> Constructed a Neural Network with multiple hidden layers using TensorFlow.</a:t>
+            </a:r>
+          </a:p>
+          <a:p>
+            <a:endParaRPr lang="en-GB" b="1" dirty="0">
+              <a:solidFill>
+                <a:srgbClr val="569CD6"/>
+              </a:solidFill>
+              <a:effectLst/>
+              <a:latin typeface="+mn-lt"/>
+            </a:endParaRPr>
+          </a:p>
+          <a:p>
+            <a:r>
+              <a:rPr lang="en-GB" b="1" dirty="0">
+                <a:solidFill>
+                  <a:srgbClr val="569CD6"/>
+                </a:solidFill>
+                <a:effectLst/>
+                <a:latin typeface="+mn-lt"/>
+              </a:rPr>
+              <a:t>Tuning and Optimisation:</a:t>
+            </a:r>
+          </a:p>
+          <a:p>
+            <a:r>
+              <a:rPr lang="en-GB" b="1" dirty="0">
+                <a:solidFill>
+                  <a:srgbClr val="569CD6"/>
+                </a:solidFill>
+                <a:effectLst/>
+                <a:latin typeface="+mn-lt"/>
+              </a:rPr>
+              <a:t>Hyperparameter Tuning:</a:t>
+            </a:r>
+            <a:endParaRPr lang="en-GB" b="0" dirty="0">
+              <a:solidFill>
+                <a:srgbClr val="CCCCCC"/>
+              </a:solidFill>
+              <a:effectLst/>
+              <a:latin typeface="+mn-lt"/>
+            </a:endParaRPr>
+          </a:p>
+          <a:p>
+            <a:r>
+              <a:rPr lang="en-GB" b="0" dirty="0">
+                <a:solidFill>
+                  <a:srgbClr val="6796E6"/>
+                </a:solidFill>
+                <a:effectLst/>
+                <a:latin typeface="+mn-lt"/>
+              </a:rPr>
+              <a:t>-</a:t>
+            </a:r>
+            <a:r>
+              <a:rPr lang="en-GB" b="0" dirty="0">
+                <a:solidFill>
+                  <a:srgbClr val="CCCCCC"/>
+                </a:solidFill>
+                <a:effectLst/>
+                <a:latin typeface="+mn-lt"/>
+              </a:rPr>
+              <a:t> Utilised </a:t>
+            </a:r>
+            <a:r>
+              <a:rPr lang="en-GB" b="1" dirty="0" err="1">
+                <a:solidFill>
+                  <a:srgbClr val="569CD6"/>
+                </a:solidFill>
+                <a:effectLst/>
+                <a:latin typeface="+mn-lt"/>
+              </a:rPr>
+              <a:t>GridSearchCV</a:t>
+            </a:r>
+            <a:r>
+              <a:rPr lang="en-GB" b="0" dirty="0">
+                <a:solidFill>
+                  <a:srgbClr val="CCCCCC"/>
+                </a:solidFill>
+                <a:effectLst/>
+                <a:latin typeface="+mn-lt"/>
+              </a:rPr>
+              <a:t> to tune hyperparameters for Logistic Regression, Random Forest, Decision Tree, SVM and KNN.</a:t>
+            </a:r>
+          </a:p>
+          <a:p>
+            <a:r>
+              <a:rPr lang="en-GB" b="1" dirty="0">
+                <a:solidFill>
+                  <a:srgbClr val="569CD6"/>
+                </a:solidFill>
+                <a:effectLst/>
+                <a:latin typeface="+mn-lt"/>
+              </a:rPr>
+              <a:t>Neural Network Optimisation:</a:t>
+            </a:r>
+            <a:endParaRPr lang="en-GB" b="0" dirty="0">
+              <a:solidFill>
+                <a:srgbClr val="CCCCCC"/>
+              </a:solidFill>
+              <a:effectLst/>
+              <a:latin typeface="+mn-lt"/>
+            </a:endParaRPr>
+          </a:p>
+          <a:p>
+            <a:r>
+              <a:rPr lang="en-GB" b="0" dirty="0">
+                <a:solidFill>
+                  <a:srgbClr val="6796E6"/>
+                </a:solidFill>
+                <a:effectLst/>
+                <a:latin typeface="+mn-lt"/>
+              </a:rPr>
+              <a:t>-</a:t>
+            </a:r>
+            <a:r>
+              <a:rPr lang="en-GB" b="0" dirty="0">
+                <a:solidFill>
+                  <a:srgbClr val="CCCCCC"/>
+                </a:solidFill>
+                <a:effectLst/>
+                <a:latin typeface="+mn-lt"/>
+              </a:rPr>
+              <a:t> Used </a:t>
+            </a:r>
+            <a:r>
+              <a:rPr lang="en-GB" b="1" dirty="0" err="1">
+                <a:solidFill>
+                  <a:srgbClr val="569CD6"/>
+                </a:solidFill>
+                <a:effectLst/>
+                <a:latin typeface="+mn-lt"/>
+              </a:rPr>
+              <a:t>Keras</a:t>
+            </a:r>
+            <a:r>
+              <a:rPr lang="en-GB" b="1" dirty="0">
+                <a:solidFill>
+                  <a:srgbClr val="569CD6"/>
+                </a:solidFill>
+                <a:effectLst/>
+                <a:latin typeface="+mn-lt"/>
+              </a:rPr>
+              <a:t> Tuner</a:t>
+            </a:r>
+            <a:r>
+              <a:rPr lang="en-GB" b="0" dirty="0">
+                <a:solidFill>
+                  <a:srgbClr val="CCCCCC"/>
+                </a:solidFill>
+                <a:effectLst/>
+                <a:latin typeface="+mn-lt"/>
+              </a:rPr>
+              <a:t> to perform hyperparameter optimisation for the Neural Network model, including the number of hidden layers, neurons per layer, activation functions, and learning rate.</a:t>
+            </a:r>
+          </a:p>
+          <a:p>
+            <a:endParaRPr lang="en-US" dirty="0">
+              <a:latin typeface="+mn-lt"/>
+            </a:endParaRPr>
+          </a:p>
+        </p:txBody>
+      </p:sp>
+      <p:sp>
+        <p:nvSpPr>
+          <p:cNvPr id="4" name="Slide Number Placeholder 3"/>
+          <p:cNvSpPr>
+            <a:spLocks noGrp="1"/>
+          </p:cNvSpPr>
+          <p:nvPr>
+            <p:ph type="sldNum" sz="quarter" idx="5"/>
+          </p:nvPr>
+        </p:nvSpPr>
+        <p:spPr/>
+        <p:txBody>
+          <a:bodyPr/>
+          <a:lstStyle/>
+          <a:p>
+            <a:fld id="{4D7E02E5-87D3-E448-947F-831956D1A2E7}" type="slidenum">
+              <a:rPr lang="en-US" smtClean="0"/>
+              <a:t>4</a:t>
+            </a:fld>
+            <a:endParaRPr lang="en-US"/>
+          </a:p>
+        </p:txBody>
+      </p:sp>
+    </p:spTree>
+    <p:extLst>
+      <p:ext uri="{BB962C8B-B14F-4D97-AF65-F5344CB8AC3E}">
+        <p14:creationId xmlns:p14="http://schemas.microsoft.com/office/powerpoint/2010/main" val="1425259791"/>
+      </p:ext>
+    </p:extLst>
+  </p:cSld>
+  <p:clrMapOvr>
+    <a:masterClrMapping/>
+  </p:clrMapOvr>
+</p:notes>
+</file>
+
+<file path=ppt/notesSlides/notesSlide5.xml><?xml version="1.0" encoding="utf-8"?>
+<p:notes xmlns:a="http://schemas.openxmlformats.org/drawingml/2006/main" xmlns:r="http://schemas.openxmlformats.org/officeDocument/2006/relationships" xmlns:p="http://schemas.openxmlformats.org/presentationml/2006/main">
+  <p:cSld>
+    <p:spTree>
+      <p:nvGrpSpPr>
+        <p:cNvPr id="1" name=""/>
+        <p:cNvGrpSpPr/>
+        <p:nvPr/>
+      </p:nvGrpSpPr>
+      <p:grpSpPr>
+        <a:xfrm>
+          <a:off x="0" y="0"/>
+          <a:ext cx="0" cy="0"/>
+          <a:chOff x="0" y="0"/>
+          <a:chExt cx="0" cy="0"/>
+        </a:xfrm>
+      </p:grpSpPr>
+      <p:sp>
+        <p:nvSpPr>
+          <p:cNvPr id="2" name="Slide Image Placeholder 1"/>
+          <p:cNvSpPr>
+            <a:spLocks noGrp="1" noRot="1" noChangeAspect="1"/>
+          </p:cNvSpPr>
+          <p:nvPr>
+            <p:ph type="sldImg"/>
+          </p:nvPr>
+        </p:nvSpPr>
+        <p:spPr/>
+      </p:sp>
+      <p:sp>
+        <p:nvSpPr>
+          <p:cNvPr id="3" name="Notes Placeholder 2"/>
+          <p:cNvSpPr>
+            <a:spLocks noGrp="1"/>
+          </p:cNvSpPr>
+          <p:nvPr>
+            <p:ph type="body" idx="1"/>
+          </p:nvPr>
+        </p:nvSpPr>
+        <p:spPr/>
+        <p:txBody>
+          <a:bodyPr/>
+          <a:lstStyle/>
+          <a:p>
+            <a:r>
               <a:rPr lang="en-GB" b="0" dirty="0">
                 <a:solidFill>
                   <a:srgbClr val="CCCCCC"/>
@@ -1870,7 +1954,7 @@
 </p:notes>
 </file>
 
-<file path=ppt/notesSlides/notesSlide5.xml><?xml version="1.0" encoding="utf-8"?>
+<file path=ppt/notesSlides/notesSlide6.xml><?xml version="1.0" encoding="utf-8"?>
 <p:notes xmlns:a="http://schemas.openxmlformats.org/drawingml/2006/main" xmlns:r="http://schemas.openxmlformats.org/officeDocument/2006/relationships" xmlns:p="http://schemas.openxmlformats.org/presentationml/2006/main">
   <p:cSld>
     <p:spTree>
@@ -4932,10 +5016,10 @@
             </a:pathLst>
           </a:custGeom>
           <a:blipFill>
-            <a:blip r:embed="rId2">
+            <a:blip r:embed="rId3">
               <a:extLst>
                 <a:ext uri="{96DAC541-7B7A-43D3-8B79-37D633B846F1}">
-                  <asvg:svgBlip xmlns:asvg="http://schemas.microsoft.com/office/drawing/2016/SVG/main" r:embed="rId3"/>
+                  <asvg:svgBlip xmlns:asvg="http://schemas.microsoft.com/office/drawing/2016/SVG/main" r:embed="rId4"/>
                 </a:ext>
               </a:extLst>
             </a:blip>
@@ -4984,10 +5068,10 @@
             </a:pathLst>
           </a:custGeom>
           <a:blipFill>
-            <a:blip r:embed="rId4">
+            <a:blip r:embed="rId5">
               <a:extLst>
                 <a:ext uri="{96DAC541-7B7A-43D3-8B79-37D633B846F1}">
-                  <asvg:svgBlip xmlns:asvg="http://schemas.microsoft.com/office/drawing/2016/SVG/main" r:embed="rId5"/>
+                  <asvg:svgBlip xmlns:asvg="http://schemas.microsoft.com/office/drawing/2016/SVG/main" r:embed="rId6"/>
                 </a:ext>
               </a:extLst>
             </a:blip>
@@ -5036,10 +5120,10 @@
             </a:pathLst>
           </a:custGeom>
           <a:blipFill>
-            <a:blip r:embed="rId2">
+            <a:blip r:embed="rId3">
               <a:extLst>
                 <a:ext uri="{96DAC541-7B7A-43D3-8B79-37D633B846F1}">
-                  <asvg:svgBlip xmlns:asvg="http://schemas.microsoft.com/office/drawing/2016/SVG/main" r:embed="rId3"/>
+                  <asvg:svgBlip xmlns:asvg="http://schemas.microsoft.com/office/drawing/2016/SVG/main" r:embed="rId4"/>
                 </a:ext>
               </a:extLst>
             </a:blip>
@@ -5088,10 +5172,10 @@
             </a:pathLst>
           </a:custGeom>
           <a:blipFill>
-            <a:blip r:embed="rId2">
+            <a:blip r:embed="rId3">
               <a:extLst>
                 <a:ext uri="{96DAC541-7B7A-43D3-8B79-37D633B846F1}">
-                  <asvg:svgBlip xmlns:asvg="http://schemas.microsoft.com/office/drawing/2016/SVG/main" r:embed="rId3"/>
+                  <asvg:svgBlip xmlns:asvg="http://schemas.microsoft.com/office/drawing/2016/SVG/main" r:embed="rId4"/>
                 </a:ext>
               </a:extLst>
             </a:blip>
@@ -5140,10 +5224,10 @@
             </a:pathLst>
           </a:custGeom>
           <a:blipFill>
-            <a:blip r:embed="rId2">
+            <a:blip r:embed="rId3">
               <a:extLst>
                 <a:ext uri="{96DAC541-7B7A-43D3-8B79-37D633B846F1}">
-                  <asvg:svgBlip xmlns:asvg="http://schemas.microsoft.com/office/drawing/2016/SVG/main" r:embed="rId3"/>
+                  <asvg:svgBlip xmlns:asvg="http://schemas.microsoft.com/office/drawing/2016/SVG/main" r:embed="rId4"/>
                 </a:ext>
               </a:extLst>
             </a:blip>
@@ -5289,10 +5373,10 @@
             </a:pathLst>
           </a:custGeom>
           <a:blipFill>
-            <a:blip r:embed="rId6">
+            <a:blip r:embed="rId7">
               <a:extLst>
                 <a:ext uri="{96DAC541-7B7A-43D3-8B79-37D633B846F1}">
-                  <asvg:svgBlip xmlns:asvg="http://schemas.microsoft.com/office/drawing/2016/SVG/main" r:embed="rId7"/>
+                  <asvg:svgBlip xmlns:asvg="http://schemas.microsoft.com/office/drawing/2016/SVG/main" r:embed="rId8"/>
                 </a:ext>
               </a:extLst>
             </a:blip>
@@ -5523,10 +5607,10 @@
             </a:pathLst>
           </a:custGeom>
           <a:blipFill>
-            <a:blip r:embed="rId8">
+            <a:blip r:embed="rId9">
               <a:extLst>
                 <a:ext uri="{96DAC541-7B7A-43D3-8B79-37D633B846F1}">
-                  <asvg:svgBlip xmlns:asvg="http://schemas.microsoft.com/office/drawing/2016/SVG/main" r:embed="rId9"/>
+                  <asvg:svgBlip xmlns:asvg="http://schemas.microsoft.com/office/drawing/2016/SVG/main" r:embed="rId10"/>
                 </a:ext>
               </a:extLst>
             </a:blip>
@@ -5575,10 +5659,10 @@
             </a:pathLst>
           </a:custGeom>
           <a:blipFill>
-            <a:blip r:embed="rId10">
+            <a:blip r:embed="rId11">
               <a:extLst>
                 <a:ext uri="{96DAC541-7B7A-43D3-8B79-37D633B846F1}">
-                  <asvg:svgBlip xmlns:asvg="http://schemas.microsoft.com/office/drawing/2016/SVG/main" r:embed="rId11"/>
+                  <asvg:svgBlip xmlns:asvg="http://schemas.microsoft.com/office/drawing/2016/SVG/main" r:embed="rId12"/>
                 </a:ext>
               </a:extLst>
             </a:blip>
@@ -6607,7 +6691,7 @@
               </a:lnSpc>
             </a:pPr>
             <a:r>
-              <a:rPr lang="en-US" sz="6500">
+              <a:rPr lang="en-US" sz="6500" dirty="0">
                 <a:solidFill>
                   <a:srgbClr val="222366"/>
                 </a:solidFill>
@@ -8555,7 +8639,7 @@
         <p:spPr>
           <a:xfrm>
             <a:off x="921119" y="7307247"/>
-            <a:ext cx="4592262" cy="1906612"/>
+            <a:ext cx="4592262" cy="2393925"/>
           </a:xfrm>
           <a:prstGeom prst="rect">
             <a:avLst/>
@@ -8579,7 +8663,23 @@
                 </a:solidFill>
                 <a:latin typeface="Public Sans"/>
               </a:rPr>
-              <a:t>Employed SVM with different kernels to find the best separating hyperplane. (Linear kernel )</a:t>
+              <a:t>Employed SVM with different kernels to find the best separating hyperplane. (Chosen Kernel:</a:t>
+            </a:r>
+          </a:p>
+          <a:p>
+            <a:pPr algn="ctr">
+              <a:lnSpc>
+                <a:spcPts val="3762"/>
+              </a:lnSpc>
+            </a:pPr>
+            <a:r>
+              <a:rPr lang="en-GB" sz="2687" dirty="0">
+                <a:solidFill>
+                  <a:srgbClr val="222366"/>
+                </a:solidFill>
+                <a:latin typeface="Public Sans"/>
+              </a:rPr>
+              <a:t>Linear )</a:t>
             </a:r>
           </a:p>
         </p:txBody>

</xml_diff>

<commit_message>
results presented in tables
</commit_message>
<xml_diff>
--- a/presentation/presentation.pptx
+++ b/presentation/presentation.pptx
@@ -1760,6 +1760,192 @@
             <a:r>
               <a:rPr lang="en-GB" b="0" dirty="0">
                 <a:solidFill>
+                  <a:srgbClr val="6796E6"/>
+                </a:solidFill>
+                <a:effectLst/>
+                <a:latin typeface="+mn-lt"/>
+              </a:rPr>
+              <a:t>-</a:t>
+            </a:r>
+            <a:r>
+              <a:rPr lang="en-GB" b="0" dirty="0">
+                <a:solidFill>
+                  <a:srgbClr val="CCCCCC"/>
+                </a:solidFill>
+                <a:effectLst/>
+                <a:latin typeface="+mn-lt"/>
+              </a:rPr>
+              <a:t> Confusion matrix: Analysed true positive, false positive, true negative, and false negative predictions.</a:t>
+            </a:r>
+          </a:p>
+          <a:p>
+            <a:r>
+              <a:rPr lang="en-GB" b="0" dirty="0">
+                <a:solidFill>
+                  <a:srgbClr val="6796E6"/>
+                </a:solidFill>
+                <a:effectLst/>
+                <a:latin typeface="+mn-lt"/>
+              </a:rPr>
+              <a:t>-</a:t>
+            </a:r>
+            <a:r>
+              <a:rPr lang="en-GB" b="0" dirty="0">
+                <a:solidFill>
+                  <a:srgbClr val="CCCCCC"/>
+                </a:solidFill>
+                <a:effectLst/>
+                <a:latin typeface="+mn-lt"/>
+              </a:rPr>
+              <a:t> Metrics: Calculated accuracy, precision, recall, F1-score to assess model performance.</a:t>
+            </a:r>
+          </a:p>
+          <a:p>
+            <a:r>
+              <a:rPr lang="en-GB" b="0" dirty="0">
+                <a:solidFill>
+                  <a:srgbClr val="6796E6"/>
+                </a:solidFill>
+                <a:effectLst/>
+                <a:latin typeface="+mn-lt"/>
+              </a:rPr>
+              <a:t>-</a:t>
+            </a:r>
+            <a:r>
+              <a:rPr lang="en-GB" b="0" dirty="0">
+                <a:solidFill>
+                  <a:srgbClr val="CCCCCC"/>
+                </a:solidFill>
+                <a:effectLst/>
+                <a:latin typeface="+mn-lt"/>
+              </a:rPr>
+              <a:t> ROC curve and AUC-ROC: Plotted the Receiver Operating Characteristic (ROC) curve and calculated the Area Under the Curve (AUC) to evaluate model discrimination.</a:t>
+            </a:r>
+          </a:p>
+          <a:p>
+            <a:r>
+              <a:rPr lang="en-GB" b="0" dirty="0">
+                <a:solidFill>
+                  <a:srgbClr val="6796E6"/>
+                </a:solidFill>
+                <a:effectLst/>
+                <a:latin typeface="+mn-lt"/>
+              </a:rPr>
+              <a:t>-</a:t>
+            </a:r>
+            <a:r>
+              <a:rPr lang="en-GB" b="0" dirty="0">
+                <a:solidFill>
+                  <a:srgbClr val="CCCCCC"/>
+                </a:solidFill>
+                <a:effectLst/>
+                <a:latin typeface="+mn-lt"/>
+              </a:rPr>
+              <a:t> Precision-recall curve: Visualised the trade-off between precision and recall for different threshold </a:t>
+            </a:r>
+            <a:r>
+              <a:rPr lang="en-GB" b="0">
+                <a:solidFill>
+                  <a:srgbClr val="CCCCCC"/>
+                </a:solidFill>
+                <a:effectLst/>
+                <a:latin typeface="+mn-lt"/>
+              </a:rPr>
+              <a:t>values.</a:t>
+            </a:r>
+            <a:endParaRPr lang="en-GB" b="0" dirty="0">
+              <a:solidFill>
+                <a:srgbClr val="CCCCCC"/>
+              </a:solidFill>
+              <a:effectLst/>
+              <a:latin typeface="+mn-lt"/>
+            </a:endParaRPr>
+          </a:p>
+        </p:txBody>
+      </p:sp>
+      <p:sp>
+        <p:nvSpPr>
+          <p:cNvPr id="4" name="Slide Number Placeholder 3"/>
+          <p:cNvSpPr>
+            <a:spLocks noGrp="1"/>
+          </p:cNvSpPr>
+          <p:nvPr>
+            <p:ph type="sldNum" sz="quarter" idx="5"/>
+          </p:nvPr>
+        </p:nvSpPr>
+        <p:spPr/>
+        <p:txBody>
+          <a:bodyPr/>
+          <a:lstStyle/>
+          <a:p>
+            <a:fld id="{4D7E02E5-87D3-E448-947F-831956D1A2E7}" type="slidenum">
+              <a:rPr lang="en-US" smtClean="0"/>
+              <a:t>5</a:t>
+            </a:fld>
+            <a:endParaRPr lang="en-US"/>
+          </a:p>
+        </p:txBody>
+      </p:sp>
+    </p:spTree>
+    <p:extLst>
+      <p:ext uri="{BB962C8B-B14F-4D97-AF65-F5344CB8AC3E}">
+        <p14:creationId xmlns:p14="http://schemas.microsoft.com/office/powerpoint/2010/main" val="3079719596"/>
+      </p:ext>
+    </p:extLst>
+  </p:cSld>
+  <p:clrMapOvr>
+    <a:masterClrMapping/>
+  </p:clrMapOvr>
+</p:notes>
+</file>
+
+<file path=ppt/notesSlides/notesSlide6.xml><?xml version="1.0" encoding="utf-8"?>
+<p:notes xmlns:a="http://schemas.openxmlformats.org/drawingml/2006/main" xmlns:r="http://schemas.openxmlformats.org/officeDocument/2006/relationships" xmlns:p="http://schemas.openxmlformats.org/presentationml/2006/main">
+  <p:cSld>
+    <p:spTree>
+      <p:nvGrpSpPr>
+        <p:cNvPr id="1" name=""/>
+        <p:cNvGrpSpPr/>
+        <p:nvPr/>
+      </p:nvGrpSpPr>
+      <p:grpSpPr>
+        <a:xfrm>
+          <a:off x="0" y="0"/>
+          <a:ext cx="0" cy="0"/>
+          <a:chOff x="0" y="0"/>
+          <a:chExt cx="0" cy="0"/>
+        </a:xfrm>
+      </p:grpSpPr>
+      <p:sp>
+        <p:nvSpPr>
+          <p:cNvPr id="2" name="Slide Image Placeholder 1"/>
+          <p:cNvSpPr>
+            <a:spLocks noGrp="1" noRot="1" noChangeAspect="1"/>
+          </p:cNvSpPr>
+          <p:nvPr>
+            <p:ph type="sldImg"/>
+          </p:nvPr>
+        </p:nvSpPr>
+        <p:spPr/>
+      </p:sp>
+      <p:sp>
+        <p:nvSpPr>
+          <p:cNvPr id="3" name="Notes Placeholder 2"/>
+          <p:cNvSpPr>
+            <a:spLocks noGrp="1"/>
+          </p:cNvSpPr>
+          <p:nvPr>
+            <p:ph type="body" idx="1"/>
+          </p:nvPr>
+        </p:nvSpPr>
+        <p:spPr/>
+        <p:txBody>
+          <a:bodyPr/>
+          <a:lstStyle/>
+          <a:p>
+            <a:r>
+              <a:rPr lang="en-GB" b="0" dirty="0">
+                <a:solidFill>
                   <a:srgbClr val="CCCCCC"/>
                 </a:solidFill>
                 <a:effectLst/>
@@ -1954,7 +2140,7 @@
 </p:notes>
 </file>
 
-<file path=ppt/notesSlides/notesSlide6.xml><?xml version="1.0" encoding="utf-8"?>
+<file path=ppt/notesSlides/notesSlide7.xml><?xml version="1.0" encoding="utf-8"?>
 <p:notes xmlns:a="http://schemas.openxmlformats.org/drawingml/2006/main" xmlns:r="http://schemas.openxmlformats.org/officeDocument/2006/relationships" xmlns:p="http://schemas.openxmlformats.org/presentationml/2006/main">
   <p:cSld>
     <p:spTree>
@@ -9400,7 +9586,7 @@
             </a:pathLst>
           </a:custGeom>
           <a:blipFill>
-            <a:blip r:embed="rId2"/>
+            <a:blip r:embed="rId3"/>
             <a:stretch>
               <a:fillRect/>
             </a:stretch>
@@ -9446,7 +9632,7 @@
             </a:pathLst>
           </a:custGeom>
           <a:blipFill>
-            <a:blip r:embed="rId3"/>
+            <a:blip r:embed="rId4"/>
             <a:stretch>
               <a:fillRect/>
             </a:stretch>
@@ -9606,10 +9792,10 @@
             </a:pathLst>
           </a:custGeom>
           <a:blipFill>
-            <a:blip r:embed="rId4">
+            <a:blip r:embed="rId5">
               <a:extLst>
                 <a:ext uri="{96DAC541-7B7A-43D3-8B79-37D633B846F1}">
-                  <asvg:svgBlip xmlns:asvg="http://schemas.microsoft.com/office/drawing/2016/SVG/main" r:embed="rId5"/>
+                  <asvg:svgBlip xmlns:asvg="http://schemas.microsoft.com/office/drawing/2016/SVG/main" r:embed="rId6"/>
                 </a:ext>
               </a:extLst>
             </a:blip>

</xml_diff>

<commit_message>
refined presentation - spelling errors, layout etc
</commit_message>
<xml_diff>
--- a/presentation/presentation.pptx
+++ b/presentation/presentation.pptx
@@ -25,29 +25,24 @@
   <p:notesSz cx="6858000" cy="9144000"/>
   <p:embeddedFontLst>
     <p:embeddedFont>
-      <p:font typeface="Aptos SemiBold" panose="020B0004020202020204" pitchFamily="34" charset="0"/>
-      <p:bold r:id="rId15"/>
-      <p:boldItalic r:id="rId16"/>
+      <p:font typeface="Brick Sans" panose="020B0604020202020204" charset="0"/>
+      <p:regular r:id="rId15"/>
     </p:embeddedFont>
     <p:embeddedFont>
-      <p:font typeface="Brick Sans" panose="020B0604020202020204" charset="0"/>
+      <p:font typeface="Canva Sans" panose="020B0604020202020204" charset="0"/>
+      <p:regular r:id="rId16"/>
+    </p:embeddedFont>
+    <p:embeddedFont>
+      <p:font typeface="Public Sans" panose="020B0604020202020204" charset="0"/>
       <p:regular r:id="rId17"/>
     </p:embeddedFont>
     <p:embeddedFont>
-      <p:font typeface="Canva Sans" panose="020B0604020202020204" charset="0"/>
+      <p:font typeface="Public Sans Bold" panose="020B0604020202020204" charset="0"/>
       <p:regular r:id="rId18"/>
     </p:embeddedFont>
     <p:embeddedFont>
-      <p:font typeface="Public Sans" panose="020B0604020202020204" charset="0"/>
+      <p:font typeface="Public Sans Heavy" panose="020B0604020202020204" charset="0"/>
       <p:regular r:id="rId19"/>
-    </p:embeddedFont>
-    <p:embeddedFont>
-      <p:font typeface="Public Sans Bold" panose="020B0604020202020204" charset="0"/>
-      <p:regular r:id="rId20"/>
-    </p:embeddedFont>
-    <p:embeddedFont>
-      <p:font typeface="Public Sans Heavy" panose="020B0604020202020204" charset="0"/>
-      <p:regular r:id="rId21"/>
     </p:embeddedFont>
   </p:embeddedFontLst>
   <p:defaultTextStyle>
@@ -164,6 +159,358 @@
 </p:presentation>
 </file>
 
+<file path=ppt/revisionInfo.xml><?xml version="1.0" encoding="utf-8"?>
+<p1510:revInfo xmlns:a="http://schemas.openxmlformats.org/drawingml/2006/main" xmlns:r="http://schemas.openxmlformats.org/officeDocument/2006/relationships" xmlns:p1510="http://schemas.microsoft.com/office/powerpoint/2015/10/main">
+  <p1510:revLst>
+    <p1510:client id="{650812C4-EEA9-4F2B-9F39-40FEADFCFB65}" v="13" dt="2024-04-03T13:53:16.051"/>
+  </p1510:revLst>
+</p1510:revInfo>
+</file>
+
+<file path=ppt/changesInfos/changesInfo1.xml><?xml version="1.0" encoding="utf-8"?>
+<pc:chgInfo xmlns:a="http://schemas.openxmlformats.org/drawingml/2006/main" xmlns:r="http://schemas.openxmlformats.org/officeDocument/2006/relationships" xmlns:ac="http://schemas.microsoft.com/office/drawing/2013/main/command" xmlns:pc="http://schemas.microsoft.com/office/powerpoint/2013/main/command">
+  <pc:docChgLst>
+    <pc:chgData name="Aysha Gheewala" userId="819ba6fb6ea0380f" providerId="LiveId" clId="{650812C4-EEA9-4F2B-9F39-40FEADFCFB65}"/>
+    <pc:docChg chg="undo redo custSel modSld">
+      <pc:chgData name="Aysha Gheewala" userId="819ba6fb6ea0380f" providerId="LiveId" clId="{650812C4-EEA9-4F2B-9F39-40FEADFCFB65}" dt="2024-04-03T14:01:04.041" v="209" actId="1038"/>
+      <pc:docMkLst>
+        <pc:docMk/>
+      </pc:docMkLst>
+      <pc:sldChg chg="modSp mod">
+        <pc:chgData name="Aysha Gheewala" userId="819ba6fb6ea0380f" providerId="LiveId" clId="{650812C4-EEA9-4F2B-9F39-40FEADFCFB65}" dt="2024-04-03T13:34:04.579" v="0" actId="20577"/>
+        <pc:sldMkLst>
+          <pc:docMk/>
+          <pc:sldMk cId="0" sldId="258"/>
+        </pc:sldMkLst>
+        <pc:spChg chg="mod">
+          <ac:chgData name="Aysha Gheewala" userId="819ba6fb6ea0380f" providerId="LiveId" clId="{650812C4-EEA9-4F2B-9F39-40FEADFCFB65}" dt="2024-04-03T13:34:04.579" v="0" actId="20577"/>
+          <ac:spMkLst>
+            <pc:docMk/>
+            <pc:sldMk cId="0" sldId="258"/>
+            <ac:spMk id="12" creationId="{00000000-0000-0000-0000-000000000000}"/>
+          </ac:spMkLst>
+        </pc:spChg>
+      </pc:sldChg>
+      <pc:sldChg chg="modSp mod">
+        <pc:chgData name="Aysha Gheewala" userId="819ba6fb6ea0380f" providerId="LiveId" clId="{650812C4-EEA9-4F2B-9F39-40FEADFCFB65}" dt="2024-04-03T13:38:51.195" v="25" actId="255"/>
+        <pc:sldMkLst>
+          <pc:docMk/>
+          <pc:sldMk cId="0" sldId="259"/>
+        </pc:sldMkLst>
+        <pc:spChg chg="mod">
+          <ac:chgData name="Aysha Gheewala" userId="819ba6fb6ea0380f" providerId="LiveId" clId="{650812C4-EEA9-4F2B-9F39-40FEADFCFB65}" dt="2024-04-03T13:38:51.195" v="25" actId="255"/>
+          <ac:spMkLst>
+            <pc:docMk/>
+            <pc:sldMk cId="0" sldId="259"/>
+            <ac:spMk id="49" creationId="{00000000-0000-0000-0000-000000000000}"/>
+          </ac:spMkLst>
+        </pc:spChg>
+        <pc:spChg chg="mod">
+          <ac:chgData name="Aysha Gheewala" userId="819ba6fb6ea0380f" providerId="LiveId" clId="{650812C4-EEA9-4F2B-9F39-40FEADFCFB65}" dt="2024-04-03T13:35:24.317" v="6" actId="1035"/>
+          <ac:spMkLst>
+            <pc:docMk/>
+            <pc:sldMk cId="0" sldId="259"/>
+            <ac:spMk id="54" creationId="{00000000-0000-0000-0000-000000000000}"/>
+          </ac:spMkLst>
+        </pc:spChg>
+      </pc:sldChg>
+      <pc:sldChg chg="modSp mod">
+        <pc:chgData name="Aysha Gheewala" userId="819ba6fb6ea0380f" providerId="LiveId" clId="{650812C4-EEA9-4F2B-9F39-40FEADFCFB65}" dt="2024-04-03T14:01:04.041" v="209" actId="1038"/>
+        <pc:sldMkLst>
+          <pc:docMk/>
+          <pc:sldMk cId="0" sldId="263"/>
+        </pc:sldMkLst>
+        <pc:spChg chg="mod">
+          <ac:chgData name="Aysha Gheewala" userId="819ba6fb6ea0380f" providerId="LiveId" clId="{650812C4-EEA9-4F2B-9F39-40FEADFCFB65}" dt="2024-04-03T14:01:04.041" v="209" actId="1038"/>
+          <ac:spMkLst>
+            <pc:docMk/>
+            <pc:sldMk cId="0" sldId="263"/>
+            <ac:spMk id="8" creationId="{00000000-0000-0000-0000-000000000000}"/>
+          </ac:spMkLst>
+        </pc:spChg>
+        <pc:graphicFrameChg chg="mod">
+          <ac:chgData name="Aysha Gheewala" userId="819ba6fb6ea0380f" providerId="LiveId" clId="{650812C4-EEA9-4F2B-9F39-40FEADFCFB65}" dt="2024-04-03T14:00:57.739" v="208" actId="1037"/>
+          <ac:graphicFrameMkLst>
+            <pc:docMk/>
+            <pc:sldMk cId="0" sldId="263"/>
+            <ac:graphicFrameMk id="6" creationId="{00000000-0000-0000-0000-000000000000}"/>
+          </ac:graphicFrameMkLst>
+        </pc:graphicFrameChg>
+      </pc:sldChg>
+      <pc:sldChg chg="addSp delSp modSp mod">
+        <pc:chgData name="Aysha Gheewala" userId="819ba6fb6ea0380f" providerId="LiveId" clId="{650812C4-EEA9-4F2B-9F39-40FEADFCFB65}" dt="2024-04-03T13:38:10.113" v="23" actId="1038"/>
+        <pc:sldMkLst>
+          <pc:docMk/>
+          <pc:sldMk cId="3462539987" sldId="265"/>
+        </pc:sldMkLst>
+        <pc:spChg chg="del">
+          <ac:chgData name="Aysha Gheewala" userId="819ba6fb6ea0380f" providerId="LiveId" clId="{650812C4-EEA9-4F2B-9F39-40FEADFCFB65}" dt="2024-04-03T13:37:49.510" v="15" actId="478"/>
+          <ac:spMkLst>
+            <pc:docMk/>
+            <pc:sldMk cId="3462539987" sldId="265"/>
+            <ac:spMk id="40" creationId="{00000000-0000-0000-0000-000000000000}"/>
+          </ac:spMkLst>
+        </pc:spChg>
+        <pc:spChg chg="mod">
+          <ac:chgData name="Aysha Gheewala" userId="819ba6fb6ea0380f" providerId="LiveId" clId="{650812C4-EEA9-4F2B-9F39-40FEADFCFB65}" dt="2024-04-03T13:37:04.080" v="13" actId="1035"/>
+          <ac:spMkLst>
+            <pc:docMk/>
+            <pc:sldMk cId="3462539987" sldId="265"/>
+            <ac:spMk id="43" creationId="{00000000-0000-0000-0000-000000000000}"/>
+          </ac:spMkLst>
+        </pc:spChg>
+        <pc:spChg chg="mod">
+          <ac:chgData name="Aysha Gheewala" userId="819ba6fb6ea0380f" providerId="LiveId" clId="{650812C4-EEA9-4F2B-9F39-40FEADFCFB65}" dt="2024-04-03T13:38:10.113" v="23" actId="1038"/>
+          <ac:spMkLst>
+            <pc:docMk/>
+            <pc:sldMk cId="3462539987" sldId="265"/>
+            <ac:spMk id="49" creationId="{00000000-0000-0000-0000-000000000000}"/>
+          </ac:spMkLst>
+        </pc:spChg>
+        <pc:spChg chg="mod">
+          <ac:chgData name="Aysha Gheewala" userId="819ba6fb6ea0380f" providerId="LiveId" clId="{650812C4-EEA9-4F2B-9F39-40FEADFCFB65}" dt="2024-04-03T13:35:35.110" v="9" actId="1035"/>
+          <ac:spMkLst>
+            <pc:docMk/>
+            <pc:sldMk cId="3462539987" sldId="265"/>
+            <ac:spMk id="54" creationId="{00000000-0000-0000-0000-000000000000}"/>
+          </ac:spMkLst>
+        </pc:spChg>
+        <pc:spChg chg="add mod">
+          <ac:chgData name="Aysha Gheewala" userId="819ba6fb6ea0380f" providerId="LiveId" clId="{650812C4-EEA9-4F2B-9F39-40FEADFCFB65}" dt="2024-04-03T13:37:46.061" v="14"/>
+          <ac:spMkLst>
+            <pc:docMk/>
+            <pc:sldMk cId="3462539987" sldId="265"/>
+            <ac:spMk id="55" creationId="{19CC46C9-4870-08A5-6D05-5252DDA12176}"/>
+          </ac:spMkLst>
+        </pc:spChg>
+      </pc:sldChg>
+      <pc:sldChg chg="addSp delSp modSp mod">
+        <pc:chgData name="Aysha Gheewala" userId="819ba6fb6ea0380f" providerId="LiveId" clId="{650812C4-EEA9-4F2B-9F39-40FEADFCFB65}" dt="2024-04-03T13:58:23.792" v="173" actId="1036"/>
+        <pc:sldMkLst>
+          <pc:docMk/>
+          <pc:sldMk cId="2676376378" sldId="266"/>
+        </pc:sldMkLst>
+        <pc:spChg chg="add mod">
+          <ac:chgData name="Aysha Gheewala" userId="819ba6fb6ea0380f" providerId="LiveId" clId="{650812C4-EEA9-4F2B-9F39-40FEADFCFB65}" dt="2024-04-03T13:39:56.817" v="26"/>
+          <ac:spMkLst>
+            <pc:docMk/>
+            <pc:sldMk cId="2676376378" sldId="266"/>
+            <ac:spMk id="2" creationId="{992CC301-3AD0-3305-9424-2A78F98731C9}"/>
+          </ac:spMkLst>
+        </pc:spChg>
+        <pc:spChg chg="del">
+          <ac:chgData name="Aysha Gheewala" userId="819ba6fb6ea0380f" providerId="LiveId" clId="{650812C4-EEA9-4F2B-9F39-40FEADFCFB65}" dt="2024-04-03T13:40:00.840" v="27" actId="478"/>
+          <ac:spMkLst>
+            <pc:docMk/>
+            <pc:sldMk cId="2676376378" sldId="266"/>
+            <ac:spMk id="11" creationId="{00000000-0000-0000-0000-000000000000}"/>
+          </ac:spMkLst>
+        </pc:spChg>
+        <pc:spChg chg="mod">
+          <ac:chgData name="Aysha Gheewala" userId="819ba6fb6ea0380f" providerId="LiveId" clId="{650812C4-EEA9-4F2B-9F39-40FEADFCFB65}" dt="2024-04-03T13:40:42.196" v="35" actId="1035"/>
+          <ac:spMkLst>
+            <pc:docMk/>
+            <pc:sldMk cId="2676376378" sldId="266"/>
+            <ac:spMk id="13" creationId="{00000000-0000-0000-0000-000000000000}"/>
+          </ac:spMkLst>
+        </pc:spChg>
+        <pc:picChg chg="mod">
+          <ac:chgData name="Aysha Gheewala" userId="819ba6fb6ea0380f" providerId="LiveId" clId="{650812C4-EEA9-4F2B-9F39-40FEADFCFB65}" dt="2024-04-03T13:58:23.792" v="173" actId="1036"/>
+          <ac:picMkLst>
+            <pc:docMk/>
+            <pc:sldMk cId="2676376378" sldId="266"/>
+            <ac:picMk id="17" creationId="{15C64702-1FC0-9A06-11F9-26F4817C6414}"/>
+          </ac:picMkLst>
+        </pc:picChg>
+      </pc:sldChg>
+      <pc:sldChg chg="addSp delSp modSp mod">
+        <pc:chgData name="Aysha Gheewala" userId="819ba6fb6ea0380f" providerId="LiveId" clId="{650812C4-EEA9-4F2B-9F39-40FEADFCFB65}" dt="2024-04-03T13:59:54.632" v="185" actId="1076"/>
+        <pc:sldMkLst>
+          <pc:docMk/>
+          <pc:sldMk cId="4153134350" sldId="267"/>
+        </pc:sldMkLst>
+        <pc:spChg chg="del mod">
+          <ac:chgData name="Aysha Gheewala" userId="819ba6fb6ea0380f" providerId="LiveId" clId="{650812C4-EEA9-4F2B-9F39-40FEADFCFB65}" dt="2024-04-03T13:56:52.100" v="155" actId="478"/>
+          <ac:spMkLst>
+            <pc:docMk/>
+            <pc:sldMk cId="4153134350" sldId="267"/>
+            <ac:spMk id="2" creationId="{54B5C03A-E20C-212C-F6B9-B44059BB7FFF}"/>
+          </ac:spMkLst>
+        </pc:spChg>
+        <pc:spChg chg="del mod">
+          <ac:chgData name="Aysha Gheewala" userId="819ba6fb6ea0380f" providerId="LiveId" clId="{650812C4-EEA9-4F2B-9F39-40FEADFCFB65}" dt="2024-04-03T13:54:40.985" v="138" actId="478"/>
+          <ac:spMkLst>
+            <pc:docMk/>
+            <pc:sldMk cId="4153134350" sldId="267"/>
+            <ac:spMk id="4" creationId="{B84200C3-3E38-0FA4-9267-4DFA15EE31C7}"/>
+          </ac:spMkLst>
+        </pc:spChg>
+        <pc:spChg chg="mod">
+          <ac:chgData name="Aysha Gheewala" userId="819ba6fb6ea0380f" providerId="LiveId" clId="{650812C4-EEA9-4F2B-9F39-40FEADFCFB65}" dt="2024-04-03T13:42:24.007" v="41"/>
+          <ac:spMkLst>
+            <pc:docMk/>
+            <pc:sldMk cId="4153134350" sldId="267"/>
+            <ac:spMk id="5" creationId="{F20D7554-6094-D205-6FA1-B66D1218FDF1}"/>
+          </ac:spMkLst>
+        </pc:spChg>
+        <pc:spChg chg="mod">
+          <ac:chgData name="Aysha Gheewala" userId="819ba6fb6ea0380f" providerId="LiveId" clId="{650812C4-EEA9-4F2B-9F39-40FEADFCFB65}" dt="2024-04-03T13:42:24.007" v="41"/>
+          <ac:spMkLst>
+            <pc:docMk/>
+            <pc:sldMk cId="4153134350" sldId="267"/>
+            <ac:spMk id="7" creationId="{8D98DFC0-A770-5173-CEF2-129AF80CEF45}"/>
+          </ac:spMkLst>
+        </pc:spChg>
+        <pc:spChg chg="mod">
+          <ac:chgData name="Aysha Gheewala" userId="819ba6fb6ea0380f" providerId="LiveId" clId="{650812C4-EEA9-4F2B-9F39-40FEADFCFB65}" dt="2024-04-03T13:42:24.007" v="41"/>
+          <ac:spMkLst>
+            <pc:docMk/>
+            <pc:sldMk cId="4153134350" sldId="267"/>
+            <ac:spMk id="9" creationId="{D8DFC8E0-DC03-CEB8-C120-1DE967E22407}"/>
+          </ac:spMkLst>
+        </pc:spChg>
+        <pc:spChg chg="mod">
+          <ac:chgData name="Aysha Gheewala" userId="819ba6fb6ea0380f" providerId="LiveId" clId="{650812C4-EEA9-4F2B-9F39-40FEADFCFB65}" dt="2024-04-03T13:42:24.007" v="41"/>
+          <ac:spMkLst>
+            <pc:docMk/>
+            <pc:sldMk cId="4153134350" sldId="267"/>
+            <ac:spMk id="10" creationId="{35959466-85B0-C22F-9AF8-75DBCA921B18}"/>
+          </ac:spMkLst>
+        </pc:spChg>
+        <pc:spChg chg="del">
+          <ac:chgData name="Aysha Gheewala" userId="819ba6fb6ea0380f" providerId="LiveId" clId="{650812C4-EEA9-4F2B-9F39-40FEADFCFB65}" dt="2024-04-03T13:44:50.864" v="58" actId="478"/>
+          <ac:spMkLst>
+            <pc:docMk/>
+            <pc:sldMk cId="4153134350" sldId="267"/>
+            <ac:spMk id="11" creationId="{00000000-0000-0000-0000-000000000000}"/>
+          </ac:spMkLst>
+        </pc:spChg>
+        <pc:spChg chg="add mod">
+          <ac:chgData name="Aysha Gheewala" userId="819ba6fb6ea0380f" providerId="LiveId" clId="{650812C4-EEA9-4F2B-9F39-40FEADFCFB65}" dt="2024-04-03T13:59:34.712" v="181" actId="1076"/>
+          <ac:spMkLst>
+            <pc:docMk/>
+            <pc:sldMk cId="4153134350" sldId="267"/>
+            <ac:spMk id="12" creationId="{3C0D405B-1250-F766-59A2-CB39BB042DA0}"/>
+          </ac:spMkLst>
+        </pc:spChg>
+        <pc:spChg chg="mod">
+          <ac:chgData name="Aysha Gheewala" userId="819ba6fb6ea0380f" providerId="LiveId" clId="{650812C4-EEA9-4F2B-9F39-40FEADFCFB65}" dt="2024-04-03T13:41:29.770" v="40"/>
+          <ac:spMkLst>
+            <pc:docMk/>
+            <pc:sldMk cId="4153134350" sldId="267"/>
+            <ac:spMk id="13" creationId="{00000000-0000-0000-0000-000000000000}"/>
+          </ac:spMkLst>
+        </pc:spChg>
+        <pc:spChg chg="add mod">
+          <ac:chgData name="Aysha Gheewala" userId="819ba6fb6ea0380f" providerId="LiveId" clId="{650812C4-EEA9-4F2B-9F39-40FEADFCFB65}" dt="2024-04-03T13:59:34.712" v="181" actId="1076"/>
+          <ac:spMkLst>
+            <pc:docMk/>
+            <pc:sldMk cId="4153134350" sldId="267"/>
+            <ac:spMk id="14" creationId="{5606A40F-2815-F82D-4EF0-8665637675E5}"/>
+          </ac:spMkLst>
+        </pc:spChg>
+        <pc:spChg chg="add mod">
+          <ac:chgData name="Aysha Gheewala" userId="819ba6fb6ea0380f" providerId="LiveId" clId="{650812C4-EEA9-4F2B-9F39-40FEADFCFB65}" dt="2024-04-03T13:44:49.074" v="57"/>
+          <ac:spMkLst>
+            <pc:docMk/>
+            <pc:sldMk cId="4153134350" sldId="267"/>
+            <ac:spMk id="15" creationId="{2ECB01DE-7BE8-2C9C-E4CF-676BC0EE9227}"/>
+          </ac:spMkLst>
+        </pc:spChg>
+        <pc:spChg chg="mod ord">
+          <ac:chgData name="Aysha Gheewala" userId="819ba6fb6ea0380f" providerId="LiveId" clId="{650812C4-EEA9-4F2B-9F39-40FEADFCFB65}" dt="2024-04-03T13:51:09.573" v="120" actId="1076"/>
+          <ac:spMkLst>
+            <pc:docMk/>
+            <pc:sldMk cId="4153134350" sldId="267"/>
+            <ac:spMk id="17" creationId="{5159BE0F-1948-0096-00A5-634B9866DB6C}"/>
+          </ac:spMkLst>
+        </pc:spChg>
+        <pc:spChg chg="mod">
+          <ac:chgData name="Aysha Gheewala" userId="819ba6fb6ea0380f" providerId="LiveId" clId="{650812C4-EEA9-4F2B-9F39-40FEADFCFB65}" dt="2024-04-03T13:49:04.465" v="96"/>
+          <ac:spMkLst>
+            <pc:docMk/>
+            <pc:sldMk cId="4153134350" sldId="267"/>
+            <ac:spMk id="18" creationId="{2E0E25F1-4EE7-014B-15D7-754DC6908EFC}"/>
+          </ac:spMkLst>
+        </pc:spChg>
+        <pc:spChg chg="add del">
+          <ac:chgData name="Aysha Gheewala" userId="819ba6fb6ea0380f" providerId="LiveId" clId="{650812C4-EEA9-4F2B-9F39-40FEADFCFB65}" dt="2024-04-03T13:52:15.381" v="122" actId="478"/>
+          <ac:spMkLst>
+            <pc:docMk/>
+            <pc:sldMk cId="4153134350" sldId="267"/>
+            <ac:spMk id="19" creationId="{16D7035A-A18E-83D6-BCB4-AF7384F48BE4}"/>
+          </ac:spMkLst>
+        </pc:spChg>
+        <pc:spChg chg="add del">
+          <ac:chgData name="Aysha Gheewala" userId="819ba6fb6ea0380f" providerId="LiveId" clId="{650812C4-EEA9-4F2B-9F39-40FEADFCFB65}" dt="2024-04-03T13:52:25.590" v="124" actId="478"/>
+          <ac:spMkLst>
+            <pc:docMk/>
+            <pc:sldMk cId="4153134350" sldId="267"/>
+            <ac:spMk id="20" creationId="{486C4902-6F8E-B76E-677E-2E65D5D1FACA}"/>
+          </ac:spMkLst>
+        </pc:spChg>
+        <pc:spChg chg="mod ord">
+          <ac:chgData name="Aysha Gheewala" userId="819ba6fb6ea0380f" providerId="LiveId" clId="{650812C4-EEA9-4F2B-9F39-40FEADFCFB65}" dt="2024-04-03T13:53:40.472" v="131" actId="167"/>
+          <ac:spMkLst>
+            <pc:docMk/>
+            <pc:sldMk cId="4153134350" sldId="267"/>
+            <ac:spMk id="22" creationId="{24FB697E-0B04-5F8B-8307-D3632635E123}"/>
+          </ac:spMkLst>
+        </pc:spChg>
+        <pc:spChg chg="mod">
+          <ac:chgData name="Aysha Gheewala" userId="819ba6fb6ea0380f" providerId="LiveId" clId="{650812C4-EEA9-4F2B-9F39-40FEADFCFB65}" dt="2024-04-03T13:53:16.051" v="125"/>
+          <ac:spMkLst>
+            <pc:docMk/>
+            <pc:sldMk cId="4153134350" sldId="267"/>
+            <ac:spMk id="23" creationId="{C58BC2D9-4771-02C5-ACE0-138FB971802D}"/>
+          </ac:spMkLst>
+        </pc:spChg>
+        <pc:grpChg chg="add del mod">
+          <ac:chgData name="Aysha Gheewala" userId="819ba6fb6ea0380f" providerId="LiveId" clId="{650812C4-EEA9-4F2B-9F39-40FEADFCFB65}" dt="2024-04-03T13:53:23.094" v="128" actId="478"/>
+          <ac:grpSpMkLst>
+            <pc:docMk/>
+            <pc:sldMk cId="4153134350" sldId="267"/>
+            <ac:grpSpMk id="3" creationId="{50721756-5485-B10E-0A1C-5B66B1630742}"/>
+          </ac:grpSpMkLst>
+        </pc:grpChg>
+        <pc:grpChg chg="add mod">
+          <ac:chgData name="Aysha Gheewala" userId="819ba6fb6ea0380f" providerId="LiveId" clId="{650812C4-EEA9-4F2B-9F39-40FEADFCFB65}" dt="2024-04-03T13:59:34.712" v="181" actId="1076"/>
+          <ac:grpSpMkLst>
+            <pc:docMk/>
+            <pc:sldMk cId="4153134350" sldId="267"/>
+            <ac:grpSpMk id="8" creationId="{77EBB6D0-1DE0-02D7-7802-AF5C6BFFC42A}"/>
+          </ac:grpSpMkLst>
+        </pc:grpChg>
+        <pc:grpChg chg="add del mod ord">
+          <ac:chgData name="Aysha Gheewala" userId="819ba6fb6ea0380f" providerId="LiveId" clId="{650812C4-EEA9-4F2B-9F39-40FEADFCFB65}" dt="2024-04-03T13:54:23.525" v="137" actId="478"/>
+          <ac:grpSpMkLst>
+            <pc:docMk/>
+            <pc:sldMk cId="4153134350" sldId="267"/>
+            <ac:grpSpMk id="16" creationId="{C245FBB3-E258-0998-D668-425207221A33}"/>
+          </ac:grpSpMkLst>
+        </pc:grpChg>
+        <pc:grpChg chg="add mod ord">
+          <ac:chgData name="Aysha Gheewala" userId="819ba6fb6ea0380f" providerId="LiveId" clId="{650812C4-EEA9-4F2B-9F39-40FEADFCFB65}" dt="2024-04-03T13:59:34.712" v="181" actId="1076"/>
+          <ac:grpSpMkLst>
+            <pc:docMk/>
+            <pc:sldMk cId="4153134350" sldId="267"/>
+            <ac:grpSpMk id="21" creationId="{B997F880-0723-9C30-02C2-F650998FEF54}"/>
+          </ac:grpSpMkLst>
+        </pc:grpChg>
+        <pc:picChg chg="mod">
+          <ac:chgData name="Aysha Gheewala" userId="819ba6fb6ea0380f" providerId="LiveId" clId="{650812C4-EEA9-4F2B-9F39-40FEADFCFB65}" dt="2024-04-03T13:59:54.632" v="185" actId="1076"/>
+          <ac:picMkLst>
+            <pc:docMk/>
+            <pc:sldMk cId="4153134350" sldId="267"/>
+            <ac:picMk id="6" creationId="{77BBF90E-89F3-6948-AE3E-34E96D9DE52D}"/>
+          </ac:picMkLst>
+        </pc:picChg>
+      </pc:sldChg>
+    </pc:docChg>
+  </pc:docChgLst>
+</pc:chgInfo>
+</file>
+
 <file path=ppt/notesMasters/notesMaster1.xml><?xml version="1.0" encoding="utf-8"?>
 <p:notesMaster xmlns:a="http://schemas.openxmlformats.org/drawingml/2006/main" xmlns:r="http://schemas.openxmlformats.org/officeDocument/2006/relationships" xmlns:p="http://schemas.openxmlformats.org/presentationml/2006/main">
   <p:cSld>
@@ -246,7 +593,7 @@
           <a:p>
             <a:fld id="{85BA90B5-C4B4-C647-BC3D-46BF24662E26}" type="datetimeFigureOut">
               <a:rPr lang="en-US" smtClean="0"/>
-              <a:t>4/2/2024</a:t>
+              <a:t>4/3/2024</a:t>
             </a:fld>
             <a:endParaRPr lang="en-US"/>
           </a:p>
@@ -2581,7 +2928,7 @@
             <a:fld id="{1D8BD707-D9CF-40AE-B4C6-C98DA3205C09}" type="datetimeFigureOut">
               <a:rPr lang="en-US" smtClean="0"/>
               <a:pPr/>
-              <a:t>4/2/2024</a:t>
+              <a:t>4/3/2024</a:t>
             </a:fld>
             <a:endParaRPr lang="en-US"/>
           </a:p>
@@ -2746,7 +3093,7 @@
             <a:fld id="{1D8BD707-D9CF-40AE-B4C6-C98DA3205C09}" type="datetimeFigureOut">
               <a:rPr lang="en-US" smtClean="0"/>
               <a:pPr/>
-              <a:t>4/2/2024</a:t>
+              <a:t>4/3/2024</a:t>
             </a:fld>
             <a:endParaRPr lang="en-US"/>
           </a:p>
@@ -2921,7 +3268,7 @@
             <a:fld id="{1D8BD707-D9CF-40AE-B4C6-C98DA3205C09}" type="datetimeFigureOut">
               <a:rPr lang="en-US" smtClean="0"/>
               <a:pPr/>
-              <a:t>4/2/2024</a:t>
+              <a:t>4/3/2024</a:t>
             </a:fld>
             <a:endParaRPr lang="en-US"/>
           </a:p>
@@ -3086,7 +3433,7 @@
             <a:fld id="{1D8BD707-D9CF-40AE-B4C6-C98DA3205C09}" type="datetimeFigureOut">
               <a:rPr lang="en-US" smtClean="0"/>
               <a:pPr/>
-              <a:t>4/2/2024</a:t>
+              <a:t>4/3/2024</a:t>
             </a:fld>
             <a:endParaRPr lang="en-US"/>
           </a:p>
@@ -3328,7 +3675,7 @@
             <a:fld id="{1D8BD707-D9CF-40AE-B4C6-C98DA3205C09}" type="datetimeFigureOut">
               <a:rPr lang="en-US" smtClean="0"/>
               <a:pPr/>
-              <a:t>4/2/2024</a:t>
+              <a:t>4/3/2024</a:t>
             </a:fld>
             <a:endParaRPr lang="en-US"/>
           </a:p>
@@ -3610,7 +3957,7 @@
             <a:fld id="{1D8BD707-D9CF-40AE-B4C6-C98DA3205C09}" type="datetimeFigureOut">
               <a:rPr lang="en-US" smtClean="0"/>
               <a:pPr/>
-              <a:t>4/2/2024</a:t>
+              <a:t>4/3/2024</a:t>
             </a:fld>
             <a:endParaRPr lang="en-US"/>
           </a:p>
@@ -4026,7 +4373,7 @@
             <a:fld id="{1D8BD707-D9CF-40AE-B4C6-C98DA3205C09}" type="datetimeFigureOut">
               <a:rPr lang="en-US" smtClean="0"/>
               <a:pPr/>
-              <a:t>4/2/2024</a:t>
+              <a:t>4/3/2024</a:t>
             </a:fld>
             <a:endParaRPr lang="en-US"/>
           </a:p>
@@ -4140,7 +4487,7 @@
             <a:fld id="{1D8BD707-D9CF-40AE-B4C6-C98DA3205C09}" type="datetimeFigureOut">
               <a:rPr lang="en-US" smtClean="0"/>
               <a:pPr/>
-              <a:t>4/2/2024</a:t>
+              <a:t>4/3/2024</a:t>
             </a:fld>
             <a:endParaRPr lang="en-US"/>
           </a:p>
@@ -4232,7 +4579,7 @@
             <a:fld id="{1D8BD707-D9CF-40AE-B4C6-C98DA3205C09}" type="datetimeFigureOut">
               <a:rPr lang="en-US" smtClean="0"/>
               <a:pPr/>
-              <a:t>4/2/2024</a:t>
+              <a:t>4/3/2024</a:t>
             </a:fld>
             <a:endParaRPr lang="en-US"/>
           </a:p>
@@ -4504,7 +4851,7 @@
             <a:fld id="{1D8BD707-D9CF-40AE-B4C6-C98DA3205C09}" type="datetimeFigureOut">
               <a:rPr lang="en-US" smtClean="0"/>
               <a:pPr/>
-              <a:t>4/2/2024</a:t>
+              <a:t>4/3/2024</a:t>
             </a:fld>
             <a:endParaRPr lang="en-US"/>
           </a:p>
@@ -4753,7 +5100,7 @@
             <a:fld id="{1D8BD707-D9CF-40AE-B4C6-C98DA3205C09}" type="datetimeFigureOut">
               <a:rPr lang="en-US" smtClean="0"/>
               <a:pPr/>
-              <a:t>4/2/2024</a:t>
+              <a:t>4/3/2024</a:t>
             </a:fld>
             <a:endParaRPr lang="en-US"/>
           </a:p>
@@ -4961,7 +5308,7 @@
             <a:fld id="{1D8BD707-D9CF-40AE-B4C6-C98DA3205C09}" type="datetimeFigureOut">
               <a:rPr lang="en-US" smtClean="0"/>
               <a:pPr/>
-              <a:t>4/2/2024</a:t>
+              <a:t>4/3/2024</a:t>
             </a:fld>
             <a:endParaRPr lang="en-US"/>
           </a:p>
@@ -6138,65 +6485,135 @@
           <a:chExt cx="0" cy="0"/>
         </a:xfrm>
       </p:grpSpPr>
-      <p:sp>
-        <p:nvSpPr>
-          <p:cNvPr id="11" name="Freeform 11"/>
-          <p:cNvSpPr/>
+      <p:grpSp>
+        <p:nvGrpSpPr>
+          <p:cNvPr id="21" name="Group 7">
+            <a:extLst>
+              <a:ext uri="{FF2B5EF4-FFF2-40B4-BE49-F238E27FC236}">
+                <a16:creationId xmlns:a16="http://schemas.microsoft.com/office/drawing/2014/main" id="{B997F880-0723-9C30-02C2-F650998FEF54}"/>
+              </a:ext>
+            </a:extLst>
+          </p:cNvPr>
+          <p:cNvGrpSpPr/>
           <p:nvPr/>
-        </p:nvSpPr>
-        <p:spPr>
+        </p:nvGrpSpPr>
+        <p:grpSpPr>
           <a:xfrm>
-            <a:off x="152400" y="8189346"/>
-            <a:ext cx="2168627" cy="2097654"/>
+            <a:off x="1368011" y="3499970"/>
+            <a:ext cx="5645977" cy="3287060"/>
+            <a:chOff x="0" y="0"/>
+            <a:chExt cx="655225" cy="381469"/>
           </a:xfrm>
-          <a:custGeom>
-            <a:avLst/>
-            <a:gdLst/>
-            <a:ahLst/>
-            <a:cxnLst/>
-            <a:rect l="l" t="t" r="r" b="b"/>
-            <a:pathLst>
-              <a:path w="2168627" h="2097654">
-                <a:moveTo>
-                  <a:pt x="0" y="0"/>
-                </a:moveTo>
-                <a:lnTo>
-                  <a:pt x="2168627" y="0"/>
-                </a:lnTo>
-                <a:lnTo>
-                  <a:pt x="2168627" y="2097654"/>
-                </a:lnTo>
-                <a:lnTo>
-                  <a:pt x="0" y="2097654"/>
-                </a:lnTo>
-                <a:lnTo>
-                  <a:pt x="0" y="0"/>
-                </a:lnTo>
-                <a:close/>
-              </a:path>
-            </a:pathLst>
-          </a:custGeom>
-          <a:blipFill>
-            <a:blip r:embed="rId3">
+        </p:grpSpPr>
+        <p:sp>
+          <p:nvSpPr>
+            <p:cNvPr id="22" name="Freeform 8">
               <a:extLst>
-                <a:ext uri="{96DAC541-7B7A-43D3-8B79-37D633B846F1}">
-                  <asvg:svgBlip xmlns:asvg="http://schemas.microsoft.com/office/drawing/2016/SVG/main" r:embed="rId4"/>
+                <a:ext uri="{FF2B5EF4-FFF2-40B4-BE49-F238E27FC236}">
+                  <a16:creationId xmlns:a16="http://schemas.microsoft.com/office/drawing/2014/main" id="{24FB697E-0B04-5F8B-8307-D3632635E123}"/>
                 </a:ext>
               </a:extLst>
-            </a:blip>
-            <a:stretch>
-              <a:fillRect/>
-            </a:stretch>
-          </a:blipFill>
-        </p:spPr>
-        <p:txBody>
-          <a:bodyPr/>
-          <a:lstStyle/>
-          <a:p>
-            <a:endParaRPr lang="en-US"/>
-          </a:p>
-        </p:txBody>
-      </p:sp>
+            </p:cNvPr>
+            <p:cNvSpPr/>
+            <p:nvPr/>
+          </p:nvSpPr>
+          <p:spPr>
+            <a:xfrm>
+              <a:off x="0" y="0"/>
+              <a:ext cx="655225" cy="381469"/>
+            </a:xfrm>
+            <a:custGeom>
+              <a:avLst/>
+              <a:gdLst/>
+              <a:ahLst/>
+              <a:cxnLst/>
+              <a:rect l="l" t="t" r="r" b="b"/>
+              <a:pathLst>
+                <a:path w="655225" h="381469">
+                  <a:moveTo>
+                    <a:pt x="452025" y="0"/>
+                  </a:moveTo>
+                  <a:cubicBezTo>
+                    <a:pt x="564250" y="0"/>
+                    <a:pt x="655225" y="85395"/>
+                    <a:pt x="655225" y="190734"/>
+                  </a:cubicBezTo>
+                  <a:cubicBezTo>
+                    <a:pt x="655225" y="296074"/>
+                    <a:pt x="564250" y="381469"/>
+                    <a:pt x="452025" y="381469"/>
+                  </a:cubicBezTo>
+                  <a:lnTo>
+                    <a:pt x="203200" y="381469"/>
+                  </a:lnTo>
+                  <a:cubicBezTo>
+                    <a:pt x="90976" y="381469"/>
+                    <a:pt x="0" y="296074"/>
+                    <a:pt x="0" y="190734"/>
+                  </a:cubicBezTo>
+                  <a:cubicBezTo>
+                    <a:pt x="0" y="85395"/>
+                    <a:pt x="90976" y="0"/>
+                    <a:pt x="203200" y="0"/>
+                  </a:cubicBezTo>
+                  <a:close/>
+                </a:path>
+              </a:pathLst>
+            </a:custGeom>
+            <a:solidFill>
+              <a:srgbClr val="E9EAF6"/>
+            </a:solidFill>
+            <a:ln w="19050" cap="sq">
+              <a:solidFill>
+                <a:srgbClr val="414370"/>
+              </a:solidFill>
+              <a:prstDash val="lgDash"/>
+              <a:miter/>
+            </a:ln>
+          </p:spPr>
+          <p:txBody>
+            <a:bodyPr/>
+            <a:lstStyle/>
+            <a:p>
+              <a:endParaRPr lang="en-US" dirty="0"/>
+            </a:p>
+          </p:txBody>
+        </p:sp>
+        <p:sp>
+          <p:nvSpPr>
+            <p:cNvPr id="23" name="TextBox 9">
+              <a:extLst>
+                <a:ext uri="{FF2B5EF4-FFF2-40B4-BE49-F238E27FC236}">
+                  <a16:creationId xmlns:a16="http://schemas.microsoft.com/office/drawing/2014/main" id="{C58BC2D9-4771-02C5-ACE0-138FB971802D}"/>
+                </a:ext>
+              </a:extLst>
+            </p:cNvPr>
+            <p:cNvSpPr txBox="1"/>
+            <p:nvPr/>
+          </p:nvSpPr>
+          <p:spPr>
+            <a:xfrm>
+              <a:off x="0" y="-38100"/>
+              <a:ext cx="655225" cy="419569"/>
+            </a:xfrm>
+            <a:prstGeom prst="rect">
+              <a:avLst/>
+            </a:prstGeom>
+          </p:spPr>
+          <p:txBody>
+            <a:bodyPr lIns="50800" tIns="50800" rIns="50800" bIns="50800" rtlCol="0" anchor="ctr"/>
+            <a:lstStyle/>
+            <a:p>
+              <a:pPr algn="ctr">
+                <a:lnSpc>
+                  <a:spcPts val="2659"/>
+                </a:lnSpc>
+              </a:pPr>
+              <a:endParaRPr/>
+            </a:p>
+          </p:txBody>
+        </p:sp>
+      </p:grpSp>
       <p:sp>
         <p:nvSpPr>
           <p:cNvPr id="13" name="TextBox 13"/>
@@ -6230,209 +6647,8 @@
                 </a:solidFill>
                 <a:latin typeface="Brick Sans"/>
               </a:rPr>
-              <a:t>FRONT-END VISUALISATION OF MODEL PERFORMACE</a:t>
-            </a:r>
-          </a:p>
-        </p:txBody>
-      </p:sp>
-      <p:sp>
-        <p:nvSpPr>
-          <p:cNvPr id="2" name="TextBox 1">
-            <a:extLst>
-              <a:ext uri="{FF2B5EF4-FFF2-40B4-BE49-F238E27FC236}">
-                <a16:creationId xmlns:a16="http://schemas.microsoft.com/office/drawing/2014/main" id="{54B5C03A-E20C-212C-F6B9-B44059BB7FFF}"/>
-              </a:ext>
-            </a:extLst>
-          </p:cNvPr>
-          <p:cNvSpPr txBox="1"/>
-          <p:nvPr/>
-        </p:nvSpPr>
-        <p:spPr>
-          <a:xfrm>
-            <a:off x="381000" y="3290047"/>
-            <a:ext cx="4876800" cy="2677656"/>
-          </a:xfrm>
-          <a:prstGeom prst="rect">
-            <a:avLst/>
-          </a:prstGeom>
-        </p:spPr>
-        <p:style>
-          <a:lnRef idx="1">
-            <a:schemeClr val="accent1"/>
-          </a:lnRef>
-          <a:fillRef idx="2">
-            <a:schemeClr val="accent1"/>
-          </a:fillRef>
-          <a:effectRef idx="1">
-            <a:schemeClr val="accent1"/>
-          </a:effectRef>
-          <a:fontRef idx="minor">
-            <a:schemeClr val="dk1"/>
-          </a:fontRef>
-        </p:style>
-        <p:txBody>
-          <a:bodyPr wrap="square" rtlCol="0">
-            <a:spAutoFit/>
-          </a:bodyPr>
-          <a:lstStyle/>
-          <a:p>
-            <a:pPr algn="ctr"/>
-            <a:r>
-              <a:rPr lang="en-GB" sz="2400" b="0" i="0" dirty="0" err="1">
-                <a:solidFill>
-                  <a:srgbClr val="0070C0"/>
-                </a:solidFill>
-                <a:effectLst/>
-                <a:latin typeface="Aptos SemiBold" panose="020F0502020204030204" pitchFamily="34" charset="0"/>
-              </a:rPr>
-              <a:t>DiabPredict</a:t>
-            </a:r>
-            <a:r>
-              <a:rPr lang="en-GB" sz="2400" b="0" i="0" dirty="0">
-                <a:solidFill>
-                  <a:srgbClr val="0070C0"/>
-                </a:solidFill>
-                <a:effectLst/>
-                <a:latin typeface="Aptos SemiBold" panose="020F0502020204030204" pitchFamily="34" charset="0"/>
-              </a:rPr>
-              <a:t>+ </a:t>
-            </a:r>
-          </a:p>
-          <a:p>
-            <a:pPr marL="285750" indent="-285750" algn="just">
-              <a:buFont typeface="Wingdings" panose="05000000000000000000" pitchFamily="2" charset="2"/>
-              <a:buChar char="§"/>
-            </a:pPr>
-            <a:r>
-              <a:rPr lang="en-GB" b="0" i="0" dirty="0">
-                <a:solidFill>
-                  <a:srgbClr val="0D0D0D"/>
-                </a:solidFill>
-                <a:effectLst/>
-                <a:latin typeface="Aptos SemiBold" panose="020F0502020204030204" pitchFamily="34" charset="0"/>
-              </a:rPr>
-              <a:t>Web app predicts diabetes risk using machine learning. </a:t>
-            </a:r>
-          </a:p>
-          <a:p>
-            <a:pPr marL="285750" indent="-285750" algn="just">
-              <a:buFont typeface="Wingdings" panose="05000000000000000000" pitchFamily="2" charset="2"/>
-              <a:buChar char="§"/>
-            </a:pPr>
-            <a:r>
-              <a:rPr lang="en-GB" b="0" i="0" dirty="0">
-                <a:solidFill>
-                  <a:srgbClr val="0D0D0D"/>
-                </a:solidFill>
-                <a:effectLst/>
-                <a:latin typeface="Aptos SemiBold" panose="020F0502020204030204" pitchFamily="34" charset="0"/>
-              </a:rPr>
-              <a:t>With input on age, gender, lifestyle, and medical history, it instantly assesses diabetes status and probability. </a:t>
-            </a:r>
-          </a:p>
-          <a:p>
-            <a:pPr marL="285750" indent="-285750" algn="just">
-              <a:buFont typeface="Wingdings" panose="05000000000000000000" pitchFamily="2" charset="2"/>
-              <a:buChar char="§"/>
-            </a:pPr>
-            <a:r>
-              <a:rPr lang="en-GB" b="0" i="0" dirty="0">
-                <a:solidFill>
-                  <a:srgbClr val="0D0D0D"/>
-                </a:solidFill>
-                <a:effectLst/>
-                <a:latin typeface="Aptos SemiBold" panose="020F0502020204030204" pitchFamily="34" charset="0"/>
-              </a:rPr>
-              <a:t>Built on Flask and </a:t>
-            </a:r>
-            <a:r>
-              <a:rPr lang="en-GB" b="0" i="0" dirty="0" err="1">
-                <a:solidFill>
-                  <a:srgbClr val="0D0D0D"/>
-                </a:solidFill>
-                <a:effectLst/>
-                <a:latin typeface="Aptos SemiBold" panose="020F0502020204030204" pitchFamily="34" charset="0"/>
-              </a:rPr>
-              <a:t>Keras</a:t>
-            </a:r>
-            <a:r>
-              <a:rPr lang="en-GB" b="0" i="0" dirty="0">
-                <a:solidFill>
-                  <a:srgbClr val="0D0D0D"/>
-                </a:solidFill>
-                <a:effectLst/>
-                <a:latin typeface="Aptos SemiBold" panose="020F0502020204030204" pitchFamily="34" charset="0"/>
-              </a:rPr>
-              <a:t>, it offers accurate predictions and promotes health awareness.“</a:t>
-            </a:r>
-            <a:endParaRPr lang="en-US" dirty="0">
-              <a:latin typeface="Aptos SemiBold" panose="020F0502020204030204" pitchFamily="34" charset="0"/>
-            </a:endParaRPr>
-          </a:p>
-        </p:txBody>
-      </p:sp>
-      <p:sp>
-        <p:nvSpPr>
-          <p:cNvPr id="4" name="Freeform 16">
-            <a:extLst>
-              <a:ext uri="{FF2B5EF4-FFF2-40B4-BE49-F238E27FC236}">
-                <a16:creationId xmlns:a16="http://schemas.microsoft.com/office/drawing/2014/main" id="{B84200C3-3E38-0FA4-9267-4DFA15EE31C7}"/>
-              </a:ext>
-            </a:extLst>
-          </p:cNvPr>
-          <p:cNvSpPr/>
-          <p:nvPr/>
-        </p:nvSpPr>
-        <p:spPr>
-          <a:xfrm rot="905778">
-            <a:off x="14904023" y="3465264"/>
-            <a:ext cx="1460273" cy="2294715"/>
-          </a:xfrm>
-          <a:custGeom>
-            <a:avLst/>
-            <a:gdLst/>
-            <a:ahLst/>
-            <a:cxnLst/>
-            <a:rect l="l" t="t" r="r" b="b"/>
-            <a:pathLst>
-              <a:path w="1460273" h="2294715">
-                <a:moveTo>
-                  <a:pt x="0" y="0"/>
-                </a:moveTo>
-                <a:lnTo>
-                  <a:pt x="1460273" y="0"/>
-                </a:lnTo>
-                <a:lnTo>
-                  <a:pt x="1460273" y="2294715"/>
-                </a:lnTo>
-                <a:lnTo>
-                  <a:pt x="0" y="2294715"/>
-                </a:lnTo>
-                <a:lnTo>
-                  <a:pt x="0" y="0"/>
-                </a:lnTo>
-                <a:close/>
-              </a:path>
-            </a:pathLst>
-          </a:custGeom>
-          <a:blipFill>
-            <a:blip r:embed="rId5">
-              <a:extLst>
-                <a:ext uri="{96DAC541-7B7A-43D3-8B79-37D633B846F1}">
-                  <asvg:svgBlip xmlns:asvg="http://schemas.microsoft.com/office/drawing/2016/SVG/main" r:embed="rId6"/>
-                </a:ext>
-              </a:extLst>
-            </a:blip>
-            <a:stretch>
-              <a:fillRect/>
-            </a:stretch>
-          </a:blipFill>
-        </p:spPr>
-        <p:txBody>
-          <a:bodyPr/>
-          <a:lstStyle/>
-          <a:p>
-            <a:endParaRPr lang="en-US"/>
+              <a:t>Front-end Visualisation Of Model Performance</a:t>
+            </a:r>
           </a:p>
         </p:txBody>
       </p:sp>
@@ -6451,15 +6667,15 @@
           <p:nvPr/>
         </p:nvPicPr>
         <p:blipFill>
-          <a:blip r:embed="rId7"/>
+          <a:blip r:embed="rId3"/>
           <a:stretch>
             <a:fillRect/>
           </a:stretch>
         </p:blipFill>
         <p:spPr>
           <a:xfrm>
-            <a:off x="6096000" y="1333500"/>
-            <a:ext cx="7414451" cy="8686800"/>
+            <a:off x="7663189" y="1409700"/>
+            <a:ext cx="6629400" cy="8468856"/>
           </a:xfrm>
           <a:prstGeom prst="round2DiagRect">
             <a:avLst>
@@ -6482,6 +6698,337 @@
           </a:effectLst>
         </p:spPr>
       </p:pic>
+      <p:grpSp>
+        <p:nvGrpSpPr>
+          <p:cNvPr id="8" name="Group 16">
+            <a:extLst>
+              <a:ext uri="{FF2B5EF4-FFF2-40B4-BE49-F238E27FC236}">
+                <a16:creationId xmlns:a16="http://schemas.microsoft.com/office/drawing/2014/main" id="{77EBB6D0-1DE0-02D7-7802-AF5C6BFFC42A}"/>
+              </a:ext>
+            </a:extLst>
+          </p:cNvPr>
+          <p:cNvGrpSpPr/>
+          <p:nvPr/>
+        </p:nvGrpSpPr>
+        <p:grpSpPr>
+          <a:xfrm>
+            <a:off x="2580680" y="3195170"/>
+            <a:ext cx="3202584" cy="592330"/>
+            <a:chOff x="0" y="0"/>
+            <a:chExt cx="2121149" cy="381469"/>
+          </a:xfrm>
+        </p:grpSpPr>
+        <p:sp>
+          <p:nvSpPr>
+            <p:cNvPr id="9" name="Freeform 17">
+              <a:extLst>
+                <a:ext uri="{FF2B5EF4-FFF2-40B4-BE49-F238E27FC236}">
+                  <a16:creationId xmlns:a16="http://schemas.microsoft.com/office/drawing/2014/main" id="{D8DFC8E0-DC03-CEB8-C120-1DE967E22407}"/>
+                </a:ext>
+              </a:extLst>
+            </p:cNvPr>
+            <p:cNvSpPr/>
+            <p:nvPr/>
+          </p:nvSpPr>
+          <p:spPr>
+            <a:xfrm>
+              <a:off x="0" y="0"/>
+              <a:ext cx="2121149" cy="381469"/>
+            </a:xfrm>
+            <a:custGeom>
+              <a:avLst/>
+              <a:gdLst/>
+              <a:ahLst/>
+              <a:cxnLst/>
+              <a:rect l="l" t="t" r="r" b="b"/>
+              <a:pathLst>
+                <a:path w="2121149" h="381469">
+                  <a:moveTo>
+                    <a:pt x="1917949" y="0"/>
+                  </a:moveTo>
+                  <a:cubicBezTo>
+                    <a:pt x="2030174" y="0"/>
+                    <a:pt x="2121149" y="85395"/>
+                    <a:pt x="2121149" y="190734"/>
+                  </a:cubicBezTo>
+                  <a:cubicBezTo>
+                    <a:pt x="2121149" y="296074"/>
+                    <a:pt x="2030174" y="381469"/>
+                    <a:pt x="1917949" y="381469"/>
+                  </a:cubicBezTo>
+                  <a:lnTo>
+                    <a:pt x="203200" y="381469"/>
+                  </a:lnTo>
+                  <a:cubicBezTo>
+                    <a:pt x="90976" y="381469"/>
+                    <a:pt x="0" y="296074"/>
+                    <a:pt x="0" y="190734"/>
+                  </a:cubicBezTo>
+                  <a:cubicBezTo>
+                    <a:pt x="0" y="85395"/>
+                    <a:pt x="90976" y="0"/>
+                    <a:pt x="203200" y="0"/>
+                  </a:cubicBezTo>
+                  <a:close/>
+                </a:path>
+              </a:pathLst>
+            </a:custGeom>
+            <a:solidFill>
+              <a:srgbClr val="BDD2EA"/>
+            </a:solidFill>
+          </p:spPr>
+          <p:txBody>
+            <a:bodyPr/>
+            <a:lstStyle/>
+            <a:p>
+              <a:endParaRPr lang="en-US"/>
+            </a:p>
+          </p:txBody>
+        </p:sp>
+        <p:sp>
+          <p:nvSpPr>
+            <p:cNvPr id="10" name="TextBox 18">
+              <a:extLst>
+                <a:ext uri="{FF2B5EF4-FFF2-40B4-BE49-F238E27FC236}">
+                  <a16:creationId xmlns:a16="http://schemas.microsoft.com/office/drawing/2014/main" id="{35959466-85B0-C22F-9AF8-75DBCA921B18}"/>
+                </a:ext>
+              </a:extLst>
+            </p:cNvPr>
+            <p:cNvSpPr txBox="1"/>
+            <p:nvPr/>
+          </p:nvSpPr>
+          <p:spPr>
+            <a:xfrm>
+              <a:off x="0" y="-38100"/>
+              <a:ext cx="2121149" cy="419569"/>
+            </a:xfrm>
+            <a:prstGeom prst="rect">
+              <a:avLst/>
+            </a:prstGeom>
+          </p:spPr>
+          <p:txBody>
+            <a:bodyPr lIns="50800" tIns="50800" rIns="50800" bIns="50800" rtlCol="0" anchor="ctr"/>
+            <a:lstStyle/>
+            <a:p>
+              <a:pPr algn="ctr">
+                <a:lnSpc>
+                  <a:spcPts val="2659"/>
+                </a:lnSpc>
+              </a:pPr>
+              <a:endParaRPr/>
+            </a:p>
+          </p:txBody>
+        </p:sp>
+      </p:grpSp>
+      <p:sp>
+        <p:nvSpPr>
+          <p:cNvPr id="12" name="TextBox 41">
+            <a:extLst>
+              <a:ext uri="{FF2B5EF4-FFF2-40B4-BE49-F238E27FC236}">
+                <a16:creationId xmlns:a16="http://schemas.microsoft.com/office/drawing/2014/main" id="{3C0D405B-1250-F766-59A2-CB39BB042DA0}"/>
+              </a:ext>
+            </a:extLst>
+          </p:cNvPr>
+          <p:cNvSpPr txBox="1"/>
+          <p:nvPr/>
+        </p:nvSpPr>
+        <p:spPr>
+          <a:xfrm>
+            <a:off x="2123480" y="3957170"/>
+            <a:ext cx="4327040" cy="2631490"/>
+          </a:xfrm>
+          <a:prstGeom prst="rect">
+            <a:avLst/>
+          </a:prstGeom>
+        </p:spPr>
+        <p:txBody>
+          <a:bodyPr wrap="square" lIns="0" tIns="0" rIns="0" bIns="0" rtlCol="0" anchor="t">
+            <a:spAutoFit/>
+          </a:bodyPr>
+          <a:lstStyle/>
+          <a:p>
+            <a:pPr marL="285750" indent="-285750" algn="just">
+              <a:buFont typeface="Wingdings" panose="05000000000000000000" pitchFamily="2" charset="2"/>
+              <a:buChar char="§"/>
+            </a:pPr>
+            <a:r>
+              <a:rPr lang="en-GB" sz="1900" b="0" i="0" dirty="0">
+                <a:solidFill>
+                  <a:srgbClr val="0D0D0D"/>
+                </a:solidFill>
+                <a:effectLst/>
+                <a:latin typeface="Public Sans" panose="020B0604020202020204" charset="0"/>
+              </a:rPr>
+              <a:t>Web app predicts diabetes risk using machine learning. </a:t>
+            </a:r>
+          </a:p>
+          <a:p>
+            <a:pPr marL="285750" indent="-285750" algn="just">
+              <a:buFont typeface="Wingdings" panose="05000000000000000000" pitchFamily="2" charset="2"/>
+              <a:buChar char="§"/>
+            </a:pPr>
+            <a:r>
+              <a:rPr lang="en-GB" sz="1900" b="0" i="0" dirty="0">
+                <a:solidFill>
+                  <a:srgbClr val="0D0D0D"/>
+                </a:solidFill>
+                <a:effectLst/>
+                <a:latin typeface="Public Sans" panose="020B0604020202020204" charset="0"/>
+              </a:rPr>
+              <a:t>With input on age, gender, lifestyle, and medical history, it instantly assesses diabetes status and probability. </a:t>
+            </a:r>
+          </a:p>
+          <a:p>
+            <a:pPr marL="285750" indent="-285750" algn="just">
+              <a:buFont typeface="Wingdings" panose="05000000000000000000" pitchFamily="2" charset="2"/>
+              <a:buChar char="§"/>
+            </a:pPr>
+            <a:r>
+              <a:rPr lang="en-GB" sz="1900" b="0" i="0" dirty="0">
+                <a:solidFill>
+                  <a:srgbClr val="0D0D0D"/>
+                </a:solidFill>
+                <a:effectLst/>
+                <a:latin typeface="Public Sans" panose="020B0604020202020204" charset="0"/>
+              </a:rPr>
+              <a:t>Built on Flask and </a:t>
+            </a:r>
+            <a:r>
+              <a:rPr lang="en-GB" sz="1900" b="0" i="0" dirty="0" err="1">
+                <a:solidFill>
+                  <a:srgbClr val="0D0D0D"/>
+                </a:solidFill>
+                <a:effectLst/>
+                <a:latin typeface="Public Sans" panose="020B0604020202020204" charset="0"/>
+              </a:rPr>
+              <a:t>Keras</a:t>
+            </a:r>
+            <a:r>
+              <a:rPr lang="en-GB" sz="1900" b="0" i="0" dirty="0">
+                <a:solidFill>
+                  <a:srgbClr val="0D0D0D"/>
+                </a:solidFill>
+                <a:effectLst/>
+                <a:latin typeface="Public Sans" panose="020B0604020202020204" charset="0"/>
+              </a:rPr>
+              <a:t>, it offers accurate predictions and promotes health awareness.</a:t>
+            </a:r>
+            <a:endParaRPr lang="en-US" sz="1900" dirty="0">
+              <a:latin typeface="Public Sans" panose="020B0604020202020204" charset="0"/>
+            </a:endParaRPr>
+          </a:p>
+        </p:txBody>
+      </p:sp>
+      <p:sp>
+        <p:nvSpPr>
+          <p:cNvPr id="14" name="TextBox 45">
+            <a:extLst>
+              <a:ext uri="{FF2B5EF4-FFF2-40B4-BE49-F238E27FC236}">
+                <a16:creationId xmlns:a16="http://schemas.microsoft.com/office/drawing/2014/main" id="{5606A40F-2815-F82D-4EF0-8665637675E5}"/>
+              </a:ext>
+            </a:extLst>
+          </p:cNvPr>
+          <p:cNvSpPr txBox="1"/>
+          <p:nvPr/>
+        </p:nvSpPr>
+        <p:spPr>
+          <a:xfrm>
+            <a:off x="2685352" y="3202307"/>
+            <a:ext cx="3015663" cy="492444"/>
+          </a:xfrm>
+          <a:prstGeom prst="rect">
+            <a:avLst/>
+          </a:prstGeom>
+        </p:spPr>
+        <p:txBody>
+          <a:bodyPr wrap="square" lIns="0" tIns="0" rIns="0" bIns="0" rtlCol="0" anchor="t">
+            <a:spAutoFit/>
+          </a:bodyPr>
+          <a:lstStyle/>
+          <a:p>
+            <a:pPr algn="ctr"/>
+            <a:r>
+              <a:rPr lang="en-GB" sz="2800" i="0" dirty="0">
+                <a:effectLst/>
+                <a:latin typeface="Public Sans Bold" panose="020B0604020202020204" charset="0"/>
+              </a:rPr>
+              <a:t>DiabPredict</a:t>
+            </a:r>
+            <a:r>
+              <a:rPr lang="en-GB" sz="3200" i="0" dirty="0">
+                <a:effectLst/>
+                <a:latin typeface="Public Sans Bold" panose="020B0604020202020204" charset="0"/>
+              </a:rPr>
+              <a:t>+ </a:t>
+            </a:r>
+          </a:p>
+        </p:txBody>
+      </p:sp>
+      <p:sp>
+        <p:nvSpPr>
+          <p:cNvPr id="15" name="Freeform 11">
+            <a:extLst>
+              <a:ext uri="{FF2B5EF4-FFF2-40B4-BE49-F238E27FC236}">
+                <a16:creationId xmlns:a16="http://schemas.microsoft.com/office/drawing/2014/main" id="{2ECB01DE-7BE8-2C9C-E4CF-676BC0EE9227}"/>
+              </a:ext>
+            </a:extLst>
+          </p:cNvPr>
+          <p:cNvSpPr/>
+          <p:nvPr/>
+        </p:nvSpPr>
+        <p:spPr>
+          <a:xfrm>
+            <a:off x="1028700" y="8189346"/>
+            <a:ext cx="2168627" cy="2097654"/>
+          </a:xfrm>
+          <a:custGeom>
+            <a:avLst/>
+            <a:gdLst/>
+            <a:ahLst/>
+            <a:cxnLst/>
+            <a:rect l="l" t="t" r="r" b="b"/>
+            <a:pathLst>
+              <a:path w="2168627" h="2097654">
+                <a:moveTo>
+                  <a:pt x="0" y="0"/>
+                </a:moveTo>
+                <a:lnTo>
+                  <a:pt x="2168627" y="0"/>
+                </a:lnTo>
+                <a:lnTo>
+                  <a:pt x="2168627" y="2097654"/>
+                </a:lnTo>
+                <a:lnTo>
+                  <a:pt x="0" y="2097654"/>
+                </a:lnTo>
+                <a:lnTo>
+                  <a:pt x="0" y="0"/>
+                </a:lnTo>
+                <a:close/>
+              </a:path>
+            </a:pathLst>
+          </a:custGeom>
+          <a:blipFill>
+            <a:blip r:embed="rId4">
+              <a:extLst>
+                <a:ext uri="{96DAC541-7B7A-43D3-8B79-37D633B846F1}">
+                  <asvg:svgBlip xmlns:asvg="http://schemas.microsoft.com/office/drawing/2016/SVG/main" r:embed="rId5"/>
+                </a:ext>
+              </a:extLst>
+            </a:blip>
+            <a:stretch>
+              <a:fillRect/>
+            </a:stretch>
+          </a:blipFill>
+        </p:spPr>
+        <p:txBody>
+          <a:bodyPr/>
+          <a:lstStyle/>
+          <a:p>
+            <a:endParaRPr lang="en-US"/>
+          </a:p>
+        </p:txBody>
+      </p:sp>
     </p:spTree>
     <p:extLst>
       <p:ext uri="{BB962C8B-B14F-4D97-AF65-F5344CB8AC3E}">
@@ -6681,13 +7228,13 @@
           <p:nvPr>
             <p:extLst>
               <p:ext uri="{D42A27DB-BD31-4B8C-83A1-F6EECF244321}">
-                <p14:modId xmlns:p14="http://schemas.microsoft.com/office/powerpoint/2010/main" val="4165619433"/>
+                <p14:modId xmlns:p14="http://schemas.microsoft.com/office/powerpoint/2010/main" val="2319005890"/>
               </p:ext>
             </p:extLst>
           </p:nvPr>
         </p:nvGraphicFramePr>
         <p:xfrm>
-          <a:off x="2026069" y="2746202"/>
+          <a:off x="1524000" y="2746202"/>
           <a:ext cx="5895577" cy="6687868"/>
         </p:xfrm>
         <a:graphic>
@@ -7265,7 +7812,7 @@
         </p:nvSpPr>
         <p:spPr>
           <a:xfrm>
-            <a:off x="1555840" y="809625"/>
+            <a:off x="1012566" y="809625"/>
             <a:ext cx="6836034" cy="1362075"/>
           </a:xfrm>
           <a:prstGeom prst="rect">
@@ -7284,7 +7831,7 @@
               </a:lnSpc>
             </a:pPr>
             <a:r>
-              <a:rPr lang="en-US" sz="7500">
+              <a:rPr lang="en-US" sz="7500" dirty="0">
                 <a:solidFill>
                   <a:srgbClr val="222366"/>
                 </a:solidFill>
@@ -8889,7 +9436,7 @@
                 </a:solidFill>
                 <a:latin typeface="Public Sans"/>
               </a:rPr>
-              <a:t>Cleaned and pre-processed the collected data to handle missing values, converted categorical data to a numerical format and standardise features</a:t>
+              <a:t>Cleaned and pre-processed the collected data to handle missing values, converted categorical data to a numerical format and standardised features</a:t>
             </a:r>
           </a:p>
         </p:txBody>
@@ -9633,13 +10180,13 @@
               </a:lnSpc>
             </a:pPr>
             <a:r>
-              <a:rPr lang="en-US" sz="6300" dirty="0">
+              <a:rPr lang="en-US" sz="6200" dirty="0">
                 <a:solidFill>
                   <a:srgbClr val="222366"/>
                 </a:solidFill>
                 <a:latin typeface="Brick Sans"/>
               </a:rPr>
-              <a:t>MODEL FEATURE IMPORTANCES</a:t>
+              <a:t>Model Feature Importances</a:t>
             </a:r>
           </a:p>
         </p:txBody>
@@ -9652,7 +10199,7 @@
         </p:nvSpPr>
         <p:spPr>
           <a:xfrm rot="814863">
-            <a:off x="16482498" y="684374"/>
+            <a:off x="16558697" y="545984"/>
             <a:ext cx="1224051" cy="1204021"/>
           </a:xfrm>
           <a:custGeom>
@@ -11176,13 +11723,541 @@
       </p:grpSp>
       <p:sp>
         <p:nvSpPr>
-          <p:cNvPr id="40" name="Freeform 40"/>
+          <p:cNvPr id="41" name="TextBox 41"/>
+          <p:cNvSpPr txBox="1"/>
+          <p:nvPr/>
+        </p:nvSpPr>
+        <p:spPr>
+          <a:xfrm>
+            <a:off x="921119" y="3741242"/>
+            <a:ext cx="4592262" cy="930827"/>
+          </a:xfrm>
+          <a:prstGeom prst="rect">
+            <a:avLst/>
+          </a:prstGeom>
+        </p:spPr>
+        <p:txBody>
+          <a:bodyPr lIns="0" tIns="0" rIns="0" bIns="0" rtlCol="0" anchor="t">
+            <a:spAutoFit/>
+          </a:bodyPr>
+          <a:lstStyle/>
+          <a:p>
+            <a:pPr algn="ctr">
+              <a:lnSpc>
+                <a:spcPts val="3762"/>
+              </a:lnSpc>
+            </a:pPr>
+            <a:r>
+              <a:rPr lang="en-GB" sz="2687" dirty="0">
+                <a:solidFill>
+                  <a:srgbClr val="222366"/>
+                </a:solidFill>
+                <a:latin typeface="Public Sans"/>
+              </a:rPr>
+              <a:t>Trained a logistic regression model as a baseline model</a:t>
+            </a:r>
+          </a:p>
+        </p:txBody>
+      </p:sp>
+      <p:sp>
+        <p:nvSpPr>
+          <p:cNvPr id="42" name="TextBox 42"/>
+          <p:cNvSpPr txBox="1"/>
+          <p:nvPr/>
+        </p:nvSpPr>
+        <p:spPr>
+          <a:xfrm>
+            <a:off x="6789957" y="3340663"/>
+            <a:ext cx="4592262" cy="1906612"/>
+          </a:xfrm>
+          <a:prstGeom prst="rect">
+            <a:avLst/>
+          </a:prstGeom>
+        </p:spPr>
+        <p:txBody>
+          <a:bodyPr lIns="0" tIns="0" rIns="0" bIns="0" rtlCol="0" anchor="t">
+            <a:spAutoFit/>
+          </a:bodyPr>
+          <a:lstStyle/>
+          <a:p>
+            <a:pPr algn="ctr">
+              <a:lnSpc>
+                <a:spcPts val="3762"/>
+              </a:lnSpc>
+            </a:pPr>
+            <a:r>
+              <a:rPr lang="en-GB" sz="2687" dirty="0">
+                <a:solidFill>
+                  <a:srgbClr val="222366"/>
+                </a:solidFill>
+                <a:latin typeface="Public Sans"/>
+              </a:rPr>
+              <a:t>Implemented a random forest classifier to capture non-linear relationships between features</a:t>
+            </a:r>
+          </a:p>
+        </p:txBody>
+      </p:sp>
+      <p:sp>
+        <p:nvSpPr>
+          <p:cNvPr id="43" name="TextBox 43"/>
+          <p:cNvSpPr txBox="1"/>
+          <p:nvPr/>
+        </p:nvSpPr>
+        <p:spPr>
+          <a:xfrm>
+            <a:off x="921119" y="7124700"/>
+            <a:ext cx="4592262" cy="2393925"/>
+          </a:xfrm>
+          <a:prstGeom prst="rect">
+            <a:avLst/>
+          </a:prstGeom>
+        </p:spPr>
+        <p:txBody>
+          <a:bodyPr lIns="0" tIns="0" rIns="0" bIns="0" rtlCol="0" anchor="t">
+            <a:spAutoFit/>
+          </a:bodyPr>
+          <a:lstStyle/>
+          <a:p>
+            <a:pPr algn="ctr">
+              <a:lnSpc>
+                <a:spcPts val="3762"/>
+              </a:lnSpc>
+            </a:pPr>
+            <a:r>
+              <a:rPr lang="en-GB" sz="2687" dirty="0">
+                <a:solidFill>
+                  <a:srgbClr val="222366"/>
+                </a:solidFill>
+                <a:latin typeface="Public Sans"/>
+              </a:rPr>
+              <a:t>Employed SVM with different kernels to find the best separating hyperplane. (Chosen Kernel:</a:t>
+            </a:r>
+          </a:p>
+          <a:p>
+            <a:pPr algn="ctr">
+              <a:lnSpc>
+                <a:spcPts val="3762"/>
+              </a:lnSpc>
+            </a:pPr>
+            <a:r>
+              <a:rPr lang="en-GB" sz="2687" dirty="0">
+                <a:solidFill>
+                  <a:srgbClr val="222366"/>
+                </a:solidFill>
+                <a:latin typeface="Public Sans"/>
+              </a:rPr>
+              <a:t>Linear )</a:t>
+            </a:r>
+          </a:p>
+        </p:txBody>
+      </p:sp>
+      <p:sp>
+        <p:nvSpPr>
+          <p:cNvPr id="44" name="TextBox 44"/>
+          <p:cNvSpPr txBox="1"/>
+          <p:nvPr/>
+        </p:nvSpPr>
+        <p:spPr>
+          <a:xfrm>
+            <a:off x="6789957" y="7173897"/>
+            <a:ext cx="4592262" cy="1906612"/>
+          </a:xfrm>
+          <a:prstGeom prst="rect">
+            <a:avLst/>
+          </a:prstGeom>
+        </p:spPr>
+        <p:txBody>
+          <a:bodyPr lIns="0" tIns="0" rIns="0" bIns="0" rtlCol="0" anchor="t">
+            <a:spAutoFit/>
+          </a:bodyPr>
+          <a:lstStyle/>
+          <a:p>
+            <a:pPr algn="ctr">
+              <a:lnSpc>
+                <a:spcPts val="3762"/>
+              </a:lnSpc>
+            </a:pPr>
+            <a:r>
+              <a:rPr lang="en-GB" sz="2687" dirty="0">
+                <a:solidFill>
+                  <a:srgbClr val="222366"/>
+                </a:solidFill>
+                <a:latin typeface="Public Sans"/>
+              </a:rPr>
+              <a:t>Implemented KNN to classify data points based on the majority class of their nearest neighbours</a:t>
+            </a:r>
+          </a:p>
+        </p:txBody>
+      </p:sp>
+      <p:sp>
+        <p:nvSpPr>
+          <p:cNvPr id="45" name="TextBox 45"/>
+          <p:cNvSpPr txBox="1"/>
+          <p:nvPr/>
+        </p:nvSpPr>
+        <p:spPr>
+          <a:xfrm>
+            <a:off x="1411149" y="2363137"/>
+            <a:ext cx="3598497" cy="532150"/>
+          </a:xfrm>
+          <a:prstGeom prst="rect">
+            <a:avLst/>
+          </a:prstGeom>
+        </p:spPr>
+        <p:txBody>
+          <a:bodyPr lIns="0" tIns="0" rIns="0" bIns="0" rtlCol="0" anchor="t">
+            <a:spAutoFit/>
+          </a:bodyPr>
+          <a:lstStyle/>
+          <a:p>
+            <a:pPr algn="ctr">
+              <a:lnSpc>
+                <a:spcPts val="4213"/>
+              </a:lnSpc>
+            </a:pPr>
+            <a:r>
+              <a:rPr lang="en-US" sz="3009" dirty="0">
+                <a:solidFill>
+                  <a:srgbClr val="222366"/>
+                </a:solidFill>
+                <a:latin typeface="Public Sans Bold"/>
+              </a:rPr>
+              <a:t>Logistic Regression</a:t>
+            </a:r>
+          </a:p>
+        </p:txBody>
+      </p:sp>
+      <p:sp>
+        <p:nvSpPr>
+          <p:cNvPr id="46" name="TextBox 46"/>
+          <p:cNvSpPr txBox="1"/>
+          <p:nvPr/>
+        </p:nvSpPr>
+        <p:spPr>
+          <a:xfrm>
+            <a:off x="7279987" y="2363137"/>
+            <a:ext cx="3598497" cy="532150"/>
+          </a:xfrm>
+          <a:prstGeom prst="rect">
+            <a:avLst/>
+          </a:prstGeom>
+        </p:spPr>
+        <p:txBody>
+          <a:bodyPr lIns="0" tIns="0" rIns="0" bIns="0" rtlCol="0" anchor="t">
+            <a:spAutoFit/>
+          </a:bodyPr>
+          <a:lstStyle/>
+          <a:p>
+            <a:pPr algn="ctr">
+              <a:lnSpc>
+                <a:spcPts val="4213"/>
+              </a:lnSpc>
+            </a:pPr>
+            <a:r>
+              <a:rPr lang="en-US" sz="3009">
+                <a:solidFill>
+                  <a:srgbClr val="222366"/>
+                </a:solidFill>
+                <a:latin typeface="Public Sans Bold"/>
+              </a:rPr>
+              <a:t>Random Forest</a:t>
+            </a:r>
+          </a:p>
+        </p:txBody>
+      </p:sp>
+      <p:sp>
+        <p:nvSpPr>
+          <p:cNvPr id="47" name="TextBox 47"/>
+          <p:cNvSpPr txBox="1"/>
+          <p:nvPr/>
+        </p:nvSpPr>
+        <p:spPr>
+          <a:xfrm>
+            <a:off x="1411149" y="6324491"/>
+            <a:ext cx="3598497" cy="415043"/>
+          </a:xfrm>
+          <a:prstGeom prst="rect">
+            <a:avLst/>
+          </a:prstGeom>
+        </p:spPr>
+        <p:txBody>
+          <a:bodyPr lIns="0" tIns="0" rIns="0" bIns="0" rtlCol="0" anchor="t">
+            <a:spAutoFit/>
+          </a:bodyPr>
+          <a:lstStyle/>
+          <a:p>
+            <a:pPr algn="ctr">
+              <a:lnSpc>
+                <a:spcPts val="3373"/>
+              </a:lnSpc>
+            </a:pPr>
+            <a:r>
+              <a:rPr lang="en-US" sz="2409">
+                <a:solidFill>
+                  <a:srgbClr val="222366"/>
+                </a:solidFill>
+                <a:latin typeface="Public Sans Bold"/>
+              </a:rPr>
+              <a:t>Support Vector Machine</a:t>
+            </a:r>
+          </a:p>
+        </p:txBody>
+      </p:sp>
+      <p:sp>
+        <p:nvSpPr>
+          <p:cNvPr id="48" name="TextBox 48"/>
+          <p:cNvSpPr txBox="1"/>
+          <p:nvPr/>
+        </p:nvSpPr>
+        <p:spPr>
+          <a:xfrm>
+            <a:off x="7279987" y="6324491"/>
+            <a:ext cx="3598497" cy="464573"/>
+          </a:xfrm>
+          <a:prstGeom prst="rect">
+            <a:avLst/>
+          </a:prstGeom>
+        </p:spPr>
+        <p:txBody>
+          <a:bodyPr lIns="0" tIns="0" rIns="0" bIns="0" rtlCol="0" anchor="t">
+            <a:spAutoFit/>
+          </a:bodyPr>
+          <a:lstStyle/>
+          <a:p>
+            <a:pPr algn="ctr">
+              <a:lnSpc>
+                <a:spcPts val="3793"/>
+              </a:lnSpc>
+            </a:pPr>
+            <a:r>
+              <a:rPr lang="en-US" sz="2709">
+                <a:solidFill>
+                  <a:srgbClr val="222366"/>
+                </a:solidFill>
+                <a:latin typeface="Public Sans Bold"/>
+              </a:rPr>
+              <a:t>K-Nearest Neighbors</a:t>
+            </a:r>
+          </a:p>
+        </p:txBody>
+      </p:sp>
+      <p:sp>
+        <p:nvSpPr>
+          <p:cNvPr id="49" name="TextBox 49"/>
+          <p:cNvSpPr txBox="1"/>
+          <p:nvPr/>
+        </p:nvSpPr>
+        <p:spPr>
+          <a:xfrm>
+            <a:off x="1696011" y="557490"/>
+            <a:ext cx="14763189" cy="1144905"/>
+          </a:xfrm>
+          <a:prstGeom prst="rect">
+            <a:avLst/>
+          </a:prstGeom>
+        </p:spPr>
+        <p:txBody>
+          <a:bodyPr lIns="0" tIns="0" rIns="0" bIns="0" rtlCol="0" anchor="t">
+            <a:spAutoFit/>
+          </a:bodyPr>
+          <a:lstStyle/>
+          <a:p>
+            <a:pPr algn="ctr">
+              <a:lnSpc>
+                <a:spcPts val="8819"/>
+              </a:lnSpc>
+            </a:pPr>
+            <a:r>
+              <a:rPr lang="en-US" sz="6300" dirty="0">
+                <a:solidFill>
+                  <a:srgbClr val="222366"/>
+                </a:solidFill>
+                <a:latin typeface="Brick Sans"/>
+              </a:rPr>
+              <a:t>Machine Learning Models</a:t>
+            </a:r>
+          </a:p>
+        </p:txBody>
+      </p:sp>
+      <p:sp>
+        <p:nvSpPr>
+          <p:cNvPr id="50" name="TextBox 50"/>
+          <p:cNvSpPr txBox="1"/>
+          <p:nvPr/>
+        </p:nvSpPr>
+        <p:spPr>
+          <a:xfrm>
+            <a:off x="12711681" y="3435913"/>
+            <a:ext cx="4592262" cy="1419299"/>
+          </a:xfrm>
+          <a:prstGeom prst="rect">
+            <a:avLst/>
+          </a:prstGeom>
+        </p:spPr>
+        <p:txBody>
+          <a:bodyPr lIns="0" tIns="0" rIns="0" bIns="0" rtlCol="0" anchor="t">
+            <a:spAutoFit/>
+          </a:bodyPr>
+          <a:lstStyle/>
+          <a:p>
+            <a:pPr algn="ctr">
+              <a:lnSpc>
+                <a:spcPts val="3762"/>
+              </a:lnSpc>
+            </a:pPr>
+            <a:r>
+              <a:rPr lang="en-GB" sz="2687" dirty="0">
+                <a:solidFill>
+                  <a:srgbClr val="222366"/>
+                </a:solidFill>
+                <a:latin typeface="Public Sans"/>
+              </a:rPr>
+              <a:t>Built a decision tree classifier to understand the decision-making process</a:t>
+            </a:r>
+          </a:p>
+        </p:txBody>
+      </p:sp>
+      <p:sp>
+        <p:nvSpPr>
+          <p:cNvPr id="51" name="TextBox 51"/>
+          <p:cNvSpPr txBox="1"/>
+          <p:nvPr/>
+        </p:nvSpPr>
+        <p:spPr>
+          <a:xfrm>
+            <a:off x="12711681" y="7042190"/>
+            <a:ext cx="4592262" cy="2393925"/>
+          </a:xfrm>
+          <a:prstGeom prst="rect">
+            <a:avLst/>
+          </a:prstGeom>
+        </p:spPr>
+        <p:txBody>
+          <a:bodyPr lIns="0" tIns="0" rIns="0" bIns="0" rtlCol="0" anchor="t">
+            <a:spAutoFit/>
+          </a:bodyPr>
+          <a:lstStyle/>
+          <a:p>
+            <a:pPr algn="ctr">
+              <a:lnSpc>
+                <a:spcPts val="3762"/>
+              </a:lnSpc>
+            </a:pPr>
+            <a:r>
+              <a:rPr lang="en-GB" sz="2687" dirty="0">
+                <a:solidFill>
+                  <a:srgbClr val="222366"/>
+                </a:solidFill>
+                <a:latin typeface="Public Sans"/>
+              </a:rPr>
+              <a:t>Constructed a  Neural Network with multiple hidden layers using TensorFlow &amp; optimised it using </a:t>
+            </a:r>
+            <a:r>
+              <a:rPr lang="en-GB" sz="2687" dirty="0" err="1">
+                <a:solidFill>
+                  <a:srgbClr val="222366"/>
+                </a:solidFill>
+                <a:latin typeface="Public Sans"/>
+              </a:rPr>
+              <a:t>Keras</a:t>
+            </a:r>
+            <a:r>
+              <a:rPr lang="en-GB" sz="2687" dirty="0">
+                <a:solidFill>
+                  <a:srgbClr val="222366"/>
+                </a:solidFill>
+                <a:latin typeface="Public Sans"/>
+              </a:rPr>
+              <a:t>-Tuner</a:t>
+            </a:r>
+          </a:p>
+        </p:txBody>
+      </p:sp>
+      <p:sp>
+        <p:nvSpPr>
+          <p:cNvPr id="52" name="TextBox 52"/>
+          <p:cNvSpPr txBox="1"/>
+          <p:nvPr/>
+        </p:nvSpPr>
+        <p:spPr>
+          <a:xfrm>
+            <a:off x="13201710" y="2363137"/>
+            <a:ext cx="3598497" cy="532150"/>
+          </a:xfrm>
+          <a:prstGeom prst="rect">
+            <a:avLst/>
+          </a:prstGeom>
+        </p:spPr>
+        <p:txBody>
+          <a:bodyPr lIns="0" tIns="0" rIns="0" bIns="0" rtlCol="0" anchor="t">
+            <a:spAutoFit/>
+          </a:bodyPr>
+          <a:lstStyle/>
+          <a:p>
+            <a:pPr algn="ctr">
+              <a:lnSpc>
+                <a:spcPts val="4213"/>
+              </a:lnSpc>
+            </a:pPr>
+            <a:r>
+              <a:rPr lang="en-US" sz="3009">
+                <a:solidFill>
+                  <a:srgbClr val="222366"/>
+                </a:solidFill>
+                <a:latin typeface="Public Sans Bold"/>
+              </a:rPr>
+              <a:t>Decision Tree</a:t>
+            </a:r>
+          </a:p>
+        </p:txBody>
+      </p:sp>
+      <p:sp>
+        <p:nvSpPr>
+          <p:cNvPr id="53" name="TextBox 53"/>
+          <p:cNvSpPr txBox="1"/>
+          <p:nvPr/>
+        </p:nvSpPr>
+        <p:spPr>
+          <a:xfrm>
+            <a:off x="13201710" y="6270269"/>
+            <a:ext cx="3598497" cy="532150"/>
+          </a:xfrm>
+          <a:prstGeom prst="rect">
+            <a:avLst/>
+          </a:prstGeom>
+        </p:spPr>
+        <p:txBody>
+          <a:bodyPr lIns="0" tIns="0" rIns="0" bIns="0" rtlCol="0" anchor="t">
+            <a:spAutoFit/>
+          </a:bodyPr>
+          <a:lstStyle/>
+          <a:p>
+            <a:pPr algn="ctr">
+              <a:lnSpc>
+                <a:spcPts val="4213"/>
+              </a:lnSpc>
+            </a:pPr>
+            <a:r>
+              <a:rPr lang="en-US" sz="3009">
+                <a:solidFill>
+                  <a:srgbClr val="222366"/>
+                </a:solidFill>
+                <a:latin typeface="Public Sans Bold"/>
+              </a:rPr>
+              <a:t>Neural Networks</a:t>
+            </a:r>
+          </a:p>
+        </p:txBody>
+      </p:sp>
+      <p:sp>
+        <p:nvSpPr>
+          <p:cNvPr id="54" name="Freeform 54"/>
           <p:cNvSpPr/>
           <p:nvPr/>
         </p:nvSpPr>
         <p:spPr>
-          <a:xfrm rot="-829265">
-            <a:off x="694452" y="647318"/>
+          <a:xfrm rot="814863">
+            <a:off x="16558697" y="545984"/>
             <a:ext cx="1224051" cy="1204021"/>
           </a:xfrm>
           <a:custGeom>
@@ -11200,10 +12275,10 @@
                   <a:pt x="1224051" y="0"/>
                 </a:lnTo>
                 <a:lnTo>
-                  <a:pt x="1224051" y="1204021"/>
-                </a:lnTo>
-                <a:lnTo>
-                  <a:pt x="0" y="1204021"/>
+                  <a:pt x="1224051" y="1204020"/>
+                </a:lnTo>
+                <a:lnTo>
+                  <a:pt x="0" y="1204020"/>
                 </a:lnTo>
                 <a:lnTo>
                   <a:pt x="0" y="0"/>
@@ -11235,541 +12310,19 @@
       </p:sp>
       <p:sp>
         <p:nvSpPr>
-          <p:cNvPr id="41" name="TextBox 41"/>
-          <p:cNvSpPr txBox="1"/>
-          <p:nvPr/>
-        </p:nvSpPr>
-        <p:spPr>
-          <a:xfrm>
-            <a:off x="921119" y="3741242"/>
-            <a:ext cx="4592262" cy="930827"/>
-          </a:xfrm>
-          <a:prstGeom prst="rect">
-            <a:avLst/>
-          </a:prstGeom>
-        </p:spPr>
-        <p:txBody>
-          <a:bodyPr lIns="0" tIns="0" rIns="0" bIns="0" rtlCol="0" anchor="t">
-            <a:spAutoFit/>
-          </a:bodyPr>
-          <a:lstStyle/>
-          <a:p>
-            <a:pPr algn="ctr">
-              <a:lnSpc>
-                <a:spcPts val="3762"/>
-              </a:lnSpc>
-            </a:pPr>
-            <a:r>
-              <a:rPr lang="en-GB" sz="2687" dirty="0">
-                <a:solidFill>
-                  <a:srgbClr val="222366"/>
-                </a:solidFill>
-                <a:latin typeface="Public Sans"/>
-              </a:rPr>
-              <a:t>Trained a logistic regression model as a baseline model</a:t>
-            </a:r>
-          </a:p>
-        </p:txBody>
-      </p:sp>
-      <p:sp>
-        <p:nvSpPr>
-          <p:cNvPr id="42" name="TextBox 42"/>
-          <p:cNvSpPr txBox="1"/>
-          <p:nvPr/>
-        </p:nvSpPr>
-        <p:spPr>
-          <a:xfrm>
-            <a:off x="6789957" y="3340663"/>
-            <a:ext cx="4592262" cy="1906612"/>
-          </a:xfrm>
-          <a:prstGeom prst="rect">
-            <a:avLst/>
-          </a:prstGeom>
-        </p:spPr>
-        <p:txBody>
-          <a:bodyPr lIns="0" tIns="0" rIns="0" bIns="0" rtlCol="0" anchor="t">
-            <a:spAutoFit/>
-          </a:bodyPr>
-          <a:lstStyle/>
-          <a:p>
-            <a:pPr algn="ctr">
-              <a:lnSpc>
-                <a:spcPts val="3762"/>
-              </a:lnSpc>
-            </a:pPr>
-            <a:r>
-              <a:rPr lang="en-GB" sz="2687" dirty="0">
-                <a:solidFill>
-                  <a:srgbClr val="222366"/>
-                </a:solidFill>
-                <a:latin typeface="Public Sans"/>
-              </a:rPr>
-              <a:t>Implemented a random forest classifier to capture non-linear relationships between features</a:t>
-            </a:r>
-          </a:p>
-        </p:txBody>
-      </p:sp>
-      <p:sp>
-        <p:nvSpPr>
-          <p:cNvPr id="43" name="TextBox 43"/>
-          <p:cNvSpPr txBox="1"/>
-          <p:nvPr/>
-        </p:nvSpPr>
-        <p:spPr>
-          <a:xfrm>
-            <a:off x="921119" y="7307247"/>
-            <a:ext cx="4592262" cy="2393925"/>
-          </a:xfrm>
-          <a:prstGeom prst="rect">
-            <a:avLst/>
-          </a:prstGeom>
-        </p:spPr>
-        <p:txBody>
-          <a:bodyPr lIns="0" tIns="0" rIns="0" bIns="0" rtlCol="0" anchor="t">
-            <a:spAutoFit/>
-          </a:bodyPr>
-          <a:lstStyle/>
-          <a:p>
-            <a:pPr algn="ctr">
-              <a:lnSpc>
-                <a:spcPts val="3762"/>
-              </a:lnSpc>
-            </a:pPr>
-            <a:r>
-              <a:rPr lang="en-GB" sz="2687" dirty="0">
-                <a:solidFill>
-                  <a:srgbClr val="222366"/>
-                </a:solidFill>
-                <a:latin typeface="Public Sans"/>
-              </a:rPr>
-              <a:t>Employed SVM with different kernels to find the best separating hyperplane. (Chosen Kernel:</a:t>
-            </a:r>
-          </a:p>
-          <a:p>
-            <a:pPr algn="ctr">
-              <a:lnSpc>
-                <a:spcPts val="3762"/>
-              </a:lnSpc>
-            </a:pPr>
-            <a:r>
-              <a:rPr lang="en-GB" sz="2687" dirty="0">
-                <a:solidFill>
-                  <a:srgbClr val="222366"/>
-                </a:solidFill>
-                <a:latin typeface="Public Sans"/>
-              </a:rPr>
-              <a:t>Linear )</a:t>
-            </a:r>
-          </a:p>
-        </p:txBody>
-      </p:sp>
-      <p:sp>
-        <p:nvSpPr>
-          <p:cNvPr id="44" name="TextBox 44"/>
-          <p:cNvSpPr txBox="1"/>
-          <p:nvPr/>
-        </p:nvSpPr>
-        <p:spPr>
-          <a:xfrm>
-            <a:off x="6789957" y="7173897"/>
-            <a:ext cx="4592262" cy="1906612"/>
-          </a:xfrm>
-          <a:prstGeom prst="rect">
-            <a:avLst/>
-          </a:prstGeom>
-        </p:spPr>
-        <p:txBody>
-          <a:bodyPr lIns="0" tIns="0" rIns="0" bIns="0" rtlCol="0" anchor="t">
-            <a:spAutoFit/>
-          </a:bodyPr>
-          <a:lstStyle/>
-          <a:p>
-            <a:pPr algn="ctr">
-              <a:lnSpc>
-                <a:spcPts val="3762"/>
-              </a:lnSpc>
-            </a:pPr>
-            <a:r>
-              <a:rPr lang="en-GB" sz="2687" dirty="0">
-                <a:solidFill>
-                  <a:srgbClr val="222366"/>
-                </a:solidFill>
-                <a:latin typeface="Public Sans"/>
-              </a:rPr>
-              <a:t>Implemented KNN to classify data points based on the majority class of their nearest neighbours</a:t>
-            </a:r>
-          </a:p>
-        </p:txBody>
-      </p:sp>
-      <p:sp>
-        <p:nvSpPr>
-          <p:cNvPr id="45" name="TextBox 45"/>
-          <p:cNvSpPr txBox="1"/>
-          <p:nvPr/>
-        </p:nvSpPr>
-        <p:spPr>
-          <a:xfrm>
-            <a:off x="1411149" y="2363137"/>
-            <a:ext cx="3598497" cy="532150"/>
-          </a:xfrm>
-          <a:prstGeom prst="rect">
-            <a:avLst/>
-          </a:prstGeom>
-        </p:spPr>
-        <p:txBody>
-          <a:bodyPr lIns="0" tIns="0" rIns="0" bIns="0" rtlCol="0" anchor="t">
-            <a:spAutoFit/>
-          </a:bodyPr>
-          <a:lstStyle/>
-          <a:p>
-            <a:pPr algn="ctr">
-              <a:lnSpc>
-                <a:spcPts val="4213"/>
-              </a:lnSpc>
-            </a:pPr>
-            <a:r>
-              <a:rPr lang="en-US" sz="3009">
-                <a:solidFill>
-                  <a:srgbClr val="222366"/>
-                </a:solidFill>
-                <a:latin typeface="Public Sans Bold"/>
-              </a:rPr>
-              <a:t>Logistic Regression</a:t>
-            </a:r>
-          </a:p>
-        </p:txBody>
-      </p:sp>
-      <p:sp>
-        <p:nvSpPr>
-          <p:cNvPr id="46" name="TextBox 46"/>
-          <p:cNvSpPr txBox="1"/>
-          <p:nvPr/>
-        </p:nvSpPr>
-        <p:spPr>
-          <a:xfrm>
-            <a:off x="7279987" y="2363137"/>
-            <a:ext cx="3598497" cy="532150"/>
-          </a:xfrm>
-          <a:prstGeom prst="rect">
-            <a:avLst/>
-          </a:prstGeom>
-        </p:spPr>
-        <p:txBody>
-          <a:bodyPr lIns="0" tIns="0" rIns="0" bIns="0" rtlCol="0" anchor="t">
-            <a:spAutoFit/>
-          </a:bodyPr>
-          <a:lstStyle/>
-          <a:p>
-            <a:pPr algn="ctr">
-              <a:lnSpc>
-                <a:spcPts val="4213"/>
-              </a:lnSpc>
-            </a:pPr>
-            <a:r>
-              <a:rPr lang="en-US" sz="3009">
-                <a:solidFill>
-                  <a:srgbClr val="222366"/>
-                </a:solidFill>
-                <a:latin typeface="Public Sans Bold"/>
-              </a:rPr>
-              <a:t>Random Forest</a:t>
-            </a:r>
-          </a:p>
-        </p:txBody>
-      </p:sp>
-      <p:sp>
-        <p:nvSpPr>
-          <p:cNvPr id="47" name="TextBox 47"/>
-          <p:cNvSpPr txBox="1"/>
-          <p:nvPr/>
-        </p:nvSpPr>
-        <p:spPr>
-          <a:xfrm>
-            <a:off x="1411149" y="6324491"/>
-            <a:ext cx="3598497" cy="415043"/>
-          </a:xfrm>
-          <a:prstGeom prst="rect">
-            <a:avLst/>
-          </a:prstGeom>
-        </p:spPr>
-        <p:txBody>
-          <a:bodyPr lIns="0" tIns="0" rIns="0" bIns="0" rtlCol="0" anchor="t">
-            <a:spAutoFit/>
-          </a:bodyPr>
-          <a:lstStyle/>
-          <a:p>
-            <a:pPr algn="ctr">
-              <a:lnSpc>
-                <a:spcPts val="3373"/>
-              </a:lnSpc>
-            </a:pPr>
-            <a:r>
-              <a:rPr lang="en-US" sz="2409">
-                <a:solidFill>
-                  <a:srgbClr val="222366"/>
-                </a:solidFill>
-                <a:latin typeface="Public Sans Bold"/>
-              </a:rPr>
-              <a:t>Support Vector Machine</a:t>
-            </a:r>
-          </a:p>
-        </p:txBody>
-      </p:sp>
-      <p:sp>
-        <p:nvSpPr>
-          <p:cNvPr id="48" name="TextBox 48"/>
-          <p:cNvSpPr txBox="1"/>
-          <p:nvPr/>
-        </p:nvSpPr>
-        <p:spPr>
-          <a:xfrm>
-            <a:off x="7279987" y="6324491"/>
-            <a:ext cx="3598497" cy="464573"/>
-          </a:xfrm>
-          <a:prstGeom prst="rect">
-            <a:avLst/>
-          </a:prstGeom>
-        </p:spPr>
-        <p:txBody>
-          <a:bodyPr lIns="0" tIns="0" rIns="0" bIns="0" rtlCol="0" anchor="t">
-            <a:spAutoFit/>
-          </a:bodyPr>
-          <a:lstStyle/>
-          <a:p>
-            <a:pPr algn="ctr">
-              <a:lnSpc>
-                <a:spcPts val="3793"/>
-              </a:lnSpc>
-            </a:pPr>
-            <a:r>
-              <a:rPr lang="en-US" sz="2709">
-                <a:solidFill>
-                  <a:srgbClr val="222366"/>
-                </a:solidFill>
-                <a:latin typeface="Public Sans Bold"/>
-              </a:rPr>
-              <a:t>K-Nearest Neighbors</a:t>
-            </a:r>
-          </a:p>
-        </p:txBody>
-      </p:sp>
-      <p:sp>
-        <p:nvSpPr>
-          <p:cNvPr id="49" name="TextBox 49"/>
-          <p:cNvSpPr txBox="1"/>
-          <p:nvPr/>
-        </p:nvSpPr>
-        <p:spPr>
-          <a:xfrm>
-            <a:off x="1762406" y="557490"/>
-            <a:ext cx="14763189" cy="1144905"/>
-          </a:xfrm>
-          <a:prstGeom prst="rect">
-            <a:avLst/>
-          </a:prstGeom>
-        </p:spPr>
-        <p:txBody>
-          <a:bodyPr lIns="0" tIns="0" rIns="0" bIns="0" rtlCol="0" anchor="t">
-            <a:spAutoFit/>
-          </a:bodyPr>
-          <a:lstStyle/>
-          <a:p>
-            <a:pPr algn="ctr">
-              <a:lnSpc>
-                <a:spcPts val="8819"/>
-              </a:lnSpc>
-            </a:pPr>
-            <a:r>
-              <a:rPr lang="en-US" sz="6300">
-                <a:solidFill>
-                  <a:srgbClr val="222366"/>
-                </a:solidFill>
-                <a:latin typeface="Brick Sans"/>
-              </a:rPr>
-              <a:t>Machine Learning Models</a:t>
-            </a:r>
-          </a:p>
-        </p:txBody>
-      </p:sp>
-      <p:sp>
-        <p:nvSpPr>
-          <p:cNvPr id="50" name="TextBox 50"/>
-          <p:cNvSpPr txBox="1"/>
-          <p:nvPr/>
-        </p:nvSpPr>
-        <p:spPr>
-          <a:xfrm>
-            <a:off x="12711681" y="3435913"/>
-            <a:ext cx="4592262" cy="1419299"/>
-          </a:xfrm>
-          <a:prstGeom prst="rect">
-            <a:avLst/>
-          </a:prstGeom>
-        </p:spPr>
-        <p:txBody>
-          <a:bodyPr lIns="0" tIns="0" rIns="0" bIns="0" rtlCol="0" anchor="t">
-            <a:spAutoFit/>
-          </a:bodyPr>
-          <a:lstStyle/>
-          <a:p>
-            <a:pPr algn="ctr">
-              <a:lnSpc>
-                <a:spcPts val="3762"/>
-              </a:lnSpc>
-            </a:pPr>
-            <a:r>
-              <a:rPr lang="en-GB" sz="2687" dirty="0">
-                <a:solidFill>
-                  <a:srgbClr val="222366"/>
-                </a:solidFill>
-                <a:latin typeface="Public Sans"/>
-              </a:rPr>
-              <a:t>Built a decision tree classifier to understand the decision-making process</a:t>
-            </a:r>
-          </a:p>
-        </p:txBody>
-      </p:sp>
-      <p:sp>
-        <p:nvSpPr>
-          <p:cNvPr id="51" name="TextBox 51"/>
-          <p:cNvSpPr txBox="1"/>
-          <p:nvPr/>
-        </p:nvSpPr>
-        <p:spPr>
-          <a:xfrm>
-            <a:off x="12711681" y="7042190"/>
-            <a:ext cx="4592262" cy="2393925"/>
-          </a:xfrm>
-          <a:prstGeom prst="rect">
-            <a:avLst/>
-          </a:prstGeom>
-        </p:spPr>
-        <p:txBody>
-          <a:bodyPr lIns="0" tIns="0" rIns="0" bIns="0" rtlCol="0" anchor="t">
-            <a:spAutoFit/>
-          </a:bodyPr>
-          <a:lstStyle/>
-          <a:p>
-            <a:pPr algn="ctr">
-              <a:lnSpc>
-                <a:spcPts val="3762"/>
-              </a:lnSpc>
-            </a:pPr>
-            <a:r>
-              <a:rPr lang="en-GB" sz="2687" dirty="0">
-                <a:solidFill>
-                  <a:srgbClr val="222366"/>
-                </a:solidFill>
-                <a:latin typeface="Public Sans"/>
-              </a:rPr>
-              <a:t>Constructed a  Neural Network with multiple hidden layers using TensorFlow &amp; optimised it using </a:t>
-            </a:r>
-            <a:r>
-              <a:rPr lang="en-GB" sz="2687" dirty="0" err="1">
-                <a:solidFill>
-                  <a:srgbClr val="222366"/>
-                </a:solidFill>
-                <a:latin typeface="Public Sans"/>
-              </a:rPr>
-              <a:t>Keras</a:t>
-            </a:r>
-            <a:r>
-              <a:rPr lang="en-GB" sz="2687" dirty="0">
-                <a:solidFill>
-                  <a:srgbClr val="222366"/>
-                </a:solidFill>
-                <a:latin typeface="Public Sans"/>
-              </a:rPr>
-              <a:t>-Tuner</a:t>
-            </a:r>
-          </a:p>
-        </p:txBody>
-      </p:sp>
-      <p:sp>
-        <p:nvSpPr>
-          <p:cNvPr id="52" name="TextBox 52"/>
-          <p:cNvSpPr txBox="1"/>
-          <p:nvPr/>
-        </p:nvSpPr>
-        <p:spPr>
-          <a:xfrm>
-            <a:off x="13201710" y="2363137"/>
-            <a:ext cx="3598497" cy="532150"/>
-          </a:xfrm>
-          <a:prstGeom prst="rect">
-            <a:avLst/>
-          </a:prstGeom>
-        </p:spPr>
-        <p:txBody>
-          <a:bodyPr lIns="0" tIns="0" rIns="0" bIns="0" rtlCol="0" anchor="t">
-            <a:spAutoFit/>
-          </a:bodyPr>
-          <a:lstStyle/>
-          <a:p>
-            <a:pPr algn="ctr">
-              <a:lnSpc>
-                <a:spcPts val="4213"/>
-              </a:lnSpc>
-            </a:pPr>
-            <a:r>
-              <a:rPr lang="en-US" sz="3009">
-                <a:solidFill>
-                  <a:srgbClr val="222366"/>
-                </a:solidFill>
-                <a:latin typeface="Public Sans Bold"/>
-              </a:rPr>
-              <a:t>Decision Tree</a:t>
-            </a:r>
-          </a:p>
-        </p:txBody>
-      </p:sp>
-      <p:sp>
-        <p:nvSpPr>
-          <p:cNvPr id="53" name="TextBox 53"/>
-          <p:cNvSpPr txBox="1"/>
-          <p:nvPr/>
-        </p:nvSpPr>
-        <p:spPr>
-          <a:xfrm>
-            <a:off x="13201710" y="6270269"/>
-            <a:ext cx="3598497" cy="532150"/>
-          </a:xfrm>
-          <a:prstGeom prst="rect">
-            <a:avLst/>
-          </a:prstGeom>
-        </p:spPr>
-        <p:txBody>
-          <a:bodyPr lIns="0" tIns="0" rIns="0" bIns="0" rtlCol="0" anchor="t">
-            <a:spAutoFit/>
-          </a:bodyPr>
-          <a:lstStyle/>
-          <a:p>
-            <a:pPr algn="ctr">
-              <a:lnSpc>
-                <a:spcPts val="4213"/>
-              </a:lnSpc>
-            </a:pPr>
-            <a:r>
-              <a:rPr lang="en-US" sz="3009">
-                <a:solidFill>
-                  <a:srgbClr val="222366"/>
-                </a:solidFill>
-                <a:latin typeface="Public Sans Bold"/>
-              </a:rPr>
-              <a:t>Neural Networks</a:t>
-            </a:r>
-          </a:p>
-        </p:txBody>
-      </p:sp>
-      <p:sp>
-        <p:nvSpPr>
-          <p:cNvPr id="54" name="Freeform 54"/>
+          <p:cNvPr id="55" name="Freeform 40">
+            <a:extLst>
+              <a:ext uri="{FF2B5EF4-FFF2-40B4-BE49-F238E27FC236}">
+                <a16:creationId xmlns:a16="http://schemas.microsoft.com/office/drawing/2014/main" id="{19CC46C9-4870-08A5-6D05-5252DDA12176}"/>
+              </a:ext>
+            </a:extLst>
+          </p:cNvPr>
           <p:cNvSpPr/>
           <p:nvPr/>
         </p:nvSpPr>
         <p:spPr>
-          <a:xfrm rot="814863">
-            <a:off x="16482498" y="684374"/>
+          <a:xfrm rot="-829265">
+            <a:off x="444917" y="453986"/>
             <a:ext cx="1224051" cy="1204021"/>
           </a:xfrm>
           <a:custGeom>
@@ -11787,10 +12340,10 @@
                   <a:pt x="1224051" y="0"/>
                 </a:lnTo>
                 <a:lnTo>
-                  <a:pt x="1224051" y="1204020"/>
-                </a:lnTo>
-                <a:lnTo>
-                  <a:pt x="0" y="1204020"/>
+                  <a:pt x="1224051" y="1204021"/>
+                </a:lnTo>
+                <a:lnTo>
+                  <a:pt x="0" y="1204021"/>
                 </a:lnTo>
                 <a:lnTo>
                   <a:pt x="0" y="0"/>
@@ -13526,72 +14079,13 @@
       </p:grpSpPr>
       <p:sp>
         <p:nvSpPr>
-          <p:cNvPr id="11" name="Freeform 11"/>
-          <p:cNvSpPr/>
-          <p:nvPr/>
-        </p:nvSpPr>
-        <p:spPr>
-          <a:xfrm>
-            <a:off x="152400" y="8189346"/>
-            <a:ext cx="2168627" cy="2097654"/>
-          </a:xfrm>
-          <a:custGeom>
-            <a:avLst/>
-            <a:gdLst/>
-            <a:ahLst/>
-            <a:cxnLst/>
-            <a:rect l="l" t="t" r="r" b="b"/>
-            <a:pathLst>
-              <a:path w="2168627" h="2097654">
-                <a:moveTo>
-                  <a:pt x="0" y="0"/>
-                </a:moveTo>
-                <a:lnTo>
-                  <a:pt x="2168627" y="0"/>
-                </a:lnTo>
-                <a:lnTo>
-                  <a:pt x="2168627" y="2097654"/>
-                </a:lnTo>
-                <a:lnTo>
-                  <a:pt x="0" y="2097654"/>
-                </a:lnTo>
-                <a:lnTo>
-                  <a:pt x="0" y="0"/>
-                </a:lnTo>
-                <a:close/>
-              </a:path>
-            </a:pathLst>
-          </a:custGeom>
-          <a:blipFill>
-            <a:blip r:embed="rId2">
-              <a:extLst>
-                <a:ext uri="{96DAC541-7B7A-43D3-8B79-37D633B846F1}">
-                  <asvg:svgBlip xmlns:asvg="http://schemas.microsoft.com/office/drawing/2016/SVG/main" r:embed="rId3"/>
-                </a:ext>
-              </a:extLst>
-            </a:blip>
-            <a:stretch>
-              <a:fillRect/>
-            </a:stretch>
-          </a:blipFill>
-        </p:spPr>
-        <p:txBody>
-          <a:bodyPr/>
-          <a:lstStyle/>
-          <a:p>
-            <a:endParaRPr lang="en-US"/>
-          </a:p>
-        </p:txBody>
-      </p:sp>
-      <p:sp>
-        <p:nvSpPr>
           <p:cNvPr id="13" name="TextBox 13"/>
           <p:cNvSpPr txBox="1"/>
           <p:nvPr/>
         </p:nvSpPr>
         <p:spPr>
           <a:xfrm>
-            <a:off x="1771931" y="271740"/>
+            <a:off x="1771931" y="190500"/>
             <a:ext cx="14763189" cy="993477"/>
           </a:xfrm>
           <a:prstGeom prst="rect">
@@ -13636,15 +14130,15 @@
           <p:nvPr/>
         </p:nvPicPr>
         <p:blipFill>
-          <a:blip r:embed="rId4"/>
+          <a:blip r:embed="rId2"/>
           <a:stretch>
             <a:fillRect/>
           </a:stretch>
         </p:blipFill>
         <p:spPr>
           <a:xfrm>
-            <a:off x="609600" y="1454769"/>
-            <a:ext cx="17363788" cy="6490596"/>
+            <a:off x="1143000" y="1500198"/>
+            <a:ext cx="16002000" cy="6310302"/>
           </a:xfrm>
           <a:prstGeom prst="rect">
             <a:avLst/>
@@ -13680,6 +14174,71 @@
           </a:sp3d>
         </p:spPr>
       </p:pic>
+      <p:sp>
+        <p:nvSpPr>
+          <p:cNvPr id="2" name="Freeform 11">
+            <a:extLst>
+              <a:ext uri="{FF2B5EF4-FFF2-40B4-BE49-F238E27FC236}">
+                <a16:creationId xmlns:a16="http://schemas.microsoft.com/office/drawing/2014/main" id="{992CC301-3AD0-3305-9424-2A78F98731C9}"/>
+              </a:ext>
+            </a:extLst>
+          </p:cNvPr>
+          <p:cNvSpPr/>
+          <p:nvPr/>
+        </p:nvSpPr>
+        <p:spPr>
+          <a:xfrm>
+            <a:off x="1028700" y="8189346"/>
+            <a:ext cx="2168627" cy="2097654"/>
+          </a:xfrm>
+          <a:custGeom>
+            <a:avLst/>
+            <a:gdLst/>
+            <a:ahLst/>
+            <a:cxnLst/>
+            <a:rect l="l" t="t" r="r" b="b"/>
+            <a:pathLst>
+              <a:path w="2168627" h="2097654">
+                <a:moveTo>
+                  <a:pt x="0" y="0"/>
+                </a:moveTo>
+                <a:lnTo>
+                  <a:pt x="2168627" y="0"/>
+                </a:lnTo>
+                <a:lnTo>
+                  <a:pt x="2168627" y="2097654"/>
+                </a:lnTo>
+                <a:lnTo>
+                  <a:pt x="0" y="2097654"/>
+                </a:lnTo>
+                <a:lnTo>
+                  <a:pt x="0" y="0"/>
+                </a:lnTo>
+                <a:close/>
+              </a:path>
+            </a:pathLst>
+          </a:custGeom>
+          <a:blipFill>
+            <a:blip r:embed="rId3">
+              <a:extLst>
+                <a:ext uri="{96DAC541-7B7A-43D3-8B79-37D633B846F1}">
+                  <asvg:svgBlip xmlns:asvg="http://schemas.microsoft.com/office/drawing/2016/SVG/main" r:embed="rId4"/>
+                </a:ext>
+              </a:extLst>
+            </a:blip>
+            <a:stretch>
+              <a:fillRect/>
+            </a:stretch>
+          </a:blipFill>
+        </p:spPr>
+        <p:txBody>
+          <a:bodyPr/>
+          <a:lstStyle/>
+          <a:p>
+            <a:endParaRPr lang="en-US"/>
+          </a:p>
+        </p:txBody>
+      </p:sp>
     </p:spTree>
     <p:extLst>
       <p:ext uri="{BB962C8B-B14F-4D97-AF65-F5344CB8AC3E}">

</xml_diff>

<commit_message>
minor change to a slide layout
</commit_message>
<xml_diff>
--- a/presentation/presentation.pptx
+++ b/presentation/presentation.pptx
@@ -175,6 +175,69 @@
 
 <file path=ppt/changesInfos/changesInfo1.xml><?xml version="1.0" encoding="utf-8"?>
 <pc:chgInfo xmlns:a="http://schemas.openxmlformats.org/drawingml/2006/main" xmlns:r="http://schemas.openxmlformats.org/officeDocument/2006/relationships" xmlns:ac="http://schemas.microsoft.com/office/drawing/2013/main/command" xmlns:pc="http://schemas.microsoft.com/office/powerpoint/2013/main/command">
+  <pc:docChgLst>
+    <pc:chgData name="Aysha Gheewala" userId="819ba6fb6ea0380f" providerId="LiveId" clId="{E350AD09-D01D-4030-8400-341479BF05EF}"/>
+    <pc:docChg chg="modSld">
+      <pc:chgData name="Aysha Gheewala" userId="819ba6fb6ea0380f" providerId="LiveId" clId="{E350AD09-D01D-4030-8400-341479BF05EF}" dt="2024-04-04T15:36:01.347" v="11" actId="1037"/>
+      <pc:docMkLst>
+        <pc:docMk/>
+      </pc:docMkLst>
+      <pc:sldChg chg="modSp mod">
+        <pc:chgData name="Aysha Gheewala" userId="819ba6fb6ea0380f" providerId="LiveId" clId="{E350AD09-D01D-4030-8400-341479BF05EF}" dt="2024-04-04T15:34:36.438" v="5" actId="732"/>
+        <pc:sldMkLst>
+          <pc:docMk/>
+          <pc:sldMk cId="929031580" sldId="269"/>
+        </pc:sldMkLst>
+        <pc:spChg chg="mod modCrop">
+          <ac:chgData name="Aysha Gheewala" userId="819ba6fb6ea0380f" providerId="LiveId" clId="{E350AD09-D01D-4030-8400-341479BF05EF}" dt="2024-04-04T15:34:36.438" v="5" actId="732"/>
+          <ac:spMkLst>
+            <pc:docMk/>
+            <pc:sldMk cId="929031580" sldId="269"/>
+            <ac:spMk id="3" creationId="{00000000-0000-0000-0000-000000000000}"/>
+          </ac:spMkLst>
+        </pc:spChg>
+      </pc:sldChg>
+      <pc:sldChg chg="modSp mod">
+        <pc:chgData name="Aysha Gheewala" userId="819ba6fb6ea0380f" providerId="LiveId" clId="{E350AD09-D01D-4030-8400-341479BF05EF}" dt="2024-04-04T15:36:01.347" v="11" actId="1037"/>
+        <pc:sldMkLst>
+          <pc:docMk/>
+          <pc:sldMk cId="3327471935" sldId="270"/>
+        </pc:sldMkLst>
+        <pc:spChg chg="mod">
+          <ac:chgData name="Aysha Gheewala" userId="819ba6fb6ea0380f" providerId="LiveId" clId="{E350AD09-D01D-4030-8400-341479BF05EF}" dt="2024-04-04T15:36:01.347" v="11" actId="1037"/>
+          <ac:spMkLst>
+            <pc:docMk/>
+            <pc:sldMk cId="3327471935" sldId="270"/>
+            <ac:spMk id="10" creationId="{B6D88411-24F2-D8CB-35D8-20D7235E22B5}"/>
+          </ac:spMkLst>
+        </pc:spChg>
+        <pc:spChg chg="mod">
+          <ac:chgData name="Aysha Gheewala" userId="819ba6fb6ea0380f" providerId="LiveId" clId="{E350AD09-D01D-4030-8400-341479BF05EF}" dt="2024-04-04T15:33:41.053" v="4" actId="1076"/>
+          <ac:spMkLst>
+            <pc:docMk/>
+            <pc:sldMk cId="3327471935" sldId="270"/>
+            <ac:spMk id="12" creationId="{C62A4496-7570-195B-9992-9A66B79D3445}"/>
+          </ac:spMkLst>
+        </pc:spChg>
+        <pc:grpChg chg="mod">
+          <ac:chgData name="Aysha Gheewala" userId="819ba6fb6ea0380f" providerId="LiveId" clId="{E350AD09-D01D-4030-8400-341479BF05EF}" dt="2024-04-04T15:33:19.768" v="2" actId="1076"/>
+          <ac:grpSpMkLst>
+            <pc:docMk/>
+            <pc:sldMk cId="3327471935" sldId="270"/>
+            <ac:grpSpMk id="5" creationId="{6BEC1080-5F5C-83CE-BAB6-6CF35B099C7D}"/>
+          </ac:grpSpMkLst>
+        </pc:grpChg>
+        <pc:picChg chg="mod">
+          <ac:chgData name="Aysha Gheewala" userId="819ba6fb6ea0380f" providerId="LiveId" clId="{E350AD09-D01D-4030-8400-341479BF05EF}" dt="2024-04-04T15:33:10.601" v="1" actId="1076"/>
+          <ac:picMkLst>
+            <pc:docMk/>
+            <pc:sldMk cId="3327471935" sldId="270"/>
+            <ac:picMk id="4" creationId="{24708E8B-DC8C-0644-B695-9FBC42E1CEFE}"/>
+          </ac:picMkLst>
+        </pc:picChg>
+      </pc:sldChg>
+    </pc:docChg>
+  </pc:docChgLst>
   <pc:docChgLst>
     <pc:chgData name="Aysha Gheewala" userId="819ba6fb6ea0380f" providerId="LiveId" clId="{650812C4-EEA9-4F2B-9F39-40FEADFCFB65}"/>
     <pc:docChg chg="undo redo custSel addSld modSld">
@@ -503,7 +566,7 @@
           <a:p>
             <a:fld id="{85BA90B5-C4B4-C647-BC3D-46BF24662E26}" type="datetimeFigureOut">
               <a:rPr lang="en-US" smtClean="0"/>
-              <a:t>4/3/2024</a:t>
+              <a:t>4/4/2024</a:t>
             </a:fld>
             <a:endParaRPr lang="en-US"/>
           </a:p>
@@ -3027,7 +3090,7 @@
             <a:fld id="{1D8BD707-D9CF-40AE-B4C6-C98DA3205C09}" type="datetimeFigureOut">
               <a:rPr lang="en-US" smtClean="0"/>
               <a:pPr/>
-              <a:t>4/3/2024</a:t>
+              <a:t>4/4/2024</a:t>
             </a:fld>
             <a:endParaRPr lang="en-US"/>
           </a:p>
@@ -3192,7 +3255,7 @@
             <a:fld id="{1D8BD707-D9CF-40AE-B4C6-C98DA3205C09}" type="datetimeFigureOut">
               <a:rPr lang="en-US" smtClean="0"/>
               <a:pPr/>
-              <a:t>4/3/2024</a:t>
+              <a:t>4/4/2024</a:t>
             </a:fld>
             <a:endParaRPr lang="en-US"/>
           </a:p>
@@ -3367,7 +3430,7 @@
             <a:fld id="{1D8BD707-D9CF-40AE-B4C6-C98DA3205C09}" type="datetimeFigureOut">
               <a:rPr lang="en-US" smtClean="0"/>
               <a:pPr/>
-              <a:t>4/3/2024</a:t>
+              <a:t>4/4/2024</a:t>
             </a:fld>
             <a:endParaRPr lang="en-US"/>
           </a:p>
@@ -3532,7 +3595,7 @@
             <a:fld id="{1D8BD707-D9CF-40AE-B4C6-C98DA3205C09}" type="datetimeFigureOut">
               <a:rPr lang="en-US" smtClean="0"/>
               <a:pPr/>
-              <a:t>4/3/2024</a:t>
+              <a:t>4/4/2024</a:t>
             </a:fld>
             <a:endParaRPr lang="en-US"/>
           </a:p>
@@ -3774,7 +3837,7 @@
             <a:fld id="{1D8BD707-D9CF-40AE-B4C6-C98DA3205C09}" type="datetimeFigureOut">
               <a:rPr lang="en-US" smtClean="0"/>
               <a:pPr/>
-              <a:t>4/3/2024</a:t>
+              <a:t>4/4/2024</a:t>
             </a:fld>
             <a:endParaRPr lang="en-US"/>
           </a:p>
@@ -4056,7 +4119,7 @@
             <a:fld id="{1D8BD707-D9CF-40AE-B4C6-C98DA3205C09}" type="datetimeFigureOut">
               <a:rPr lang="en-US" smtClean="0"/>
               <a:pPr/>
-              <a:t>4/3/2024</a:t>
+              <a:t>4/4/2024</a:t>
             </a:fld>
             <a:endParaRPr lang="en-US"/>
           </a:p>
@@ -4472,7 +4535,7 @@
             <a:fld id="{1D8BD707-D9CF-40AE-B4C6-C98DA3205C09}" type="datetimeFigureOut">
               <a:rPr lang="en-US" smtClean="0"/>
               <a:pPr/>
-              <a:t>4/3/2024</a:t>
+              <a:t>4/4/2024</a:t>
             </a:fld>
             <a:endParaRPr lang="en-US"/>
           </a:p>
@@ -4586,7 +4649,7 @@
             <a:fld id="{1D8BD707-D9CF-40AE-B4C6-C98DA3205C09}" type="datetimeFigureOut">
               <a:rPr lang="en-US" smtClean="0"/>
               <a:pPr/>
-              <a:t>4/3/2024</a:t>
+              <a:t>4/4/2024</a:t>
             </a:fld>
             <a:endParaRPr lang="en-US"/>
           </a:p>
@@ -4678,7 +4741,7 @@
             <a:fld id="{1D8BD707-D9CF-40AE-B4C6-C98DA3205C09}" type="datetimeFigureOut">
               <a:rPr lang="en-US" smtClean="0"/>
               <a:pPr/>
-              <a:t>4/3/2024</a:t>
+              <a:t>4/4/2024</a:t>
             </a:fld>
             <a:endParaRPr lang="en-US"/>
           </a:p>
@@ -4950,7 +5013,7 @@
             <a:fld id="{1D8BD707-D9CF-40AE-B4C6-C98DA3205C09}" type="datetimeFigureOut">
               <a:rPr lang="en-US" smtClean="0"/>
               <a:pPr/>
-              <a:t>4/3/2024</a:t>
+              <a:t>4/4/2024</a:t>
             </a:fld>
             <a:endParaRPr lang="en-US"/>
           </a:p>
@@ -5199,7 +5262,7 @@
             <a:fld id="{1D8BD707-D9CF-40AE-B4C6-C98DA3205C09}" type="datetimeFigureOut">
               <a:rPr lang="en-US" smtClean="0"/>
               <a:pPr/>
-              <a:t>4/3/2024</a:t>
+              <a:t>4/4/2024</a:t>
             </a:fld>
             <a:endParaRPr lang="en-US"/>
           </a:p>
@@ -5410,7 +5473,7 @@
             <a:fld id="{1D8BD707-D9CF-40AE-B4C6-C98DA3205C09}" type="datetimeFigureOut">
               <a:rPr lang="en-US" smtClean="0"/>
               <a:pPr/>
-              <a:t>4/3/2024</a:t>
+              <a:t>4/4/2024</a:t>
             </a:fld>
             <a:endParaRPr lang="en-US"/>
           </a:p>
@@ -10868,7 +10931,7 @@
         <p:spPr>
           <a:xfrm>
             <a:off x="15327344" y="-352696"/>
-            <a:ext cx="4657694" cy="4568722"/>
+            <a:ext cx="4657694" cy="3008082"/>
           </a:xfrm>
           <a:custGeom>
             <a:avLst/>
@@ -10906,7 +10969,7 @@
               </a:extLst>
             </a:blip>
             <a:stretch>
-              <a:fillRect/>
+              <a:fillRect b="-51882"/>
             </a:stretch>
           </a:blipFill>
         </p:spPr>
@@ -10914,7 +10977,7 @@
           <a:bodyPr/>
           <a:lstStyle/>
           <a:p>
-            <a:endParaRPr lang="en-US"/>
+            <a:endParaRPr lang="en-US" dirty="0"/>
           </a:p>
         </p:txBody>
       </p:sp>
@@ -12778,7 +12841,7 @@
         </p:blipFill>
         <p:spPr>
           <a:xfrm>
-            <a:off x="304800" y="2857500"/>
+            <a:off x="1028700" y="2814053"/>
             <a:ext cx="12344400" cy="7155256"/>
           </a:xfrm>
           <a:prstGeom prst="rect">
@@ -12800,7 +12863,7 @@
         </p:nvGrpSpPr>
         <p:grpSpPr>
           <a:xfrm>
-            <a:off x="1063336" y="1924416"/>
+            <a:off x="1028700" y="1924415"/>
             <a:ext cx="4794184" cy="639381"/>
             <a:chOff x="0" y="0"/>
             <a:chExt cx="2860316" cy="381469"/>
@@ -12966,7 +13029,7 @@
         </p:nvSpPr>
         <p:spPr>
           <a:xfrm>
-            <a:off x="12725400" y="6035439"/>
+            <a:off x="13944600" y="6057900"/>
             <a:ext cx="4246987" cy="4415582"/>
           </a:xfrm>
           <a:custGeom>
@@ -13031,7 +13094,7 @@
         </p:nvSpPr>
         <p:spPr>
           <a:xfrm rot="5400000">
-            <a:off x="15922316" y="-872815"/>
+            <a:off x="17234044" y="-408670"/>
             <a:ext cx="3200642" cy="3193673"/>
           </a:xfrm>
           <a:custGeom>

</xml_diff>